<commit_message>
Twitter cards y un cachito de css
</commit_message>
<xml_diff>
--- a/Semana3/SEO y herramientas dentro de HTML.pptx
+++ b/Semana3/SEO y herramientas dentro de HTML.pptx
@@ -1,26 +1,26 @@
 
 <file path=ppt/presentation.xml><?xml version="1.0" encoding="utf-8"?>
-<p:presentation xmlns:a="http://schemas.openxmlformats.org/drawingml/2006/main" xmlns:r="http://schemas.openxmlformats.org/officeDocument/2006/relationships" xmlns:mc="http://schemas.openxmlformats.org/markup-compatibility/2006" xmlns:mv="urn:schemas-microsoft-com:mac:vml" xmlns:p="http://schemas.openxmlformats.org/presentationml/2006/main" xmlns:c="http://schemas.openxmlformats.org/drawingml/2006/chart" xmlns:dgm="http://schemas.openxmlformats.org/drawingml/2006/diagram" xmlns:o="urn:schemas-microsoft-com:office:office" xmlns:v="urn:schemas-microsoft-com:vml" xmlns:pvml="urn:schemas-microsoft-com:office:powerpoint" xmlns:com="http://schemas.openxmlformats.org/drawingml/2006/compatibility" xmlns:p14="http://schemas.microsoft.com/office/powerpoint/2010/main" xmlns:p15="http://schemas.microsoft.com/office/powerpoint/2012/main" autoCompressPictures="0" strictFirstAndLastChars="0" saveSubsetFonts="1">
+<p:presentation xmlns:a="http://schemas.openxmlformats.org/drawingml/2006/main" xmlns:r="http://schemas.openxmlformats.org/officeDocument/2006/relationships" xmlns:p="http://schemas.openxmlformats.org/presentationml/2006/main" strictFirstAndLastChars="0" saveSubsetFonts="1" autoCompressPictures="0">
   <p:sldMasterIdLst>
-    <p:sldMasterId id="2147483659" r:id="rId4"/>
+    <p:sldMasterId id="2147483659" r:id="rId1"/>
   </p:sldMasterIdLst>
   <p:notesMasterIdLst>
-    <p:notesMasterId r:id="rId5"/>
+    <p:notesMasterId r:id="rId10"/>
   </p:notesMasterIdLst>
   <p:sldIdLst>
-    <p:sldId id="256" r:id="rId6"/>
-    <p:sldId id="257" r:id="rId7"/>
-    <p:sldId id="258" r:id="rId8"/>
-    <p:sldId id="259" r:id="rId9"/>
-    <p:sldId id="260" r:id="rId10"/>
-    <p:sldId id="261" r:id="rId11"/>
-    <p:sldId id="262" r:id="rId12"/>
-    <p:sldId id="263" r:id="rId13"/>
+    <p:sldId id="256" r:id="rId2"/>
+    <p:sldId id="257" r:id="rId3"/>
+    <p:sldId id="258" r:id="rId4"/>
+    <p:sldId id="259" r:id="rId5"/>
+    <p:sldId id="260" r:id="rId6"/>
+    <p:sldId id="261" r:id="rId7"/>
+    <p:sldId id="262" r:id="rId8"/>
+    <p:sldId id="263" r:id="rId9"/>
   </p:sldIdLst>
-  <p:sldSz cy="5143500" cx="9144000"/>
+  <p:sldSz cx="9144000" cy="5143500" type="screen16x9"/>
   <p:notesSz cx="6858000" cy="9144000"/>
   <p:defaultTextStyle>
-    <a:defPPr lvl="0" marR="0" rtl="0" algn="l">
+    <a:defPPr marR="0" lvl="0" algn="l" rtl="0">
       <a:lnSpc>
         <a:spcPct val="100000"/>
       </a:lnSpc>
@@ -31,7 +31,7 @@
         <a:spcPts val="0"/>
       </a:spcAft>
     </a:defPPr>
-    <a:lvl1pPr lvl="0" marR="0" rtl="0" algn="l">
+    <a:lvl1pPr marR="0" lvl="0" algn="l" rtl="0">
       <a:lnSpc>
         <a:spcPct val="100000"/>
       </a:lnSpc>
@@ -45,7 +45,7 @@
         <a:srgbClr val="000000"/>
       </a:buClr>
       <a:buFont typeface="Arial"/>
-      <a:defRPr b="0" i="0" sz="1400" u="none" cap="none" strike="noStrike">
+      <a:defRPr sz="1400" b="0" i="0" u="none" strike="noStrike" cap="none">
         <a:solidFill>
           <a:srgbClr val="000000"/>
         </a:solidFill>
@@ -55,7 +55,7 @@
         <a:sym typeface="Arial"/>
       </a:defRPr>
     </a:lvl1pPr>
-    <a:lvl2pPr lvl="1" marR="0" rtl="0" algn="l">
+    <a:lvl2pPr marR="0" lvl="1" algn="l" rtl="0">
       <a:lnSpc>
         <a:spcPct val="100000"/>
       </a:lnSpc>
@@ -69,7 +69,7 @@
         <a:srgbClr val="000000"/>
       </a:buClr>
       <a:buFont typeface="Arial"/>
-      <a:defRPr b="0" i="0" sz="1400" u="none" cap="none" strike="noStrike">
+      <a:defRPr sz="1400" b="0" i="0" u="none" strike="noStrike" cap="none">
         <a:solidFill>
           <a:srgbClr val="000000"/>
         </a:solidFill>
@@ -79,7 +79,7 @@
         <a:sym typeface="Arial"/>
       </a:defRPr>
     </a:lvl2pPr>
-    <a:lvl3pPr lvl="2" marR="0" rtl="0" algn="l">
+    <a:lvl3pPr marR="0" lvl="2" algn="l" rtl="0">
       <a:lnSpc>
         <a:spcPct val="100000"/>
       </a:lnSpc>
@@ -93,7 +93,7 @@
         <a:srgbClr val="000000"/>
       </a:buClr>
       <a:buFont typeface="Arial"/>
-      <a:defRPr b="0" i="0" sz="1400" u="none" cap="none" strike="noStrike">
+      <a:defRPr sz="1400" b="0" i="0" u="none" strike="noStrike" cap="none">
         <a:solidFill>
           <a:srgbClr val="000000"/>
         </a:solidFill>
@@ -103,7 +103,7 @@
         <a:sym typeface="Arial"/>
       </a:defRPr>
     </a:lvl3pPr>
-    <a:lvl4pPr lvl="3" marR="0" rtl="0" algn="l">
+    <a:lvl4pPr marR="0" lvl="3" algn="l" rtl="0">
       <a:lnSpc>
         <a:spcPct val="100000"/>
       </a:lnSpc>
@@ -117,7 +117,7 @@
         <a:srgbClr val="000000"/>
       </a:buClr>
       <a:buFont typeface="Arial"/>
-      <a:defRPr b="0" i="0" sz="1400" u="none" cap="none" strike="noStrike">
+      <a:defRPr sz="1400" b="0" i="0" u="none" strike="noStrike" cap="none">
         <a:solidFill>
           <a:srgbClr val="000000"/>
         </a:solidFill>
@@ -127,7 +127,7 @@
         <a:sym typeface="Arial"/>
       </a:defRPr>
     </a:lvl4pPr>
-    <a:lvl5pPr lvl="4" marR="0" rtl="0" algn="l">
+    <a:lvl5pPr marR="0" lvl="4" algn="l" rtl="0">
       <a:lnSpc>
         <a:spcPct val="100000"/>
       </a:lnSpc>
@@ -141,7 +141,7 @@
         <a:srgbClr val="000000"/>
       </a:buClr>
       <a:buFont typeface="Arial"/>
-      <a:defRPr b="0" i="0" sz="1400" u="none" cap="none" strike="noStrike">
+      <a:defRPr sz="1400" b="0" i="0" u="none" strike="noStrike" cap="none">
         <a:solidFill>
           <a:srgbClr val="000000"/>
         </a:solidFill>
@@ -151,7 +151,7 @@
         <a:sym typeface="Arial"/>
       </a:defRPr>
     </a:lvl5pPr>
-    <a:lvl6pPr lvl="5" marR="0" rtl="0" algn="l">
+    <a:lvl6pPr marR="0" lvl="5" algn="l" rtl="0">
       <a:lnSpc>
         <a:spcPct val="100000"/>
       </a:lnSpc>
@@ -165,7 +165,7 @@
         <a:srgbClr val="000000"/>
       </a:buClr>
       <a:buFont typeface="Arial"/>
-      <a:defRPr b="0" i="0" sz="1400" u="none" cap="none" strike="noStrike">
+      <a:defRPr sz="1400" b="0" i="0" u="none" strike="noStrike" cap="none">
         <a:solidFill>
           <a:srgbClr val="000000"/>
         </a:solidFill>
@@ -175,7 +175,7 @@
         <a:sym typeface="Arial"/>
       </a:defRPr>
     </a:lvl6pPr>
-    <a:lvl7pPr lvl="6" marR="0" rtl="0" algn="l">
+    <a:lvl7pPr marR="0" lvl="6" algn="l" rtl="0">
       <a:lnSpc>
         <a:spcPct val="100000"/>
       </a:lnSpc>
@@ -189,7 +189,7 @@
         <a:srgbClr val="000000"/>
       </a:buClr>
       <a:buFont typeface="Arial"/>
-      <a:defRPr b="0" i="0" sz="1400" u="none" cap="none" strike="noStrike">
+      <a:defRPr sz="1400" b="0" i="0" u="none" strike="noStrike" cap="none">
         <a:solidFill>
           <a:srgbClr val="000000"/>
         </a:solidFill>
@@ -199,7 +199,7 @@
         <a:sym typeface="Arial"/>
       </a:defRPr>
     </a:lvl7pPr>
-    <a:lvl8pPr lvl="7" marR="0" rtl="0" algn="l">
+    <a:lvl8pPr marR="0" lvl="7" algn="l" rtl="0">
       <a:lnSpc>
         <a:spcPct val="100000"/>
       </a:lnSpc>
@@ -213,7 +213,7 @@
         <a:srgbClr val="000000"/>
       </a:buClr>
       <a:buFont typeface="Arial"/>
-      <a:defRPr b="0" i="0" sz="1400" u="none" cap="none" strike="noStrike">
+      <a:defRPr sz="1400" b="0" i="0" u="none" strike="noStrike" cap="none">
         <a:solidFill>
           <a:srgbClr val="000000"/>
         </a:solidFill>
@@ -223,7 +223,7 @@
         <a:sym typeface="Arial"/>
       </a:defRPr>
     </a:lvl8pPr>
-    <a:lvl9pPr lvl="8" marR="0" rtl="0" algn="l">
+    <a:lvl9pPr marR="0" lvl="8" algn="l" rtl="0">
       <a:lnSpc>
         <a:spcPct val="100000"/>
       </a:lnSpc>
@@ -237,7 +237,7 @@
         <a:srgbClr val="000000"/>
       </a:buClr>
       <a:buFont typeface="Arial"/>
-      <a:defRPr b="0" i="0" sz="1400" u="none" cap="none" strike="noStrike">
+      <a:defRPr sz="1400" b="0" i="0" u="none" strike="noStrike" cap="none">
         <a:solidFill>
           <a:srgbClr val="000000"/>
         </a:solidFill>
@@ -250,7 +250,7 @@
   </p:defaultTextStyle>
   <p:extLst>
     <p:ext uri="{EFAFB233-063F-42B5-8137-9DF3F51BA10A}">
-      <p15:sldGuideLst>
+      <p15:sldGuideLst xmlns:p15="http://schemas.microsoft.com/office/powerpoint/2012/main">
         <p15:guide id="1" orient="horz" pos="1620">
           <p15:clr>
             <a:srgbClr val="A4A3A4"/>
@@ -268,11 +268,16 @@
 </file>
 
 <file path=ppt/notesMasters/notesMaster1.xml><?xml version="1.0" encoding="utf-8"?>
-<p:notesMaster xmlns:a="http://schemas.openxmlformats.org/drawingml/2006/main" xmlns:r="http://schemas.openxmlformats.org/officeDocument/2006/relationships" xmlns:mc="http://schemas.openxmlformats.org/markup-compatibility/2006" xmlns:mv="urn:schemas-microsoft-com:mac:vml" xmlns:p="http://schemas.openxmlformats.org/presentationml/2006/main" xmlns:c="http://schemas.openxmlformats.org/drawingml/2006/chart" xmlns:dgm="http://schemas.openxmlformats.org/drawingml/2006/diagram" xmlns:o="urn:schemas-microsoft-com:office:office" xmlns:v="urn:schemas-microsoft-com:vml" xmlns:pvml="urn:schemas-microsoft-com:office:powerpoint" xmlns:com="http://schemas.openxmlformats.org/drawingml/2006/compatibility" xmlns:p14="http://schemas.microsoft.com/office/powerpoint/2010/main" xmlns:p15="http://schemas.microsoft.com/office/powerpoint/2012/main">
+<p:notesMaster xmlns:a="http://schemas.openxmlformats.org/drawingml/2006/main" xmlns:r="http://schemas.openxmlformats.org/officeDocument/2006/relationships" xmlns:p="http://schemas.openxmlformats.org/presentationml/2006/main">
   <p:cSld>
+    <p:bg>
+      <p:bgRef idx="1001">
+        <a:schemeClr val="bg1"/>
+      </p:bgRef>
+    </p:bg>
     <p:spTree>
       <p:nvGrpSpPr>
-        <p:cNvPr id="2" name="Shape 2"/>
+        <p:cNvPr id="1" name="Shape 2"/>
         <p:cNvGrpSpPr/>
         <p:nvPr/>
       </p:nvGrpSpPr>
@@ -287,9 +292,11 @@
       <p:sp>
         <p:nvSpPr>
           <p:cNvPr id="3" name="Google Shape;3;n"/>
-          <p:cNvSpPr/>
+          <p:cNvSpPr>
+            <a:spLocks noGrp="1" noRot="1" noChangeAspect="1"/>
+          </p:cNvSpPr>
           <p:nvPr>
-            <p:ph idx="2" type="sldImg"/>
+            <p:ph type="sldImg" idx="2"/>
           </p:nvPr>
         </p:nvSpPr>
         <p:spPr>
@@ -298,9 +305,13 @@
             <a:ext cx="6096075" cy="3429000"/>
           </a:xfrm>
           <a:custGeom>
-            <a:rect b="b" l="l" r="r" t="t"/>
+            <a:avLst/>
+            <a:gdLst/>
+            <a:ahLst/>
+            <a:cxnLst/>
+            <a:rect l="l" t="t" r="r" b="b"/>
             <a:pathLst>
-              <a:path extrusionOk="0" h="120000" w="120000">
+              <a:path w="120000" h="120000" extrusionOk="0">
                 <a:moveTo>
                   <a:pt x="0" y="0"/>
                 </a:moveTo>
@@ -318,23 +329,25 @@
             </a:pathLst>
           </a:custGeom>
           <a:noFill/>
-          <a:ln cap="flat" cmpd="sng" w="9525">
+          <a:ln w="9525" cap="flat" cmpd="sng">
             <a:solidFill>
               <a:srgbClr val="000000"/>
             </a:solidFill>
             <a:prstDash val="solid"/>
             <a:round/>
-            <a:headEnd len="sm" w="sm" type="none"/>
-            <a:tailEnd len="sm" w="sm" type="none"/>
+            <a:headEnd type="none" w="sm" len="sm"/>
+            <a:tailEnd type="none" w="sm" len="sm"/>
           </a:ln>
         </p:spPr>
       </p:sp>
       <p:sp>
         <p:nvSpPr>
           <p:cNvPr id="4" name="Google Shape;4;n"/>
-          <p:cNvSpPr txBox="1"/>
+          <p:cNvSpPr txBox="1">
+            <a:spLocks noGrp="1"/>
+          </p:cNvSpPr>
           <p:nvPr>
-            <p:ph idx="1" type="body"/>
+            <p:ph type="body" idx="1"/>
           </p:nvPr>
         </p:nvSpPr>
         <p:spPr>
@@ -351,11 +364,11 @@
           </a:ln>
         </p:spPr>
         <p:txBody>
-          <a:bodyPr anchorCtr="0" anchor="t" bIns="91425" lIns="91425" spcFirstLastPara="1" rIns="91425" wrap="square" tIns="91425">
+          <a:bodyPr spcFirstLastPara="1" wrap="square" lIns="91425" tIns="91425" rIns="91425" bIns="91425" anchor="t" anchorCtr="0">
             <a:noAutofit/>
           </a:bodyPr>
           <a:lstStyle>
-            <a:lvl1pPr indent="-298450" lvl="0" marL="457200">
+            <a:lvl1pPr marL="457200" lvl="0" indent="-298450">
               <a:spcBef>
                 <a:spcPts val="0"/>
               </a:spcBef>
@@ -366,7 +379,7 @@
               <a:buChar char="●"/>
               <a:defRPr sz="1100"/>
             </a:lvl1pPr>
-            <a:lvl2pPr indent="-298450" lvl="1" marL="914400">
+            <a:lvl2pPr marL="914400" lvl="1" indent="-298450">
               <a:spcBef>
                 <a:spcPts val="0"/>
               </a:spcBef>
@@ -377,7 +390,7 @@
               <a:buChar char="○"/>
               <a:defRPr sz="1100"/>
             </a:lvl2pPr>
-            <a:lvl3pPr indent="-298450" lvl="2" marL="1371600">
+            <a:lvl3pPr marL="1371600" lvl="2" indent="-298450">
               <a:spcBef>
                 <a:spcPts val="0"/>
               </a:spcBef>
@@ -388,7 +401,7 @@
               <a:buChar char="■"/>
               <a:defRPr sz="1100"/>
             </a:lvl3pPr>
-            <a:lvl4pPr indent="-298450" lvl="3" marL="1828800">
+            <a:lvl4pPr marL="1828800" lvl="3" indent="-298450">
               <a:spcBef>
                 <a:spcPts val="0"/>
               </a:spcBef>
@@ -399,7 +412,7 @@
               <a:buChar char="●"/>
               <a:defRPr sz="1100"/>
             </a:lvl4pPr>
-            <a:lvl5pPr indent="-298450" lvl="4" marL="2286000">
+            <a:lvl5pPr marL="2286000" lvl="4" indent="-298450">
               <a:spcBef>
                 <a:spcPts val="0"/>
               </a:spcBef>
@@ -410,7 +423,7 @@
               <a:buChar char="○"/>
               <a:defRPr sz="1100"/>
             </a:lvl5pPr>
-            <a:lvl6pPr indent="-298450" lvl="5" marL="2743200">
+            <a:lvl6pPr marL="2743200" lvl="5" indent="-298450">
               <a:spcBef>
                 <a:spcPts val="0"/>
               </a:spcBef>
@@ -421,7 +434,7 @@
               <a:buChar char="■"/>
               <a:defRPr sz="1100"/>
             </a:lvl6pPr>
-            <a:lvl7pPr indent="-298450" lvl="6" marL="3200400">
+            <a:lvl7pPr marL="3200400" lvl="6" indent="-298450">
               <a:spcBef>
                 <a:spcPts val="0"/>
               </a:spcBef>
@@ -432,7 +445,7 @@
               <a:buChar char="●"/>
               <a:defRPr sz="1100"/>
             </a:lvl7pPr>
-            <a:lvl8pPr indent="-298450" lvl="7" marL="3657600">
+            <a:lvl8pPr marL="3657600" lvl="7" indent="-298450">
               <a:spcBef>
                 <a:spcPts val="0"/>
               </a:spcBef>
@@ -443,7 +456,7 @@
               <a:buChar char="○"/>
               <a:defRPr sz="1100"/>
             </a:lvl8pPr>
-            <a:lvl9pPr indent="-298450" lvl="8" marL="4114800">
+            <a:lvl9pPr marL="4114800" lvl="8" indent="-298450">
               <a:spcBef>
                 <a:spcPts val="0"/>
               </a:spcBef>
@@ -455,14 +468,16 @@
               <a:defRPr sz="1100"/>
             </a:lvl9pPr>
           </a:lstStyle>
-          <a:p/>
+          <a:p>
+            <a:endParaRPr/>
+          </a:p>
         </p:txBody>
       </p:sp>
     </p:spTree>
   </p:cSld>
-  <p:clrMap accent1="accent1" accent2="accent2" accent3="accent3" accent4="accent4" accent5="accent5" accent6="accent6" bg1="lt1" bg2="dk2" tx1="dk1" tx2="lt2" folHlink="folHlink" hlink="hlink"/>
+  <p:clrMap bg1="lt1" tx1="dk1" bg2="dk2" tx2="lt2" accent1="accent1" accent2="accent2" accent3="accent3" accent4="accent4" accent5="accent5" accent6="accent6" hlink="hlink" folHlink="folHlink"/>
   <p:notesStyle>
-    <a:defPPr lvl="0" marR="0" rtl="0" algn="l">
+    <a:defPPr marR="0" lvl="0" algn="l" rtl="0">
       <a:lnSpc>
         <a:spcPct val="100000"/>
       </a:lnSpc>
@@ -473,7 +488,7 @@
         <a:spcPts val="0"/>
       </a:spcAft>
     </a:defPPr>
-    <a:lvl1pPr lvl="0" marR="0" rtl="0" algn="l">
+    <a:lvl1pPr marR="0" lvl="0" algn="l" rtl="0">
       <a:lnSpc>
         <a:spcPct val="100000"/>
       </a:lnSpc>
@@ -487,7 +502,7 @@
         <a:srgbClr val="000000"/>
       </a:buClr>
       <a:buFont typeface="Arial"/>
-      <a:defRPr b="0" i="0" sz="1400" u="none" cap="none" strike="noStrike">
+      <a:defRPr sz="1400" b="0" i="0" u="none" strike="noStrike" cap="none">
         <a:solidFill>
           <a:srgbClr val="000000"/>
         </a:solidFill>
@@ -497,7 +512,7 @@
         <a:sym typeface="Arial"/>
       </a:defRPr>
     </a:lvl1pPr>
-    <a:lvl2pPr lvl="1" marR="0" rtl="0" algn="l">
+    <a:lvl2pPr marR="0" lvl="1" algn="l" rtl="0">
       <a:lnSpc>
         <a:spcPct val="100000"/>
       </a:lnSpc>
@@ -511,7 +526,7 @@
         <a:srgbClr val="000000"/>
       </a:buClr>
       <a:buFont typeface="Arial"/>
-      <a:defRPr b="0" i="0" sz="1400" u="none" cap="none" strike="noStrike">
+      <a:defRPr sz="1400" b="0" i="0" u="none" strike="noStrike" cap="none">
         <a:solidFill>
           <a:srgbClr val="000000"/>
         </a:solidFill>
@@ -521,7 +536,7 @@
         <a:sym typeface="Arial"/>
       </a:defRPr>
     </a:lvl2pPr>
-    <a:lvl3pPr lvl="2" marR="0" rtl="0" algn="l">
+    <a:lvl3pPr marR="0" lvl="2" algn="l" rtl="0">
       <a:lnSpc>
         <a:spcPct val="100000"/>
       </a:lnSpc>
@@ -535,7 +550,7 @@
         <a:srgbClr val="000000"/>
       </a:buClr>
       <a:buFont typeface="Arial"/>
-      <a:defRPr b="0" i="0" sz="1400" u="none" cap="none" strike="noStrike">
+      <a:defRPr sz="1400" b="0" i="0" u="none" strike="noStrike" cap="none">
         <a:solidFill>
           <a:srgbClr val="000000"/>
         </a:solidFill>
@@ -545,7 +560,7 @@
         <a:sym typeface="Arial"/>
       </a:defRPr>
     </a:lvl3pPr>
-    <a:lvl4pPr lvl="3" marR="0" rtl="0" algn="l">
+    <a:lvl4pPr marR="0" lvl="3" algn="l" rtl="0">
       <a:lnSpc>
         <a:spcPct val="100000"/>
       </a:lnSpc>
@@ -559,7 +574,7 @@
         <a:srgbClr val="000000"/>
       </a:buClr>
       <a:buFont typeface="Arial"/>
-      <a:defRPr b="0" i="0" sz="1400" u="none" cap="none" strike="noStrike">
+      <a:defRPr sz="1400" b="0" i="0" u="none" strike="noStrike" cap="none">
         <a:solidFill>
           <a:srgbClr val="000000"/>
         </a:solidFill>
@@ -569,7 +584,7 @@
         <a:sym typeface="Arial"/>
       </a:defRPr>
     </a:lvl4pPr>
-    <a:lvl5pPr lvl="4" marR="0" rtl="0" algn="l">
+    <a:lvl5pPr marR="0" lvl="4" algn="l" rtl="0">
       <a:lnSpc>
         <a:spcPct val="100000"/>
       </a:lnSpc>
@@ -583,7 +598,7 @@
         <a:srgbClr val="000000"/>
       </a:buClr>
       <a:buFont typeface="Arial"/>
-      <a:defRPr b="0" i="0" sz="1400" u="none" cap="none" strike="noStrike">
+      <a:defRPr sz="1400" b="0" i="0" u="none" strike="noStrike" cap="none">
         <a:solidFill>
           <a:srgbClr val="000000"/>
         </a:solidFill>
@@ -593,7 +608,7 @@
         <a:sym typeface="Arial"/>
       </a:defRPr>
     </a:lvl5pPr>
-    <a:lvl6pPr lvl="5" marR="0" rtl="0" algn="l">
+    <a:lvl6pPr marR="0" lvl="5" algn="l" rtl="0">
       <a:lnSpc>
         <a:spcPct val="100000"/>
       </a:lnSpc>
@@ -607,7 +622,7 @@
         <a:srgbClr val="000000"/>
       </a:buClr>
       <a:buFont typeface="Arial"/>
-      <a:defRPr b="0" i="0" sz="1400" u="none" cap="none" strike="noStrike">
+      <a:defRPr sz="1400" b="0" i="0" u="none" strike="noStrike" cap="none">
         <a:solidFill>
           <a:srgbClr val="000000"/>
         </a:solidFill>
@@ -617,7 +632,7 @@
         <a:sym typeface="Arial"/>
       </a:defRPr>
     </a:lvl6pPr>
-    <a:lvl7pPr lvl="6" marR="0" rtl="0" algn="l">
+    <a:lvl7pPr marR="0" lvl="6" algn="l" rtl="0">
       <a:lnSpc>
         <a:spcPct val="100000"/>
       </a:lnSpc>
@@ -631,7 +646,7 @@
         <a:srgbClr val="000000"/>
       </a:buClr>
       <a:buFont typeface="Arial"/>
-      <a:defRPr b="0" i="0" sz="1400" u="none" cap="none" strike="noStrike">
+      <a:defRPr sz="1400" b="0" i="0" u="none" strike="noStrike" cap="none">
         <a:solidFill>
           <a:srgbClr val="000000"/>
         </a:solidFill>
@@ -641,7 +656,7 @@
         <a:sym typeface="Arial"/>
       </a:defRPr>
     </a:lvl7pPr>
-    <a:lvl8pPr lvl="7" marR="0" rtl="0" algn="l">
+    <a:lvl8pPr marR="0" lvl="7" algn="l" rtl="0">
       <a:lnSpc>
         <a:spcPct val="100000"/>
       </a:lnSpc>
@@ -655,7 +670,7 @@
         <a:srgbClr val="000000"/>
       </a:buClr>
       <a:buFont typeface="Arial"/>
-      <a:defRPr b="0" i="0" sz="1400" u="none" cap="none" strike="noStrike">
+      <a:defRPr sz="1400" b="0" i="0" u="none" strike="noStrike" cap="none">
         <a:solidFill>
           <a:srgbClr val="000000"/>
         </a:solidFill>
@@ -665,7 +680,7 @@
         <a:sym typeface="Arial"/>
       </a:defRPr>
     </a:lvl8pPr>
-    <a:lvl9pPr lvl="8" marR="0" rtl="0" algn="l">
+    <a:lvl9pPr marR="0" lvl="8" algn="l" rtl="0">
       <a:lnSpc>
         <a:spcPct val="100000"/>
       </a:lnSpc>
@@ -679,7 +694,7 @@
         <a:srgbClr val="000000"/>
       </a:buClr>
       <a:buFont typeface="Arial"/>
-      <a:defRPr b="0" i="0" sz="1400" u="none" cap="none" strike="noStrike">
+      <a:defRPr sz="1400" b="0" i="0" u="none" strike="noStrike" cap="none">
         <a:solidFill>
           <a:srgbClr val="000000"/>
         </a:solidFill>
@@ -694,11 +709,11 @@
 </file>
 
 <file path=ppt/notesSlides/notesSlide1.xml><?xml version="1.0" encoding="utf-8"?>
-<p:notes xmlns:a="http://schemas.openxmlformats.org/drawingml/2006/main" xmlns:r="http://schemas.openxmlformats.org/officeDocument/2006/relationships" xmlns:mc="http://schemas.openxmlformats.org/markup-compatibility/2006" xmlns:mv="urn:schemas-microsoft-com:mac:vml" xmlns:p="http://schemas.openxmlformats.org/presentationml/2006/main" xmlns:c="http://schemas.openxmlformats.org/drawingml/2006/chart" xmlns:dgm="http://schemas.openxmlformats.org/drawingml/2006/diagram" xmlns:o="urn:schemas-microsoft-com:office:office" xmlns:v="urn:schemas-microsoft-com:vml" xmlns:pvml="urn:schemas-microsoft-com:office:powerpoint" xmlns:com="http://schemas.openxmlformats.org/drawingml/2006/compatibility" xmlns:p14="http://schemas.microsoft.com/office/powerpoint/2010/main" xmlns:p15="http://schemas.microsoft.com/office/powerpoint/2012/main" showMasterPhAnim="0" showMasterSp="0">
+<p:notes xmlns:a="http://schemas.openxmlformats.org/drawingml/2006/main" xmlns:r="http://schemas.openxmlformats.org/officeDocument/2006/relationships" xmlns:p="http://schemas.openxmlformats.org/presentationml/2006/main" showMasterSp="0" showMasterPhAnim="0">
   <p:cSld>
     <p:spTree>
       <p:nvGrpSpPr>
-        <p:cNvPr id="52" name="Shape 52"/>
+        <p:cNvPr id="1" name="Shape 52"/>
         <p:cNvGrpSpPr/>
         <p:nvPr/>
       </p:nvGrpSpPr>
@@ -713,9 +728,11 @@
       <p:sp>
         <p:nvSpPr>
           <p:cNvPr id="53" name="Google Shape;53;g6eb65e30ca_0_0:notes"/>
-          <p:cNvSpPr/>
+          <p:cNvSpPr>
+            <a:spLocks noGrp="1" noRot="1" noChangeAspect="1"/>
+          </p:cNvSpPr>
           <p:nvPr>
-            <p:ph idx="2" type="sldImg"/>
+            <p:ph type="sldImg" idx="2"/>
           </p:nvPr>
         </p:nvSpPr>
         <p:spPr>
@@ -724,9 +741,13 @@
             <a:ext cx="6096000" cy="3429000"/>
           </a:xfrm>
           <a:custGeom>
-            <a:rect b="b" l="l" r="r" t="t"/>
+            <a:avLst/>
+            <a:gdLst/>
+            <a:ahLst/>
+            <a:cxnLst/>
+            <a:rect l="l" t="t" r="r" b="b"/>
             <a:pathLst>
-              <a:path extrusionOk="0" h="120000" w="120000">
+              <a:path w="120000" h="120000" extrusionOk="0">
                 <a:moveTo>
                   <a:pt x="0" y="0"/>
                 </a:moveTo>
@@ -748,9 +769,11 @@
       <p:sp>
         <p:nvSpPr>
           <p:cNvPr id="54" name="Google Shape;54;g6eb65e30ca_0_0:notes"/>
-          <p:cNvSpPr txBox="1"/>
+          <p:cNvSpPr txBox="1">
+            <a:spLocks noGrp="1"/>
+          </p:cNvSpPr>
           <p:nvPr>
-            <p:ph idx="1" type="body"/>
+            <p:ph type="body" idx="1"/>
           </p:nvPr>
         </p:nvSpPr>
         <p:spPr>
@@ -763,12 +786,12 @@
           </a:prstGeom>
         </p:spPr>
         <p:txBody>
-          <a:bodyPr anchorCtr="0" anchor="t" bIns="91425" lIns="91425" spcFirstLastPara="1" rIns="91425" wrap="square" tIns="91425">
+          <a:bodyPr spcFirstLastPara="1" wrap="square" lIns="91425" tIns="91425" rIns="91425" bIns="91425" anchor="t" anchorCtr="0">
             <a:noAutofit/>
           </a:bodyPr>
           <a:lstStyle/>
           <a:p>
-            <a:pPr indent="0" lvl="0" marL="0" rtl="0" algn="l">
+            <a:pPr marL="0" lvl="0" indent="0" algn="l" rtl="0">
               <a:spcBef>
                 <a:spcPts val="0"/>
               </a:spcBef>
@@ -777,9 +800,6 @@
               </a:spcAft>
               <a:buNone/>
             </a:pPr>
-            <a:r>
-              <a:t/>
-            </a:r>
             <a:endParaRPr/>
           </a:p>
         </p:txBody>
@@ -793,11 +813,11 @@
 </file>
 
 <file path=ppt/notesSlides/notesSlide2.xml><?xml version="1.0" encoding="utf-8"?>
-<p:notes xmlns:a="http://schemas.openxmlformats.org/drawingml/2006/main" xmlns:r="http://schemas.openxmlformats.org/officeDocument/2006/relationships" xmlns:mc="http://schemas.openxmlformats.org/markup-compatibility/2006" xmlns:mv="urn:schemas-microsoft-com:mac:vml" xmlns:p="http://schemas.openxmlformats.org/presentationml/2006/main" xmlns:c="http://schemas.openxmlformats.org/drawingml/2006/chart" xmlns:dgm="http://schemas.openxmlformats.org/drawingml/2006/diagram" xmlns:o="urn:schemas-microsoft-com:office:office" xmlns:v="urn:schemas-microsoft-com:vml" xmlns:pvml="urn:schemas-microsoft-com:office:powerpoint" xmlns:com="http://schemas.openxmlformats.org/drawingml/2006/compatibility" xmlns:p14="http://schemas.microsoft.com/office/powerpoint/2010/main" xmlns:p15="http://schemas.microsoft.com/office/powerpoint/2012/main" showMasterPhAnim="0" showMasterSp="0">
+<p:notes xmlns:a="http://schemas.openxmlformats.org/drawingml/2006/main" xmlns:r="http://schemas.openxmlformats.org/officeDocument/2006/relationships" xmlns:p="http://schemas.openxmlformats.org/presentationml/2006/main" showMasterSp="0" showMasterPhAnim="0">
   <p:cSld>
     <p:spTree>
       <p:nvGrpSpPr>
-        <p:cNvPr id="57" name="Shape 57"/>
+        <p:cNvPr id="1" name="Shape 57"/>
         <p:cNvGrpSpPr/>
         <p:nvPr/>
       </p:nvGrpSpPr>
@@ -812,9 +832,11 @@
       <p:sp>
         <p:nvSpPr>
           <p:cNvPr id="58" name="Google Shape;58;g6eb65e30ca_0_53:notes"/>
-          <p:cNvSpPr/>
+          <p:cNvSpPr>
+            <a:spLocks noGrp="1" noRot="1" noChangeAspect="1"/>
+          </p:cNvSpPr>
           <p:nvPr>
-            <p:ph idx="2" type="sldImg"/>
+            <p:ph type="sldImg" idx="2"/>
           </p:nvPr>
         </p:nvSpPr>
         <p:spPr>
@@ -823,9 +845,13 @@
             <a:ext cx="6096000" cy="3429000"/>
           </a:xfrm>
           <a:custGeom>
-            <a:rect b="b" l="l" r="r" t="t"/>
+            <a:avLst/>
+            <a:gdLst/>
+            <a:ahLst/>
+            <a:cxnLst/>
+            <a:rect l="l" t="t" r="r" b="b"/>
             <a:pathLst>
-              <a:path extrusionOk="0" h="120000" w="120000">
+              <a:path w="120000" h="120000" extrusionOk="0">
                 <a:moveTo>
                   <a:pt x="0" y="0"/>
                 </a:moveTo>
@@ -847,9 +873,11 @@
       <p:sp>
         <p:nvSpPr>
           <p:cNvPr id="59" name="Google Shape;59;g6eb65e30ca_0_53:notes"/>
-          <p:cNvSpPr txBox="1"/>
+          <p:cNvSpPr txBox="1">
+            <a:spLocks noGrp="1"/>
+          </p:cNvSpPr>
           <p:nvPr>
-            <p:ph idx="1" type="body"/>
+            <p:ph type="body" idx="1"/>
           </p:nvPr>
         </p:nvSpPr>
         <p:spPr>
@@ -862,12 +890,12 @@
           </a:prstGeom>
         </p:spPr>
         <p:txBody>
-          <a:bodyPr anchorCtr="0" anchor="t" bIns="91425" lIns="91425" spcFirstLastPara="1" rIns="91425" wrap="square" tIns="91425">
+          <a:bodyPr spcFirstLastPara="1" wrap="square" lIns="91425" tIns="91425" rIns="91425" bIns="91425" anchor="t" anchorCtr="0">
             <a:noAutofit/>
           </a:bodyPr>
           <a:lstStyle/>
           <a:p>
-            <a:pPr indent="0" lvl="0" marL="0" rtl="0" algn="l">
+            <a:pPr marL="0" lvl="0" indent="0" algn="l" rtl="0">
               <a:spcBef>
                 <a:spcPts val="0"/>
               </a:spcBef>
@@ -876,9 +904,6 @@
               </a:spcAft>
               <a:buNone/>
             </a:pPr>
-            <a:r>
-              <a:t/>
-            </a:r>
             <a:endParaRPr/>
           </a:p>
         </p:txBody>
@@ -892,11 +917,11 @@
 </file>
 
 <file path=ppt/notesSlides/notesSlide3.xml><?xml version="1.0" encoding="utf-8"?>
-<p:notes xmlns:a="http://schemas.openxmlformats.org/drawingml/2006/main" xmlns:r="http://schemas.openxmlformats.org/officeDocument/2006/relationships" xmlns:mc="http://schemas.openxmlformats.org/markup-compatibility/2006" xmlns:mv="urn:schemas-microsoft-com:mac:vml" xmlns:p="http://schemas.openxmlformats.org/presentationml/2006/main" xmlns:c="http://schemas.openxmlformats.org/drawingml/2006/chart" xmlns:dgm="http://schemas.openxmlformats.org/drawingml/2006/diagram" xmlns:o="urn:schemas-microsoft-com:office:office" xmlns:v="urn:schemas-microsoft-com:vml" xmlns:pvml="urn:schemas-microsoft-com:office:powerpoint" xmlns:com="http://schemas.openxmlformats.org/drawingml/2006/compatibility" xmlns:p14="http://schemas.microsoft.com/office/powerpoint/2010/main" xmlns:p15="http://schemas.microsoft.com/office/powerpoint/2012/main" showMasterPhAnim="0" showMasterSp="0">
+<p:notes xmlns:a="http://schemas.openxmlformats.org/drawingml/2006/main" xmlns:r="http://schemas.openxmlformats.org/officeDocument/2006/relationships" xmlns:p="http://schemas.openxmlformats.org/presentationml/2006/main" showMasterSp="0" showMasterPhAnim="0">
   <p:cSld>
     <p:spTree>
       <p:nvGrpSpPr>
-        <p:cNvPr id="65" name="Shape 65"/>
+        <p:cNvPr id="1" name="Shape 65"/>
         <p:cNvGrpSpPr/>
         <p:nvPr/>
       </p:nvGrpSpPr>
@@ -911,9 +936,11 @@
       <p:sp>
         <p:nvSpPr>
           <p:cNvPr id="66" name="Google Shape;66;g6ec57f475c_0_3:notes"/>
-          <p:cNvSpPr/>
+          <p:cNvSpPr>
+            <a:spLocks noGrp="1" noRot="1" noChangeAspect="1"/>
+          </p:cNvSpPr>
           <p:nvPr>
-            <p:ph idx="2" type="sldImg"/>
+            <p:ph type="sldImg" idx="2"/>
           </p:nvPr>
         </p:nvSpPr>
         <p:spPr>
@@ -922,9 +949,13 @@
             <a:ext cx="6096000" cy="3429000"/>
           </a:xfrm>
           <a:custGeom>
-            <a:rect b="b" l="l" r="r" t="t"/>
+            <a:avLst/>
+            <a:gdLst/>
+            <a:ahLst/>
+            <a:cxnLst/>
+            <a:rect l="l" t="t" r="r" b="b"/>
             <a:pathLst>
-              <a:path extrusionOk="0" h="120000" w="120000">
+              <a:path w="120000" h="120000" extrusionOk="0">
                 <a:moveTo>
                   <a:pt x="0" y="0"/>
                 </a:moveTo>
@@ -946,9 +977,11 @@
       <p:sp>
         <p:nvSpPr>
           <p:cNvPr id="67" name="Google Shape;67;g6ec57f475c_0_3:notes"/>
-          <p:cNvSpPr txBox="1"/>
+          <p:cNvSpPr txBox="1">
+            <a:spLocks noGrp="1"/>
+          </p:cNvSpPr>
           <p:nvPr>
-            <p:ph idx="1" type="body"/>
+            <p:ph type="body" idx="1"/>
           </p:nvPr>
         </p:nvSpPr>
         <p:spPr>
@@ -961,12 +994,12 @@
           </a:prstGeom>
         </p:spPr>
         <p:txBody>
-          <a:bodyPr anchorCtr="0" anchor="t" bIns="91425" lIns="91425" spcFirstLastPara="1" rIns="91425" wrap="square" tIns="91425">
+          <a:bodyPr spcFirstLastPara="1" wrap="square" lIns="91425" tIns="91425" rIns="91425" bIns="91425" anchor="t" anchorCtr="0">
             <a:noAutofit/>
           </a:bodyPr>
           <a:lstStyle/>
           <a:p>
-            <a:pPr indent="0" lvl="0" marL="0" rtl="0" algn="l">
+            <a:pPr marL="0" lvl="0" indent="0" algn="l" rtl="0">
               <a:spcBef>
                 <a:spcPts val="0"/>
               </a:spcBef>
@@ -975,9 +1008,6 @@
               </a:spcAft>
               <a:buNone/>
             </a:pPr>
-            <a:r>
-              <a:t/>
-            </a:r>
             <a:endParaRPr/>
           </a:p>
         </p:txBody>
@@ -991,11 +1021,11 @@
 </file>
 
 <file path=ppt/notesSlides/notesSlide4.xml><?xml version="1.0" encoding="utf-8"?>
-<p:notes xmlns:a="http://schemas.openxmlformats.org/drawingml/2006/main" xmlns:r="http://schemas.openxmlformats.org/officeDocument/2006/relationships" xmlns:mc="http://schemas.openxmlformats.org/markup-compatibility/2006" xmlns:mv="urn:schemas-microsoft-com:mac:vml" xmlns:p="http://schemas.openxmlformats.org/presentationml/2006/main" xmlns:c="http://schemas.openxmlformats.org/drawingml/2006/chart" xmlns:dgm="http://schemas.openxmlformats.org/drawingml/2006/diagram" xmlns:o="urn:schemas-microsoft-com:office:office" xmlns:v="urn:schemas-microsoft-com:vml" xmlns:pvml="urn:schemas-microsoft-com:office:powerpoint" xmlns:com="http://schemas.openxmlformats.org/drawingml/2006/compatibility" xmlns:p14="http://schemas.microsoft.com/office/powerpoint/2010/main" xmlns:p15="http://schemas.microsoft.com/office/powerpoint/2012/main" showMasterPhAnim="0" showMasterSp="0">
+<p:notes xmlns:a="http://schemas.openxmlformats.org/drawingml/2006/main" xmlns:r="http://schemas.openxmlformats.org/officeDocument/2006/relationships" xmlns:p="http://schemas.openxmlformats.org/presentationml/2006/main" showMasterSp="0" showMasterPhAnim="0">
   <p:cSld>
     <p:spTree>
       <p:nvGrpSpPr>
-        <p:cNvPr id="70" name="Shape 70"/>
+        <p:cNvPr id="1" name="Shape 70"/>
         <p:cNvGrpSpPr/>
         <p:nvPr/>
       </p:nvGrpSpPr>
@@ -1010,9 +1040,11 @@
       <p:sp>
         <p:nvSpPr>
           <p:cNvPr id="71" name="Google Shape;71;g6ec57f475c_0_12:notes"/>
-          <p:cNvSpPr/>
+          <p:cNvSpPr>
+            <a:spLocks noGrp="1" noRot="1" noChangeAspect="1"/>
+          </p:cNvSpPr>
           <p:nvPr>
-            <p:ph idx="2" type="sldImg"/>
+            <p:ph type="sldImg" idx="2"/>
           </p:nvPr>
         </p:nvSpPr>
         <p:spPr>
@@ -1021,9 +1053,13 @@
             <a:ext cx="6096000" cy="3429000"/>
           </a:xfrm>
           <a:custGeom>
-            <a:rect b="b" l="l" r="r" t="t"/>
+            <a:avLst/>
+            <a:gdLst/>
+            <a:ahLst/>
+            <a:cxnLst/>
+            <a:rect l="l" t="t" r="r" b="b"/>
             <a:pathLst>
-              <a:path extrusionOk="0" h="120000" w="120000">
+              <a:path w="120000" h="120000" extrusionOk="0">
                 <a:moveTo>
                   <a:pt x="0" y="0"/>
                 </a:moveTo>
@@ -1045,9 +1081,11 @@
       <p:sp>
         <p:nvSpPr>
           <p:cNvPr id="72" name="Google Shape;72;g6ec57f475c_0_12:notes"/>
-          <p:cNvSpPr txBox="1"/>
+          <p:cNvSpPr txBox="1">
+            <a:spLocks noGrp="1"/>
+          </p:cNvSpPr>
           <p:nvPr>
-            <p:ph idx="1" type="body"/>
+            <p:ph type="body" idx="1"/>
           </p:nvPr>
         </p:nvSpPr>
         <p:spPr>
@@ -1060,12 +1098,12 @@
           </a:prstGeom>
         </p:spPr>
         <p:txBody>
-          <a:bodyPr anchorCtr="0" anchor="t" bIns="91425" lIns="91425" spcFirstLastPara="1" rIns="91425" wrap="square" tIns="91425">
+          <a:bodyPr spcFirstLastPara="1" wrap="square" lIns="91425" tIns="91425" rIns="91425" bIns="91425" anchor="t" anchorCtr="0">
             <a:noAutofit/>
           </a:bodyPr>
           <a:lstStyle/>
           <a:p>
-            <a:pPr indent="0" lvl="0" marL="0" rtl="0" algn="l">
+            <a:pPr marL="0" lvl="0" indent="0" algn="l" rtl="0">
               <a:spcBef>
                 <a:spcPts val="0"/>
               </a:spcBef>
@@ -1074,9 +1112,6 @@
               </a:spcAft>
               <a:buNone/>
             </a:pPr>
-            <a:r>
-              <a:t/>
-            </a:r>
             <a:endParaRPr/>
           </a:p>
         </p:txBody>
@@ -1090,11 +1125,11 @@
 </file>
 
 <file path=ppt/notesSlides/notesSlide5.xml><?xml version="1.0" encoding="utf-8"?>
-<p:notes xmlns:a="http://schemas.openxmlformats.org/drawingml/2006/main" xmlns:r="http://schemas.openxmlformats.org/officeDocument/2006/relationships" xmlns:mc="http://schemas.openxmlformats.org/markup-compatibility/2006" xmlns:mv="urn:schemas-microsoft-com:mac:vml" xmlns:p="http://schemas.openxmlformats.org/presentationml/2006/main" xmlns:c="http://schemas.openxmlformats.org/drawingml/2006/chart" xmlns:dgm="http://schemas.openxmlformats.org/drawingml/2006/diagram" xmlns:o="urn:schemas-microsoft-com:office:office" xmlns:v="urn:schemas-microsoft-com:vml" xmlns:pvml="urn:schemas-microsoft-com:office:powerpoint" xmlns:com="http://schemas.openxmlformats.org/drawingml/2006/compatibility" xmlns:p14="http://schemas.microsoft.com/office/powerpoint/2010/main" xmlns:p15="http://schemas.microsoft.com/office/powerpoint/2012/main" showMasterPhAnim="0" showMasterSp="0">
+<p:notes xmlns:a="http://schemas.openxmlformats.org/drawingml/2006/main" xmlns:r="http://schemas.openxmlformats.org/officeDocument/2006/relationships" xmlns:p="http://schemas.openxmlformats.org/presentationml/2006/main" showMasterSp="0" showMasterPhAnim="0">
   <p:cSld>
     <p:spTree>
       <p:nvGrpSpPr>
-        <p:cNvPr id="75" name="Shape 75"/>
+        <p:cNvPr id="1" name="Shape 75"/>
         <p:cNvGrpSpPr/>
         <p:nvPr/>
       </p:nvGrpSpPr>
@@ -1109,9 +1144,11 @@
       <p:sp>
         <p:nvSpPr>
           <p:cNvPr id="76" name="Google Shape;76;g6ec57f475c_0_20:notes"/>
-          <p:cNvSpPr/>
+          <p:cNvSpPr>
+            <a:spLocks noGrp="1" noRot="1" noChangeAspect="1"/>
+          </p:cNvSpPr>
           <p:nvPr>
-            <p:ph idx="2" type="sldImg"/>
+            <p:ph type="sldImg" idx="2"/>
           </p:nvPr>
         </p:nvSpPr>
         <p:spPr>
@@ -1120,9 +1157,13 @@
             <a:ext cx="6096000" cy="3429000"/>
           </a:xfrm>
           <a:custGeom>
-            <a:rect b="b" l="l" r="r" t="t"/>
+            <a:avLst/>
+            <a:gdLst/>
+            <a:ahLst/>
+            <a:cxnLst/>
+            <a:rect l="l" t="t" r="r" b="b"/>
             <a:pathLst>
-              <a:path extrusionOk="0" h="120000" w="120000">
+              <a:path w="120000" h="120000" extrusionOk="0">
                 <a:moveTo>
                   <a:pt x="0" y="0"/>
                 </a:moveTo>
@@ -1144,9 +1185,11 @@
       <p:sp>
         <p:nvSpPr>
           <p:cNvPr id="77" name="Google Shape;77;g6ec57f475c_0_20:notes"/>
-          <p:cNvSpPr txBox="1"/>
+          <p:cNvSpPr txBox="1">
+            <a:spLocks noGrp="1"/>
+          </p:cNvSpPr>
           <p:nvPr>
-            <p:ph idx="1" type="body"/>
+            <p:ph type="body" idx="1"/>
           </p:nvPr>
         </p:nvSpPr>
         <p:spPr>
@@ -1159,12 +1202,12 @@
           </a:prstGeom>
         </p:spPr>
         <p:txBody>
-          <a:bodyPr anchorCtr="0" anchor="t" bIns="91425" lIns="91425" spcFirstLastPara="1" rIns="91425" wrap="square" tIns="91425">
+          <a:bodyPr spcFirstLastPara="1" wrap="square" lIns="91425" tIns="91425" rIns="91425" bIns="91425" anchor="t" anchorCtr="0">
             <a:noAutofit/>
           </a:bodyPr>
           <a:lstStyle/>
           <a:p>
-            <a:pPr indent="0" lvl="0" marL="0" rtl="0" algn="l">
+            <a:pPr marL="0" lvl="0" indent="0" algn="l" rtl="0">
               <a:spcBef>
                 <a:spcPts val="0"/>
               </a:spcBef>
@@ -1173,9 +1216,6 @@
               </a:spcAft>
               <a:buNone/>
             </a:pPr>
-            <a:r>
-              <a:t/>
-            </a:r>
             <a:endParaRPr/>
           </a:p>
         </p:txBody>
@@ -1189,11 +1229,11 @@
 </file>
 
 <file path=ppt/notesSlides/notesSlide6.xml><?xml version="1.0" encoding="utf-8"?>
-<p:notes xmlns:a="http://schemas.openxmlformats.org/drawingml/2006/main" xmlns:r="http://schemas.openxmlformats.org/officeDocument/2006/relationships" xmlns:mc="http://schemas.openxmlformats.org/markup-compatibility/2006" xmlns:mv="urn:schemas-microsoft-com:mac:vml" xmlns:p="http://schemas.openxmlformats.org/presentationml/2006/main" xmlns:c="http://schemas.openxmlformats.org/drawingml/2006/chart" xmlns:dgm="http://schemas.openxmlformats.org/drawingml/2006/diagram" xmlns:o="urn:schemas-microsoft-com:office:office" xmlns:v="urn:schemas-microsoft-com:vml" xmlns:pvml="urn:schemas-microsoft-com:office:powerpoint" xmlns:com="http://schemas.openxmlformats.org/drawingml/2006/compatibility" xmlns:p14="http://schemas.microsoft.com/office/powerpoint/2010/main" xmlns:p15="http://schemas.microsoft.com/office/powerpoint/2012/main" showMasterPhAnim="0" showMasterSp="0">
+<p:notes xmlns:a="http://schemas.openxmlformats.org/drawingml/2006/main" xmlns:r="http://schemas.openxmlformats.org/officeDocument/2006/relationships" xmlns:p="http://schemas.openxmlformats.org/presentationml/2006/main" showMasterSp="0" showMasterPhAnim="0">
   <p:cSld>
     <p:spTree>
       <p:nvGrpSpPr>
-        <p:cNvPr id="83" name="Shape 83"/>
+        <p:cNvPr id="1" name="Shape 83"/>
         <p:cNvGrpSpPr/>
         <p:nvPr/>
       </p:nvGrpSpPr>
@@ -1208,9 +1248,11 @@
       <p:sp>
         <p:nvSpPr>
           <p:cNvPr id="84" name="Google Shape;84;g6ec57f475c_0_35:notes"/>
-          <p:cNvSpPr/>
+          <p:cNvSpPr>
+            <a:spLocks noGrp="1" noRot="1" noChangeAspect="1"/>
+          </p:cNvSpPr>
           <p:nvPr>
-            <p:ph idx="2" type="sldImg"/>
+            <p:ph type="sldImg" idx="2"/>
           </p:nvPr>
         </p:nvSpPr>
         <p:spPr>
@@ -1219,9 +1261,13 @@
             <a:ext cx="6096000" cy="3429000"/>
           </a:xfrm>
           <a:custGeom>
-            <a:rect b="b" l="l" r="r" t="t"/>
+            <a:avLst/>
+            <a:gdLst/>
+            <a:ahLst/>
+            <a:cxnLst/>
+            <a:rect l="l" t="t" r="r" b="b"/>
             <a:pathLst>
-              <a:path extrusionOk="0" h="120000" w="120000">
+              <a:path w="120000" h="120000" extrusionOk="0">
                 <a:moveTo>
                   <a:pt x="0" y="0"/>
                 </a:moveTo>
@@ -1243,9 +1289,11 @@
       <p:sp>
         <p:nvSpPr>
           <p:cNvPr id="85" name="Google Shape;85;g6ec57f475c_0_35:notes"/>
-          <p:cNvSpPr txBox="1"/>
+          <p:cNvSpPr txBox="1">
+            <a:spLocks noGrp="1"/>
+          </p:cNvSpPr>
           <p:nvPr>
-            <p:ph idx="1" type="body"/>
+            <p:ph type="body" idx="1"/>
           </p:nvPr>
         </p:nvSpPr>
         <p:spPr>
@@ -1258,12 +1306,12 @@
           </a:prstGeom>
         </p:spPr>
         <p:txBody>
-          <a:bodyPr anchorCtr="0" anchor="t" bIns="91425" lIns="91425" spcFirstLastPara="1" rIns="91425" wrap="square" tIns="91425">
+          <a:bodyPr spcFirstLastPara="1" wrap="square" lIns="91425" tIns="91425" rIns="91425" bIns="91425" anchor="t" anchorCtr="0">
             <a:noAutofit/>
           </a:bodyPr>
           <a:lstStyle/>
           <a:p>
-            <a:pPr indent="0" lvl="0" marL="0" rtl="0" algn="l">
+            <a:pPr marL="0" lvl="0" indent="0" algn="l" rtl="0">
               <a:spcBef>
                 <a:spcPts val="0"/>
               </a:spcBef>
@@ -1272,9 +1320,6 @@
               </a:spcAft>
               <a:buNone/>
             </a:pPr>
-            <a:r>
-              <a:t/>
-            </a:r>
             <a:endParaRPr/>
           </a:p>
         </p:txBody>
@@ -1288,11 +1333,11 @@
 </file>
 
 <file path=ppt/notesSlides/notesSlide7.xml><?xml version="1.0" encoding="utf-8"?>
-<p:notes xmlns:a="http://schemas.openxmlformats.org/drawingml/2006/main" xmlns:r="http://schemas.openxmlformats.org/officeDocument/2006/relationships" xmlns:mc="http://schemas.openxmlformats.org/markup-compatibility/2006" xmlns:mv="urn:schemas-microsoft-com:mac:vml" xmlns:p="http://schemas.openxmlformats.org/presentationml/2006/main" xmlns:c="http://schemas.openxmlformats.org/drawingml/2006/chart" xmlns:dgm="http://schemas.openxmlformats.org/drawingml/2006/diagram" xmlns:o="urn:schemas-microsoft-com:office:office" xmlns:v="urn:schemas-microsoft-com:vml" xmlns:pvml="urn:schemas-microsoft-com:office:powerpoint" xmlns:com="http://schemas.openxmlformats.org/drawingml/2006/compatibility" xmlns:p14="http://schemas.microsoft.com/office/powerpoint/2010/main" xmlns:p15="http://schemas.microsoft.com/office/powerpoint/2012/main" showMasterPhAnim="0" showMasterSp="0">
+<p:notes xmlns:a="http://schemas.openxmlformats.org/drawingml/2006/main" xmlns:r="http://schemas.openxmlformats.org/officeDocument/2006/relationships" xmlns:p="http://schemas.openxmlformats.org/presentationml/2006/main" showMasterSp="0" showMasterPhAnim="0">
   <p:cSld>
     <p:spTree>
       <p:nvGrpSpPr>
-        <p:cNvPr id="88" name="Shape 88"/>
+        <p:cNvPr id="1" name="Shape 88"/>
         <p:cNvGrpSpPr/>
         <p:nvPr/>
       </p:nvGrpSpPr>
@@ -1307,9 +1352,11 @@
       <p:sp>
         <p:nvSpPr>
           <p:cNvPr id="89" name="Google Shape;89;g6ec57f475c_0_39:notes"/>
-          <p:cNvSpPr/>
+          <p:cNvSpPr>
+            <a:spLocks noGrp="1" noRot="1" noChangeAspect="1"/>
+          </p:cNvSpPr>
           <p:nvPr>
-            <p:ph idx="2" type="sldImg"/>
+            <p:ph type="sldImg" idx="2"/>
           </p:nvPr>
         </p:nvSpPr>
         <p:spPr>
@@ -1318,9 +1365,13 @@
             <a:ext cx="6096000" cy="3429000"/>
           </a:xfrm>
           <a:custGeom>
-            <a:rect b="b" l="l" r="r" t="t"/>
+            <a:avLst/>
+            <a:gdLst/>
+            <a:ahLst/>
+            <a:cxnLst/>
+            <a:rect l="l" t="t" r="r" b="b"/>
             <a:pathLst>
-              <a:path extrusionOk="0" h="120000" w="120000">
+              <a:path w="120000" h="120000" extrusionOk="0">
                 <a:moveTo>
                   <a:pt x="0" y="0"/>
                 </a:moveTo>
@@ -1342,9 +1393,11 @@
       <p:sp>
         <p:nvSpPr>
           <p:cNvPr id="90" name="Google Shape;90;g6ec57f475c_0_39:notes"/>
-          <p:cNvSpPr txBox="1"/>
+          <p:cNvSpPr txBox="1">
+            <a:spLocks noGrp="1"/>
+          </p:cNvSpPr>
           <p:nvPr>
-            <p:ph idx="1" type="body"/>
+            <p:ph type="body" idx="1"/>
           </p:nvPr>
         </p:nvSpPr>
         <p:spPr>
@@ -1357,12 +1410,12 @@
           </a:prstGeom>
         </p:spPr>
         <p:txBody>
-          <a:bodyPr anchorCtr="0" anchor="t" bIns="91425" lIns="91425" spcFirstLastPara="1" rIns="91425" wrap="square" tIns="91425">
+          <a:bodyPr spcFirstLastPara="1" wrap="square" lIns="91425" tIns="91425" rIns="91425" bIns="91425" anchor="t" anchorCtr="0">
             <a:noAutofit/>
           </a:bodyPr>
           <a:lstStyle/>
           <a:p>
-            <a:pPr indent="0" lvl="0" marL="0" rtl="0" algn="l">
+            <a:pPr marL="0" lvl="0" indent="0" algn="l" rtl="0">
               <a:spcBef>
                 <a:spcPts val="0"/>
               </a:spcBef>
@@ -1371,9 +1424,6 @@
               </a:spcAft>
               <a:buNone/>
             </a:pPr>
-            <a:r>
-              <a:t/>
-            </a:r>
             <a:endParaRPr/>
           </a:p>
         </p:txBody>
@@ -1387,11 +1437,11 @@
 </file>
 
 <file path=ppt/notesSlides/notesSlide8.xml><?xml version="1.0" encoding="utf-8"?>
-<p:notes xmlns:a="http://schemas.openxmlformats.org/drawingml/2006/main" xmlns:r="http://schemas.openxmlformats.org/officeDocument/2006/relationships" xmlns:mc="http://schemas.openxmlformats.org/markup-compatibility/2006" xmlns:mv="urn:schemas-microsoft-com:mac:vml" xmlns:p="http://schemas.openxmlformats.org/presentationml/2006/main" xmlns:c="http://schemas.openxmlformats.org/drawingml/2006/chart" xmlns:dgm="http://schemas.openxmlformats.org/drawingml/2006/diagram" xmlns:o="urn:schemas-microsoft-com:office:office" xmlns:v="urn:schemas-microsoft-com:vml" xmlns:pvml="urn:schemas-microsoft-com:office:powerpoint" xmlns:com="http://schemas.openxmlformats.org/drawingml/2006/compatibility" xmlns:p14="http://schemas.microsoft.com/office/powerpoint/2010/main" xmlns:p15="http://schemas.microsoft.com/office/powerpoint/2012/main" showMasterPhAnim="0" showMasterSp="0">
+<p:notes xmlns:a="http://schemas.openxmlformats.org/drawingml/2006/main" xmlns:r="http://schemas.openxmlformats.org/officeDocument/2006/relationships" xmlns:p="http://schemas.openxmlformats.org/presentationml/2006/main" showMasterSp="0" showMasterPhAnim="0">
   <p:cSld>
     <p:spTree>
       <p:nvGrpSpPr>
-        <p:cNvPr id="94" name="Shape 94"/>
+        <p:cNvPr id="1" name="Shape 94"/>
         <p:cNvGrpSpPr/>
         <p:nvPr/>
       </p:nvGrpSpPr>
@@ -1406,20 +1456,26 @@
       <p:sp>
         <p:nvSpPr>
           <p:cNvPr id="95" name="Google Shape;95;g6ec57f475c_0_47:notes"/>
-          <p:cNvSpPr/>
+          <p:cNvSpPr>
+            <a:spLocks noGrp="1" noRot="1" noChangeAspect="1"/>
+          </p:cNvSpPr>
           <p:nvPr>
-            <p:ph idx="2" type="sldImg"/>
+            <p:ph type="sldImg" idx="2"/>
           </p:nvPr>
         </p:nvSpPr>
         <p:spPr>
           <a:xfrm>
-            <a:off x="381300" y="685800"/>
+            <a:off x="381000" y="685800"/>
             <a:ext cx="6096000" cy="3429000"/>
           </a:xfrm>
           <a:custGeom>
-            <a:rect b="b" l="l" r="r" t="t"/>
+            <a:avLst/>
+            <a:gdLst/>
+            <a:ahLst/>
+            <a:cxnLst/>
+            <a:rect l="l" t="t" r="r" b="b"/>
             <a:pathLst>
-              <a:path extrusionOk="0" h="120000" w="120000">
+              <a:path w="120000" h="120000" extrusionOk="0">
                 <a:moveTo>
                   <a:pt x="0" y="0"/>
                 </a:moveTo>
@@ -1441,9 +1497,11 @@
       <p:sp>
         <p:nvSpPr>
           <p:cNvPr id="96" name="Google Shape;96;g6ec57f475c_0_47:notes"/>
-          <p:cNvSpPr txBox="1"/>
+          <p:cNvSpPr txBox="1">
+            <a:spLocks noGrp="1"/>
+          </p:cNvSpPr>
           <p:nvPr>
-            <p:ph idx="1" type="body"/>
+            <p:ph type="body" idx="1"/>
           </p:nvPr>
         </p:nvSpPr>
         <p:spPr>
@@ -1456,12 +1514,12 @@
           </a:prstGeom>
         </p:spPr>
         <p:txBody>
-          <a:bodyPr anchorCtr="0" anchor="t" bIns="91425" lIns="91425" spcFirstLastPara="1" rIns="91425" wrap="square" tIns="91425">
+          <a:bodyPr spcFirstLastPara="1" wrap="square" lIns="91425" tIns="91425" rIns="91425" bIns="91425" anchor="t" anchorCtr="0">
             <a:noAutofit/>
           </a:bodyPr>
           <a:lstStyle/>
           <a:p>
-            <a:pPr indent="0" lvl="0" marL="0" rtl="0" algn="l">
+            <a:pPr marL="0" lvl="0" indent="0" algn="l" rtl="0">
               <a:spcBef>
                 <a:spcPts val="0"/>
               </a:spcBef>
@@ -1470,9 +1528,6 @@
               </a:spcAft>
               <a:buNone/>
             </a:pPr>
-            <a:r>
-              <a:t/>
-            </a:r>
             <a:endParaRPr/>
           </a:p>
         </p:txBody>
@@ -1486,11 +1541,11 @@
 </file>
 
 <file path=ppt/slideLayouts/slideLayout1.xml><?xml version="1.0" encoding="utf-8"?>
-<p:sldLayout xmlns:a="http://schemas.openxmlformats.org/drawingml/2006/main" xmlns:r="http://schemas.openxmlformats.org/officeDocument/2006/relationships" xmlns:mc="http://schemas.openxmlformats.org/markup-compatibility/2006" xmlns:mv="urn:schemas-microsoft-com:mac:vml" xmlns:p="http://schemas.openxmlformats.org/presentationml/2006/main" xmlns:c="http://schemas.openxmlformats.org/drawingml/2006/chart" xmlns:dgm="http://schemas.openxmlformats.org/drawingml/2006/diagram" xmlns:o="urn:schemas-microsoft-com:office:office" xmlns:v="urn:schemas-microsoft-com:vml" xmlns:pvml="urn:schemas-microsoft-com:office:powerpoint" xmlns:com="http://schemas.openxmlformats.org/drawingml/2006/compatibility" xmlns:p14="http://schemas.microsoft.com/office/powerpoint/2010/main" xmlns:p15="http://schemas.microsoft.com/office/powerpoint/2012/main" matchingName="Title slide" type="title">
+<p:sldLayout xmlns:a="http://schemas.openxmlformats.org/drawingml/2006/main" xmlns:r="http://schemas.openxmlformats.org/officeDocument/2006/relationships" xmlns:p="http://schemas.openxmlformats.org/presentationml/2006/main" matchingName="Title slide" type="title">
   <p:cSld name="TITLE">
     <p:spTree>
       <p:nvGrpSpPr>
-        <p:cNvPr id="9" name="Shape 9"/>
+        <p:cNvPr id="1" name="Shape 9"/>
         <p:cNvGrpSpPr/>
         <p:nvPr/>
       </p:nvGrpSpPr>
@@ -1505,7 +1560,9 @@
       <p:sp>
         <p:nvSpPr>
           <p:cNvPr id="10" name="Google Shape;10;p2"/>
-          <p:cNvSpPr txBox="1"/>
+          <p:cNvSpPr txBox="1">
+            <a:spLocks noGrp="1"/>
+          </p:cNvSpPr>
           <p:nvPr>
             <p:ph type="ctrTitle"/>
           </p:nvPr>
@@ -1524,7 +1581,7 @@
           </a:ln>
         </p:spPr>
         <p:txBody>
-          <a:bodyPr anchorCtr="0" anchor="b" bIns="91425" lIns="91425" spcFirstLastPara="1" rIns="91425" wrap="square" tIns="91425">
+          <a:bodyPr spcFirstLastPara="1" wrap="square" lIns="91425" tIns="91425" rIns="91425" bIns="91425" anchor="b" anchorCtr="0">
             <a:noAutofit/>
           </a:bodyPr>
           <a:lstStyle>
@@ -1628,15 +1685,19 @@
               <a:defRPr sz="2400"/>
             </a:lvl9pPr>
           </a:lstStyle>
-          <a:p/>
+          <a:p>
+            <a:endParaRPr/>
+          </a:p>
         </p:txBody>
       </p:sp>
       <p:sp>
         <p:nvSpPr>
           <p:cNvPr id="11" name="Google Shape;11;p2"/>
-          <p:cNvSpPr txBox="1"/>
+          <p:cNvSpPr txBox="1">
+            <a:spLocks noGrp="1"/>
+          </p:cNvSpPr>
           <p:nvPr>
-            <p:ph idx="1" type="subTitle"/>
+            <p:ph type="subTitle" idx="1"/>
           </p:nvPr>
         </p:nvSpPr>
         <p:spPr>
@@ -1653,7 +1714,7 @@
           </a:ln>
         </p:spPr>
         <p:txBody>
-          <a:bodyPr anchorCtr="0" anchor="ctr" bIns="91425" lIns="91425" spcFirstLastPara="1" rIns="91425" wrap="square" tIns="91425">
+          <a:bodyPr spcFirstLastPara="1" wrap="square" lIns="91425" tIns="91425" rIns="91425" bIns="91425" anchor="ctr" anchorCtr="0">
             <a:noAutofit/>
           </a:bodyPr>
           <a:lstStyle>
@@ -1784,15 +1845,19 @@
               <a:defRPr sz="2800"/>
             </a:lvl9pPr>
           </a:lstStyle>
-          <a:p/>
+          <a:p>
+            <a:endParaRPr/>
+          </a:p>
         </p:txBody>
       </p:sp>
       <p:sp>
         <p:nvSpPr>
           <p:cNvPr id="12" name="Google Shape;12;p2"/>
-          <p:cNvSpPr txBox="1"/>
+          <p:cNvSpPr txBox="1">
+            <a:spLocks noGrp="1"/>
+          </p:cNvSpPr>
           <p:nvPr>
-            <p:ph idx="12" type="sldNum"/>
+            <p:ph type="sldNum" idx="12"/>
           </p:nvPr>
         </p:nvSpPr>
         <p:spPr>
@@ -1805,7 +1870,7 @@
           </a:prstGeom>
         </p:spPr>
         <p:txBody>
-          <a:bodyPr anchorCtr="0" anchor="ctr" bIns="91425" lIns="91425" spcFirstLastPara="1" rIns="91425" wrap="square" tIns="91425">
+          <a:bodyPr spcFirstLastPara="1" wrap="square" lIns="91425" tIns="91425" rIns="91425" bIns="91425" anchor="ctr" anchorCtr="0">
             <a:noAutofit/>
           </a:bodyPr>
           <a:lstStyle>
@@ -1847,7 +1912,7 @@
             </a:lvl9pPr>
           </a:lstStyle>
           <a:p>
-            <a:pPr indent="0" lvl="0" marL="0" rtl="0" algn="r">
+            <a:pPr marL="0" lvl="0" indent="0" algn="r" rtl="0">
               <a:spcBef>
                 <a:spcPts val="0"/>
               </a:spcBef>
@@ -1858,7 +1923,7 @@
             </a:pPr>
             <a:fld id="{00000000-1234-1234-1234-123412341234}" type="slidenum">
               <a:rPr lang="es"/>
-              <a:t>‹#›</a:t>
+              <a:t>‹Nº›</a:t>
             </a:fld>
             <a:endParaRPr/>
           </a:p>
@@ -1884,12 +1949,12 @@
           </a:ln>
         </p:spPr>
         <p:txBody>
-          <a:bodyPr anchorCtr="0" anchor="t" bIns="91425" lIns="91425" spcFirstLastPara="1" rIns="91425" wrap="square" tIns="91425">
+          <a:bodyPr spcFirstLastPara="1" wrap="square" lIns="91425" tIns="91425" rIns="91425" bIns="91425" anchor="t" anchorCtr="0">
             <a:noAutofit/>
           </a:bodyPr>
           <a:lstStyle/>
           <a:p>
-            <a:pPr indent="0" lvl="0" marL="0" rtl="0" algn="l">
+            <a:pPr marL="0" lvl="0" indent="0" algn="l" rtl="0">
               <a:spcBef>
                 <a:spcPts val="0"/>
               </a:spcBef>
@@ -1904,15 +1969,7 @@
                   <a:srgbClr val="999999"/>
                 </a:solidFill>
               </a:rPr>
-              <a:t>Front</a:t>
-            </a:r>
-            <a:r>
-              <a:rPr lang="es">
-                <a:solidFill>
-                  <a:srgbClr val="999999"/>
-                </a:solidFill>
-              </a:rPr>
-              <a:t> End</a:t>
+              <a:t>Front End</a:t>
             </a:r>
             <a:endParaRPr>
               <a:solidFill>
@@ -1931,11 +1988,11 @@
 </file>
 
 <file path=ppt/slideLayouts/slideLayout10.xml><?xml version="1.0" encoding="utf-8"?>
-<p:sldLayout xmlns:a="http://schemas.openxmlformats.org/drawingml/2006/main" xmlns:r="http://schemas.openxmlformats.org/officeDocument/2006/relationships" xmlns:mc="http://schemas.openxmlformats.org/markup-compatibility/2006" xmlns:mv="urn:schemas-microsoft-com:mac:vml" xmlns:p="http://schemas.openxmlformats.org/presentationml/2006/main" xmlns:c="http://schemas.openxmlformats.org/drawingml/2006/chart" xmlns:dgm="http://schemas.openxmlformats.org/drawingml/2006/diagram" xmlns:o="urn:schemas-microsoft-com:office:office" xmlns:v="urn:schemas-microsoft-com:vml" xmlns:pvml="urn:schemas-microsoft-com:office:powerpoint" xmlns:com="http://schemas.openxmlformats.org/drawingml/2006/compatibility" xmlns:p14="http://schemas.microsoft.com/office/powerpoint/2010/main" xmlns:p15="http://schemas.microsoft.com/office/powerpoint/2012/main" matchingName="Big number">
+<p:sldLayout xmlns:a="http://schemas.openxmlformats.org/drawingml/2006/main" xmlns:r="http://schemas.openxmlformats.org/officeDocument/2006/relationships" xmlns:p="http://schemas.openxmlformats.org/presentationml/2006/main" matchingName="Big number">
   <p:cSld name="BIG_NUMBER">
     <p:spTree>
       <p:nvGrpSpPr>
-        <p:cNvPr id="46" name="Shape 46"/>
+        <p:cNvPr id="1" name="Shape 46"/>
         <p:cNvGrpSpPr/>
         <p:nvPr/>
       </p:nvGrpSpPr>
@@ -1950,9 +2007,11 @@
       <p:sp>
         <p:nvSpPr>
           <p:cNvPr id="47" name="Google Shape;47;p11"/>
-          <p:cNvSpPr txBox="1"/>
+          <p:cNvSpPr txBox="1">
+            <a:spLocks noGrp="1"/>
+          </p:cNvSpPr>
           <p:nvPr>
-            <p:ph hasCustomPrompt="1" type="title"/>
+            <p:ph type="title" hasCustomPrompt="1"/>
           </p:nvPr>
         </p:nvSpPr>
         <p:spPr>
@@ -1969,7 +2028,7 @@
           </a:ln>
         </p:spPr>
         <p:txBody>
-          <a:bodyPr anchorCtr="0" anchor="b" bIns="91425" lIns="91425" spcFirstLastPara="1" rIns="91425" wrap="square" tIns="91425">
+          <a:bodyPr spcFirstLastPara="1" wrap="square" lIns="91425" tIns="91425" rIns="91425" bIns="91425" anchor="b" anchorCtr="0">
             <a:noAutofit/>
           </a:bodyPr>
           <a:lstStyle>
@@ -2083,9 +2142,11 @@
       <p:sp>
         <p:nvSpPr>
           <p:cNvPr id="48" name="Google Shape;48;p11"/>
-          <p:cNvSpPr txBox="1"/>
+          <p:cNvSpPr txBox="1">
+            <a:spLocks noGrp="1"/>
+          </p:cNvSpPr>
           <p:nvPr>
-            <p:ph idx="1" type="body"/>
+            <p:ph type="body" idx="1"/>
           </p:nvPr>
         </p:nvSpPr>
         <p:spPr>
@@ -2102,11 +2163,11 @@
           </a:ln>
         </p:spPr>
         <p:txBody>
-          <a:bodyPr anchorCtr="0" anchor="ctr" bIns="91425" lIns="91425" spcFirstLastPara="1" rIns="91425" wrap="square" tIns="91425">
+          <a:bodyPr spcFirstLastPara="1" wrap="square" lIns="91425" tIns="91425" rIns="91425" bIns="91425" anchor="ctr" anchorCtr="0">
             <a:noAutofit/>
           </a:bodyPr>
           <a:lstStyle>
-            <a:lvl1pPr indent="-317500" lvl="0" marL="457200" algn="ctr">
+            <a:lvl1pPr marL="457200" lvl="0" indent="-317500" algn="ctr">
               <a:spcBef>
                 <a:spcPts val="0"/>
               </a:spcBef>
@@ -2117,7 +2178,7 @@
               <a:buChar char="●"/>
               <a:defRPr/>
             </a:lvl1pPr>
-            <a:lvl2pPr indent="-317500" lvl="1" marL="914400" algn="ctr">
+            <a:lvl2pPr marL="914400" lvl="1" indent="-317500" algn="ctr">
               <a:spcBef>
                 <a:spcPts val="0"/>
               </a:spcBef>
@@ -2128,7 +2189,7 @@
               <a:buChar char="○"/>
               <a:defRPr/>
             </a:lvl2pPr>
-            <a:lvl3pPr indent="-317500" lvl="2" marL="1371600" algn="ctr">
+            <a:lvl3pPr marL="1371600" lvl="2" indent="-317500" algn="ctr">
               <a:spcBef>
                 <a:spcPts val="0"/>
               </a:spcBef>
@@ -2139,7 +2200,7 @@
               <a:buChar char="■"/>
               <a:defRPr/>
             </a:lvl3pPr>
-            <a:lvl4pPr indent="-317500" lvl="3" marL="1828800" algn="ctr">
+            <a:lvl4pPr marL="1828800" lvl="3" indent="-317500" algn="ctr">
               <a:spcBef>
                 <a:spcPts val="0"/>
               </a:spcBef>
@@ -2150,7 +2211,7 @@
               <a:buChar char="●"/>
               <a:defRPr/>
             </a:lvl4pPr>
-            <a:lvl5pPr indent="-317500" lvl="4" marL="2286000" algn="ctr">
+            <a:lvl5pPr marL="2286000" lvl="4" indent="-317500" algn="ctr">
               <a:spcBef>
                 <a:spcPts val="0"/>
               </a:spcBef>
@@ -2161,7 +2222,7 @@
               <a:buChar char="○"/>
               <a:defRPr/>
             </a:lvl5pPr>
-            <a:lvl6pPr indent="-317500" lvl="5" marL="2743200" algn="ctr">
+            <a:lvl6pPr marL="2743200" lvl="5" indent="-317500" algn="ctr">
               <a:spcBef>
                 <a:spcPts val="0"/>
               </a:spcBef>
@@ -2172,7 +2233,7 @@
               <a:buChar char="■"/>
               <a:defRPr/>
             </a:lvl6pPr>
-            <a:lvl7pPr indent="-317500" lvl="6" marL="3200400" algn="ctr">
+            <a:lvl7pPr marL="3200400" lvl="6" indent="-317500" algn="ctr">
               <a:spcBef>
                 <a:spcPts val="0"/>
               </a:spcBef>
@@ -2183,7 +2244,7 @@
               <a:buChar char="●"/>
               <a:defRPr/>
             </a:lvl7pPr>
-            <a:lvl8pPr indent="-317500" lvl="7" marL="3657600" algn="ctr">
+            <a:lvl8pPr marL="3657600" lvl="7" indent="-317500" algn="ctr">
               <a:spcBef>
                 <a:spcPts val="0"/>
               </a:spcBef>
@@ -2194,7 +2255,7 @@
               <a:buChar char="○"/>
               <a:defRPr/>
             </a:lvl8pPr>
-            <a:lvl9pPr indent="-317500" lvl="8" marL="4114800" algn="ctr">
+            <a:lvl9pPr marL="4114800" lvl="8" indent="-317500" algn="ctr">
               <a:spcBef>
                 <a:spcPts val="0"/>
               </a:spcBef>
@@ -2206,15 +2267,19 @@
               <a:defRPr/>
             </a:lvl9pPr>
           </a:lstStyle>
-          <a:p/>
+          <a:p>
+            <a:endParaRPr/>
+          </a:p>
         </p:txBody>
       </p:sp>
       <p:sp>
         <p:nvSpPr>
           <p:cNvPr id="49" name="Google Shape;49;p11"/>
-          <p:cNvSpPr txBox="1"/>
+          <p:cNvSpPr txBox="1">
+            <a:spLocks noGrp="1"/>
+          </p:cNvSpPr>
           <p:nvPr>
-            <p:ph idx="12" type="sldNum"/>
+            <p:ph type="sldNum" idx="12"/>
           </p:nvPr>
         </p:nvSpPr>
         <p:spPr>
@@ -2227,7 +2292,7 @@
           </a:prstGeom>
         </p:spPr>
         <p:txBody>
-          <a:bodyPr anchorCtr="0" anchor="ctr" bIns="91425" lIns="91425" spcFirstLastPara="1" rIns="91425" wrap="square" tIns="91425">
+          <a:bodyPr spcFirstLastPara="1" wrap="square" lIns="91425" tIns="91425" rIns="91425" bIns="91425" anchor="ctr" anchorCtr="0">
             <a:noAutofit/>
           </a:bodyPr>
           <a:lstStyle>
@@ -2269,7 +2334,7 @@
             </a:lvl9pPr>
           </a:lstStyle>
           <a:p>
-            <a:pPr indent="0" lvl="0" marL="0" rtl="0" algn="r">
+            <a:pPr marL="0" lvl="0" indent="0" algn="r" rtl="0">
               <a:spcBef>
                 <a:spcPts val="0"/>
               </a:spcBef>
@@ -2280,7 +2345,7 @@
             </a:pPr>
             <a:fld id="{00000000-1234-1234-1234-123412341234}" type="slidenum">
               <a:rPr lang="es"/>
-              <a:t>‹#›</a:t>
+              <a:t>‹Nº›</a:t>
             </a:fld>
             <a:endParaRPr/>
           </a:p>
@@ -2295,11 +2360,11 @@
 </file>
 
 <file path=ppt/slideLayouts/slideLayout11.xml><?xml version="1.0" encoding="utf-8"?>
-<p:sldLayout xmlns:a="http://schemas.openxmlformats.org/drawingml/2006/main" xmlns:r="http://schemas.openxmlformats.org/officeDocument/2006/relationships" xmlns:mc="http://schemas.openxmlformats.org/markup-compatibility/2006" xmlns:mv="urn:schemas-microsoft-com:mac:vml" xmlns:p="http://schemas.openxmlformats.org/presentationml/2006/main" xmlns:c="http://schemas.openxmlformats.org/drawingml/2006/chart" xmlns:dgm="http://schemas.openxmlformats.org/drawingml/2006/diagram" xmlns:o="urn:schemas-microsoft-com:office:office" xmlns:v="urn:schemas-microsoft-com:vml" xmlns:pvml="urn:schemas-microsoft-com:office:powerpoint" xmlns:com="http://schemas.openxmlformats.org/drawingml/2006/compatibility" xmlns:p14="http://schemas.microsoft.com/office/powerpoint/2010/main" xmlns:p15="http://schemas.microsoft.com/office/powerpoint/2012/main" matchingName="Blank" type="blank">
+<p:sldLayout xmlns:a="http://schemas.openxmlformats.org/drawingml/2006/main" xmlns:r="http://schemas.openxmlformats.org/officeDocument/2006/relationships" xmlns:p="http://schemas.openxmlformats.org/presentationml/2006/main" matchingName="Blank" type="blank">
   <p:cSld name="BLANK">
     <p:spTree>
       <p:nvGrpSpPr>
-        <p:cNvPr id="50" name="Shape 50"/>
+        <p:cNvPr id="1" name="Shape 50"/>
         <p:cNvGrpSpPr/>
         <p:nvPr/>
       </p:nvGrpSpPr>
@@ -2314,9 +2379,11 @@
       <p:sp>
         <p:nvSpPr>
           <p:cNvPr id="51" name="Google Shape;51;p12"/>
-          <p:cNvSpPr txBox="1"/>
+          <p:cNvSpPr txBox="1">
+            <a:spLocks noGrp="1"/>
+          </p:cNvSpPr>
           <p:nvPr>
-            <p:ph idx="12" type="sldNum"/>
+            <p:ph type="sldNum" idx="12"/>
           </p:nvPr>
         </p:nvSpPr>
         <p:spPr>
@@ -2329,7 +2396,7 @@
           </a:prstGeom>
         </p:spPr>
         <p:txBody>
-          <a:bodyPr anchorCtr="0" anchor="ctr" bIns="91425" lIns="91425" spcFirstLastPara="1" rIns="91425" wrap="square" tIns="91425">
+          <a:bodyPr spcFirstLastPara="1" wrap="square" lIns="91425" tIns="91425" rIns="91425" bIns="91425" anchor="ctr" anchorCtr="0">
             <a:noAutofit/>
           </a:bodyPr>
           <a:lstStyle>
@@ -2371,7 +2438,7 @@
             </a:lvl9pPr>
           </a:lstStyle>
           <a:p>
-            <a:pPr indent="0" lvl="0" marL="0" rtl="0" algn="r">
+            <a:pPr marL="0" lvl="0" indent="0" algn="r" rtl="0">
               <a:spcBef>
                 <a:spcPts val="0"/>
               </a:spcBef>
@@ -2382,7 +2449,7 @@
             </a:pPr>
             <a:fld id="{00000000-1234-1234-1234-123412341234}" type="slidenum">
               <a:rPr lang="es"/>
-              <a:t>‹#›</a:t>
+              <a:t>‹Nº›</a:t>
             </a:fld>
             <a:endParaRPr/>
           </a:p>
@@ -2397,11 +2464,11 @@
 </file>
 
 <file path=ppt/slideLayouts/slideLayout2.xml><?xml version="1.0" encoding="utf-8"?>
-<p:sldLayout xmlns:a="http://schemas.openxmlformats.org/drawingml/2006/main" xmlns:r="http://schemas.openxmlformats.org/officeDocument/2006/relationships" xmlns:mc="http://schemas.openxmlformats.org/markup-compatibility/2006" xmlns:mv="urn:schemas-microsoft-com:mac:vml" xmlns:p="http://schemas.openxmlformats.org/presentationml/2006/main" xmlns:c="http://schemas.openxmlformats.org/drawingml/2006/chart" xmlns:dgm="http://schemas.openxmlformats.org/drawingml/2006/diagram" xmlns:o="urn:schemas-microsoft-com:office:office" xmlns:v="urn:schemas-microsoft-com:vml" xmlns:pvml="urn:schemas-microsoft-com:office:powerpoint" xmlns:com="http://schemas.openxmlformats.org/drawingml/2006/compatibility" xmlns:p14="http://schemas.microsoft.com/office/powerpoint/2010/main" xmlns:p15="http://schemas.microsoft.com/office/powerpoint/2012/main" matchingName="Section header" type="secHead">
+<p:sldLayout xmlns:a="http://schemas.openxmlformats.org/drawingml/2006/main" xmlns:r="http://schemas.openxmlformats.org/officeDocument/2006/relationships" xmlns:p="http://schemas.openxmlformats.org/presentationml/2006/main" matchingName="Section header" type="secHead">
   <p:cSld name="SECTION_HEADER">
     <p:spTree>
       <p:nvGrpSpPr>
-        <p:cNvPr id="14" name="Shape 14"/>
+        <p:cNvPr id="1" name="Shape 14"/>
         <p:cNvGrpSpPr/>
         <p:nvPr/>
       </p:nvGrpSpPr>
@@ -2416,7 +2483,9 @@
       <p:sp>
         <p:nvSpPr>
           <p:cNvPr id="15" name="Google Shape;15;p3"/>
-          <p:cNvSpPr txBox="1"/>
+          <p:cNvSpPr txBox="1">
+            <a:spLocks noGrp="1"/>
+          </p:cNvSpPr>
           <p:nvPr>
             <p:ph type="title"/>
           </p:nvPr>
@@ -2435,7 +2504,7 @@
           </a:ln>
         </p:spPr>
         <p:txBody>
-          <a:bodyPr anchorCtr="0" anchor="ctr" bIns="91425" lIns="91425" spcFirstLastPara="1" rIns="91425" wrap="square" tIns="91425">
+          <a:bodyPr spcFirstLastPara="1" wrap="square" lIns="91425" tIns="91425" rIns="91425" bIns="91425" anchor="ctr" anchorCtr="0">
             <a:noAutofit/>
           </a:bodyPr>
           <a:lstStyle>
@@ -2539,15 +2608,19 @@
               <a:defRPr sz="3600"/>
             </a:lvl9pPr>
           </a:lstStyle>
-          <a:p/>
+          <a:p>
+            <a:endParaRPr/>
+          </a:p>
         </p:txBody>
       </p:sp>
       <p:sp>
         <p:nvSpPr>
           <p:cNvPr id="16" name="Google Shape;16;p3"/>
-          <p:cNvSpPr txBox="1"/>
+          <p:cNvSpPr txBox="1">
+            <a:spLocks noGrp="1"/>
+          </p:cNvSpPr>
           <p:nvPr>
-            <p:ph idx="12" type="sldNum"/>
+            <p:ph type="sldNum" idx="12"/>
           </p:nvPr>
         </p:nvSpPr>
         <p:spPr>
@@ -2560,7 +2633,7 @@
           </a:prstGeom>
         </p:spPr>
         <p:txBody>
-          <a:bodyPr anchorCtr="0" anchor="ctr" bIns="91425" lIns="91425" spcFirstLastPara="1" rIns="91425" wrap="square" tIns="91425">
+          <a:bodyPr spcFirstLastPara="1" wrap="square" lIns="91425" tIns="91425" rIns="91425" bIns="91425" anchor="ctr" anchorCtr="0">
             <a:noAutofit/>
           </a:bodyPr>
           <a:lstStyle>
@@ -2602,7 +2675,7 @@
             </a:lvl9pPr>
           </a:lstStyle>
           <a:p>
-            <a:pPr indent="0" lvl="0" marL="0" rtl="0" algn="r">
+            <a:pPr marL="0" lvl="0" indent="0" algn="r" rtl="0">
               <a:spcBef>
                 <a:spcPts val="0"/>
               </a:spcBef>
@@ -2613,7 +2686,7 @@
             </a:pPr>
             <a:fld id="{00000000-1234-1234-1234-123412341234}" type="slidenum">
               <a:rPr lang="es"/>
-              <a:t>‹#›</a:t>
+              <a:t>‹Nº›</a:t>
             </a:fld>
             <a:endParaRPr/>
           </a:p>
@@ -2639,12 +2712,12 @@
           </a:ln>
         </p:spPr>
         <p:txBody>
-          <a:bodyPr anchorCtr="0" anchor="t" bIns="91425" lIns="91425" spcFirstLastPara="1" rIns="91425" wrap="square" tIns="91425">
+          <a:bodyPr spcFirstLastPara="1" wrap="square" lIns="91425" tIns="91425" rIns="91425" bIns="91425" anchor="t" anchorCtr="0">
             <a:noAutofit/>
           </a:bodyPr>
           <a:lstStyle/>
           <a:p>
-            <a:pPr indent="0" lvl="0" marL="0" rtl="0" algn="l">
+            <a:pPr marL="0" lvl="0" indent="0" algn="l" rtl="0">
               <a:spcBef>
                 <a:spcPts val="0"/>
               </a:spcBef>
@@ -2678,11 +2751,11 @@
 </file>
 
 <file path=ppt/slideLayouts/slideLayout3.xml><?xml version="1.0" encoding="utf-8"?>
-<p:sldLayout xmlns:a="http://schemas.openxmlformats.org/drawingml/2006/main" xmlns:r="http://schemas.openxmlformats.org/officeDocument/2006/relationships" xmlns:mc="http://schemas.openxmlformats.org/markup-compatibility/2006" xmlns:mv="urn:schemas-microsoft-com:mac:vml" xmlns:p="http://schemas.openxmlformats.org/presentationml/2006/main" xmlns:c="http://schemas.openxmlformats.org/drawingml/2006/chart" xmlns:dgm="http://schemas.openxmlformats.org/drawingml/2006/diagram" xmlns:o="urn:schemas-microsoft-com:office:office" xmlns:v="urn:schemas-microsoft-com:vml" xmlns:pvml="urn:schemas-microsoft-com:office:powerpoint" xmlns:com="http://schemas.openxmlformats.org/drawingml/2006/compatibility" xmlns:p14="http://schemas.microsoft.com/office/powerpoint/2010/main" xmlns:p15="http://schemas.microsoft.com/office/powerpoint/2012/main" matchingName="Title and body" type="tx">
+<p:sldLayout xmlns:a="http://schemas.openxmlformats.org/drawingml/2006/main" xmlns:r="http://schemas.openxmlformats.org/officeDocument/2006/relationships" xmlns:p="http://schemas.openxmlformats.org/presentationml/2006/main" matchingName="Title and body" type="tx">
   <p:cSld name="TITLE_AND_BODY">
     <p:spTree>
       <p:nvGrpSpPr>
-        <p:cNvPr id="18" name="Shape 18"/>
+        <p:cNvPr id="1" name="Shape 18"/>
         <p:cNvGrpSpPr/>
         <p:nvPr/>
       </p:nvGrpSpPr>
@@ -2697,7 +2770,9 @@
       <p:sp>
         <p:nvSpPr>
           <p:cNvPr id="19" name="Google Shape;19;p4"/>
-          <p:cNvSpPr txBox="1"/>
+          <p:cNvSpPr txBox="1">
+            <a:spLocks noGrp="1"/>
+          </p:cNvSpPr>
           <p:nvPr>
             <p:ph type="title"/>
           </p:nvPr>
@@ -2716,7 +2791,7 @@
           </a:ln>
         </p:spPr>
         <p:txBody>
-          <a:bodyPr anchorCtr="0" anchor="ctr" bIns="91425" lIns="91425" spcFirstLastPara="1" rIns="91425" wrap="square" tIns="91425">
+          <a:bodyPr spcFirstLastPara="1" wrap="square" lIns="91425" tIns="91425" rIns="91425" bIns="91425" anchor="ctr" anchorCtr="0">
             <a:noAutofit/>
           </a:bodyPr>
           <a:lstStyle>
@@ -2820,15 +2895,19 @@
               <a:defRPr/>
             </a:lvl9pPr>
           </a:lstStyle>
-          <a:p/>
+          <a:p>
+            <a:endParaRPr/>
+          </a:p>
         </p:txBody>
       </p:sp>
       <p:sp>
         <p:nvSpPr>
           <p:cNvPr id="20" name="Google Shape;20;p4"/>
-          <p:cNvSpPr txBox="1"/>
+          <p:cNvSpPr txBox="1">
+            <a:spLocks noGrp="1"/>
+          </p:cNvSpPr>
           <p:nvPr>
-            <p:ph idx="1" type="body"/>
+            <p:ph type="body" idx="1"/>
           </p:nvPr>
         </p:nvSpPr>
         <p:spPr>
@@ -2845,11 +2924,11 @@
           </a:ln>
         </p:spPr>
         <p:txBody>
-          <a:bodyPr anchorCtr="0" anchor="ctr" bIns="91425" lIns="91425" spcFirstLastPara="1" rIns="91425" wrap="square" tIns="91425">
+          <a:bodyPr spcFirstLastPara="1" wrap="square" lIns="91425" tIns="91425" rIns="91425" bIns="91425" anchor="ctr" anchorCtr="0">
             <a:noAutofit/>
           </a:bodyPr>
           <a:lstStyle>
-            <a:lvl1pPr indent="-317500" lvl="0" marL="457200">
+            <a:lvl1pPr marL="457200" lvl="0" indent="-317500">
               <a:spcBef>
                 <a:spcPts val="0"/>
               </a:spcBef>
@@ -2860,7 +2939,7 @@
               <a:buChar char="●"/>
               <a:defRPr/>
             </a:lvl1pPr>
-            <a:lvl2pPr indent="-317500" lvl="1" marL="914400">
+            <a:lvl2pPr marL="914400" lvl="1" indent="-317500">
               <a:spcBef>
                 <a:spcPts val="0"/>
               </a:spcBef>
@@ -2871,7 +2950,7 @@
               <a:buChar char="○"/>
               <a:defRPr/>
             </a:lvl2pPr>
-            <a:lvl3pPr indent="-317500" lvl="2" marL="1371600">
+            <a:lvl3pPr marL="1371600" lvl="2" indent="-317500">
               <a:spcBef>
                 <a:spcPts val="0"/>
               </a:spcBef>
@@ -2882,7 +2961,7 @@
               <a:buChar char="■"/>
               <a:defRPr/>
             </a:lvl3pPr>
-            <a:lvl4pPr indent="-317500" lvl="3" marL="1828800">
+            <a:lvl4pPr marL="1828800" lvl="3" indent="-317500">
               <a:spcBef>
                 <a:spcPts val="0"/>
               </a:spcBef>
@@ -2893,7 +2972,7 @@
               <a:buChar char="●"/>
               <a:defRPr/>
             </a:lvl4pPr>
-            <a:lvl5pPr indent="-317500" lvl="4" marL="2286000">
+            <a:lvl5pPr marL="2286000" lvl="4" indent="-317500">
               <a:spcBef>
                 <a:spcPts val="0"/>
               </a:spcBef>
@@ -2904,7 +2983,7 @@
               <a:buChar char="○"/>
               <a:defRPr/>
             </a:lvl5pPr>
-            <a:lvl6pPr indent="-317500" lvl="5" marL="2743200">
+            <a:lvl6pPr marL="2743200" lvl="5" indent="-317500">
               <a:spcBef>
                 <a:spcPts val="0"/>
               </a:spcBef>
@@ -2915,7 +2994,7 @@
               <a:buChar char="■"/>
               <a:defRPr/>
             </a:lvl6pPr>
-            <a:lvl7pPr indent="-317500" lvl="6" marL="3200400">
+            <a:lvl7pPr marL="3200400" lvl="6" indent="-317500">
               <a:spcBef>
                 <a:spcPts val="0"/>
               </a:spcBef>
@@ -2926,7 +3005,7 @@
               <a:buChar char="●"/>
               <a:defRPr/>
             </a:lvl7pPr>
-            <a:lvl8pPr indent="-317500" lvl="7" marL="3657600">
+            <a:lvl8pPr marL="3657600" lvl="7" indent="-317500">
               <a:spcBef>
                 <a:spcPts val="0"/>
               </a:spcBef>
@@ -2937,7 +3016,7 @@
               <a:buChar char="○"/>
               <a:defRPr/>
             </a:lvl8pPr>
-            <a:lvl9pPr indent="-317500" lvl="8" marL="4114800">
+            <a:lvl9pPr marL="4114800" lvl="8" indent="-317500">
               <a:spcBef>
                 <a:spcPts val="0"/>
               </a:spcBef>
@@ -2949,15 +3028,19 @@
               <a:defRPr/>
             </a:lvl9pPr>
           </a:lstStyle>
-          <a:p/>
+          <a:p>
+            <a:endParaRPr/>
+          </a:p>
         </p:txBody>
       </p:sp>
       <p:sp>
         <p:nvSpPr>
           <p:cNvPr id="21" name="Google Shape;21;p4"/>
-          <p:cNvSpPr txBox="1"/>
+          <p:cNvSpPr txBox="1">
+            <a:spLocks noGrp="1"/>
+          </p:cNvSpPr>
           <p:nvPr>
-            <p:ph idx="12" type="sldNum"/>
+            <p:ph type="sldNum" idx="12"/>
           </p:nvPr>
         </p:nvSpPr>
         <p:spPr>
@@ -2970,7 +3053,7 @@
           </a:prstGeom>
         </p:spPr>
         <p:txBody>
-          <a:bodyPr anchorCtr="0" anchor="ctr" bIns="91425" lIns="91425" spcFirstLastPara="1" rIns="91425" wrap="square" tIns="91425">
+          <a:bodyPr spcFirstLastPara="1" wrap="square" lIns="91425" tIns="91425" rIns="91425" bIns="91425" anchor="ctr" anchorCtr="0">
             <a:noAutofit/>
           </a:bodyPr>
           <a:lstStyle>
@@ -3012,7 +3095,7 @@
             </a:lvl9pPr>
           </a:lstStyle>
           <a:p>
-            <a:pPr indent="0" lvl="0" marL="0" rtl="0" algn="r">
+            <a:pPr marL="0" lvl="0" indent="0" algn="r" rtl="0">
               <a:spcBef>
                 <a:spcPts val="0"/>
               </a:spcBef>
@@ -3023,7 +3106,7 @@
             </a:pPr>
             <a:fld id="{00000000-1234-1234-1234-123412341234}" type="slidenum">
               <a:rPr lang="es"/>
-              <a:t>‹#›</a:t>
+              <a:t>‹Nº›</a:t>
             </a:fld>
             <a:endParaRPr/>
           </a:p>
@@ -3038,11 +3121,11 @@
 </file>
 
 <file path=ppt/slideLayouts/slideLayout4.xml><?xml version="1.0" encoding="utf-8"?>
-<p:sldLayout xmlns:a="http://schemas.openxmlformats.org/drawingml/2006/main" xmlns:r="http://schemas.openxmlformats.org/officeDocument/2006/relationships" xmlns:mc="http://schemas.openxmlformats.org/markup-compatibility/2006" xmlns:mv="urn:schemas-microsoft-com:mac:vml" xmlns:p="http://schemas.openxmlformats.org/presentationml/2006/main" xmlns:c="http://schemas.openxmlformats.org/drawingml/2006/chart" xmlns:dgm="http://schemas.openxmlformats.org/drawingml/2006/diagram" xmlns:o="urn:schemas-microsoft-com:office:office" xmlns:v="urn:schemas-microsoft-com:vml" xmlns:pvml="urn:schemas-microsoft-com:office:powerpoint" xmlns:com="http://schemas.openxmlformats.org/drawingml/2006/compatibility" xmlns:p14="http://schemas.microsoft.com/office/powerpoint/2010/main" xmlns:p15="http://schemas.microsoft.com/office/powerpoint/2012/main" matchingName="Title and two columns" type="twoColTx">
+<p:sldLayout xmlns:a="http://schemas.openxmlformats.org/drawingml/2006/main" xmlns:r="http://schemas.openxmlformats.org/officeDocument/2006/relationships" xmlns:p="http://schemas.openxmlformats.org/presentationml/2006/main" matchingName="Title and two columns" type="twoColTx">
   <p:cSld name="TITLE_AND_TWO_COLUMNS">
     <p:spTree>
       <p:nvGrpSpPr>
-        <p:cNvPr id="22" name="Shape 22"/>
+        <p:cNvPr id="1" name="Shape 22"/>
         <p:cNvGrpSpPr/>
         <p:nvPr/>
       </p:nvGrpSpPr>
@@ -3057,7 +3140,9 @@
       <p:sp>
         <p:nvSpPr>
           <p:cNvPr id="23" name="Google Shape;23;p5"/>
-          <p:cNvSpPr txBox="1"/>
+          <p:cNvSpPr txBox="1">
+            <a:spLocks noGrp="1"/>
+          </p:cNvSpPr>
           <p:nvPr>
             <p:ph type="title"/>
           </p:nvPr>
@@ -3076,7 +3161,7 @@
           </a:ln>
         </p:spPr>
         <p:txBody>
-          <a:bodyPr anchorCtr="0" anchor="ctr" bIns="91425" lIns="91425" spcFirstLastPara="1" rIns="91425" wrap="square" tIns="91425">
+          <a:bodyPr spcFirstLastPara="1" wrap="square" lIns="91425" tIns="91425" rIns="91425" bIns="91425" anchor="ctr" anchorCtr="0">
             <a:noAutofit/>
           </a:bodyPr>
           <a:lstStyle>
@@ -3180,15 +3265,19 @@
               <a:defRPr/>
             </a:lvl9pPr>
           </a:lstStyle>
-          <a:p/>
+          <a:p>
+            <a:endParaRPr/>
+          </a:p>
         </p:txBody>
       </p:sp>
       <p:sp>
         <p:nvSpPr>
           <p:cNvPr id="24" name="Google Shape;24;p5"/>
-          <p:cNvSpPr txBox="1"/>
+          <p:cNvSpPr txBox="1">
+            <a:spLocks noGrp="1"/>
+          </p:cNvSpPr>
           <p:nvPr>
-            <p:ph idx="1" type="body"/>
+            <p:ph type="body" idx="1"/>
           </p:nvPr>
         </p:nvSpPr>
         <p:spPr>
@@ -3205,11 +3294,11 @@
           </a:ln>
         </p:spPr>
         <p:txBody>
-          <a:bodyPr anchorCtr="0" anchor="ctr" bIns="91425" lIns="91425" spcFirstLastPara="1" rIns="91425" wrap="square" tIns="91425">
+          <a:bodyPr spcFirstLastPara="1" wrap="square" lIns="91425" tIns="91425" rIns="91425" bIns="91425" anchor="ctr" anchorCtr="0">
             <a:noAutofit/>
           </a:bodyPr>
           <a:lstStyle>
-            <a:lvl1pPr indent="-317500" lvl="0" marL="457200">
+            <a:lvl1pPr marL="457200" lvl="0" indent="-317500">
               <a:spcBef>
                 <a:spcPts val="0"/>
               </a:spcBef>
@@ -3220,7 +3309,7 @@
               <a:buChar char="●"/>
               <a:defRPr sz="1400"/>
             </a:lvl1pPr>
-            <a:lvl2pPr indent="-304800" lvl="1" marL="914400">
+            <a:lvl2pPr marL="914400" lvl="1" indent="-304800">
               <a:spcBef>
                 <a:spcPts val="0"/>
               </a:spcBef>
@@ -3231,7 +3320,7 @@
               <a:buChar char="○"/>
               <a:defRPr sz="1200"/>
             </a:lvl2pPr>
-            <a:lvl3pPr indent="-304800" lvl="2" marL="1371600">
+            <a:lvl3pPr marL="1371600" lvl="2" indent="-304800">
               <a:spcBef>
                 <a:spcPts val="0"/>
               </a:spcBef>
@@ -3242,7 +3331,7 @@
               <a:buChar char="■"/>
               <a:defRPr sz="1200"/>
             </a:lvl3pPr>
-            <a:lvl4pPr indent="-304800" lvl="3" marL="1828800">
+            <a:lvl4pPr marL="1828800" lvl="3" indent="-304800">
               <a:spcBef>
                 <a:spcPts val="0"/>
               </a:spcBef>
@@ -3253,7 +3342,7 @@
               <a:buChar char="●"/>
               <a:defRPr sz="1200"/>
             </a:lvl4pPr>
-            <a:lvl5pPr indent="-304800" lvl="4" marL="2286000">
+            <a:lvl5pPr marL="2286000" lvl="4" indent="-304800">
               <a:spcBef>
                 <a:spcPts val="0"/>
               </a:spcBef>
@@ -3264,7 +3353,7 @@
               <a:buChar char="○"/>
               <a:defRPr sz="1200"/>
             </a:lvl5pPr>
-            <a:lvl6pPr indent="-304800" lvl="5" marL="2743200">
+            <a:lvl6pPr marL="2743200" lvl="5" indent="-304800">
               <a:spcBef>
                 <a:spcPts val="0"/>
               </a:spcBef>
@@ -3275,7 +3364,7 @@
               <a:buChar char="■"/>
               <a:defRPr sz="1200"/>
             </a:lvl6pPr>
-            <a:lvl7pPr indent="-304800" lvl="6" marL="3200400">
+            <a:lvl7pPr marL="3200400" lvl="6" indent="-304800">
               <a:spcBef>
                 <a:spcPts val="0"/>
               </a:spcBef>
@@ -3286,7 +3375,7 @@
               <a:buChar char="●"/>
               <a:defRPr sz="1200"/>
             </a:lvl7pPr>
-            <a:lvl8pPr indent="-304800" lvl="7" marL="3657600">
+            <a:lvl8pPr marL="3657600" lvl="7" indent="-304800">
               <a:spcBef>
                 <a:spcPts val="0"/>
               </a:spcBef>
@@ -3297,7 +3386,7 @@
               <a:buChar char="○"/>
               <a:defRPr sz="1200"/>
             </a:lvl8pPr>
-            <a:lvl9pPr indent="-304800" lvl="8" marL="4114800">
+            <a:lvl9pPr marL="4114800" lvl="8" indent="-304800">
               <a:spcBef>
                 <a:spcPts val="0"/>
               </a:spcBef>
@@ -3309,15 +3398,19 @@
               <a:defRPr sz="1200"/>
             </a:lvl9pPr>
           </a:lstStyle>
-          <a:p/>
+          <a:p>
+            <a:endParaRPr/>
+          </a:p>
         </p:txBody>
       </p:sp>
       <p:sp>
         <p:nvSpPr>
           <p:cNvPr id="25" name="Google Shape;25;p5"/>
-          <p:cNvSpPr txBox="1"/>
+          <p:cNvSpPr txBox="1">
+            <a:spLocks noGrp="1"/>
+          </p:cNvSpPr>
           <p:nvPr>
-            <p:ph idx="2" type="body"/>
+            <p:ph type="body" idx="2"/>
           </p:nvPr>
         </p:nvSpPr>
         <p:spPr>
@@ -3334,11 +3427,11 @@
           </a:ln>
         </p:spPr>
         <p:txBody>
-          <a:bodyPr anchorCtr="0" anchor="ctr" bIns="91425" lIns="91425" spcFirstLastPara="1" rIns="91425" wrap="square" tIns="91425">
+          <a:bodyPr spcFirstLastPara="1" wrap="square" lIns="91425" tIns="91425" rIns="91425" bIns="91425" anchor="ctr" anchorCtr="0">
             <a:noAutofit/>
           </a:bodyPr>
           <a:lstStyle>
-            <a:lvl1pPr indent="-317500" lvl="0" marL="457200">
+            <a:lvl1pPr marL="457200" lvl="0" indent="-317500">
               <a:spcBef>
                 <a:spcPts val="0"/>
               </a:spcBef>
@@ -3349,7 +3442,7 @@
               <a:buChar char="●"/>
               <a:defRPr sz="1400"/>
             </a:lvl1pPr>
-            <a:lvl2pPr indent="-304800" lvl="1" marL="914400">
+            <a:lvl2pPr marL="914400" lvl="1" indent="-304800">
               <a:spcBef>
                 <a:spcPts val="0"/>
               </a:spcBef>
@@ -3360,7 +3453,7 @@
               <a:buChar char="○"/>
               <a:defRPr sz="1200"/>
             </a:lvl2pPr>
-            <a:lvl3pPr indent="-304800" lvl="2" marL="1371600">
+            <a:lvl3pPr marL="1371600" lvl="2" indent="-304800">
               <a:spcBef>
                 <a:spcPts val="0"/>
               </a:spcBef>
@@ -3371,7 +3464,7 @@
               <a:buChar char="■"/>
               <a:defRPr sz="1200"/>
             </a:lvl3pPr>
-            <a:lvl4pPr indent="-304800" lvl="3" marL="1828800">
+            <a:lvl4pPr marL="1828800" lvl="3" indent="-304800">
               <a:spcBef>
                 <a:spcPts val="0"/>
               </a:spcBef>
@@ -3382,7 +3475,7 @@
               <a:buChar char="●"/>
               <a:defRPr sz="1200"/>
             </a:lvl4pPr>
-            <a:lvl5pPr indent="-304800" lvl="4" marL="2286000">
+            <a:lvl5pPr marL="2286000" lvl="4" indent="-304800">
               <a:spcBef>
                 <a:spcPts val="0"/>
               </a:spcBef>
@@ -3393,7 +3486,7 @@
               <a:buChar char="○"/>
               <a:defRPr sz="1200"/>
             </a:lvl5pPr>
-            <a:lvl6pPr indent="-304800" lvl="5" marL="2743200">
+            <a:lvl6pPr marL="2743200" lvl="5" indent="-304800">
               <a:spcBef>
                 <a:spcPts val="0"/>
               </a:spcBef>
@@ -3404,7 +3497,7 @@
               <a:buChar char="■"/>
               <a:defRPr sz="1200"/>
             </a:lvl6pPr>
-            <a:lvl7pPr indent="-304800" lvl="6" marL="3200400">
+            <a:lvl7pPr marL="3200400" lvl="6" indent="-304800">
               <a:spcBef>
                 <a:spcPts val="0"/>
               </a:spcBef>
@@ -3415,7 +3508,7 @@
               <a:buChar char="●"/>
               <a:defRPr sz="1200"/>
             </a:lvl7pPr>
-            <a:lvl8pPr indent="-304800" lvl="7" marL="3657600">
+            <a:lvl8pPr marL="3657600" lvl="7" indent="-304800">
               <a:spcBef>
                 <a:spcPts val="0"/>
               </a:spcBef>
@@ -3426,7 +3519,7 @@
               <a:buChar char="○"/>
               <a:defRPr sz="1200"/>
             </a:lvl8pPr>
-            <a:lvl9pPr indent="-304800" lvl="8" marL="4114800">
+            <a:lvl9pPr marL="4114800" lvl="8" indent="-304800">
               <a:spcBef>
                 <a:spcPts val="0"/>
               </a:spcBef>
@@ -3438,15 +3531,19 @@
               <a:defRPr sz="1200"/>
             </a:lvl9pPr>
           </a:lstStyle>
-          <a:p/>
+          <a:p>
+            <a:endParaRPr/>
+          </a:p>
         </p:txBody>
       </p:sp>
       <p:sp>
         <p:nvSpPr>
           <p:cNvPr id="26" name="Google Shape;26;p5"/>
-          <p:cNvSpPr txBox="1"/>
+          <p:cNvSpPr txBox="1">
+            <a:spLocks noGrp="1"/>
+          </p:cNvSpPr>
           <p:nvPr>
-            <p:ph idx="12" type="sldNum"/>
+            <p:ph type="sldNum" idx="12"/>
           </p:nvPr>
         </p:nvSpPr>
         <p:spPr>
@@ -3459,7 +3556,7 @@
           </a:prstGeom>
         </p:spPr>
         <p:txBody>
-          <a:bodyPr anchorCtr="0" anchor="ctr" bIns="91425" lIns="91425" spcFirstLastPara="1" rIns="91425" wrap="square" tIns="91425">
+          <a:bodyPr spcFirstLastPara="1" wrap="square" lIns="91425" tIns="91425" rIns="91425" bIns="91425" anchor="ctr" anchorCtr="0">
             <a:noAutofit/>
           </a:bodyPr>
           <a:lstStyle>
@@ -3501,7 +3598,7 @@
             </a:lvl9pPr>
           </a:lstStyle>
           <a:p>
-            <a:pPr indent="0" lvl="0" marL="0" rtl="0" algn="r">
+            <a:pPr marL="0" lvl="0" indent="0" algn="r" rtl="0">
               <a:spcBef>
                 <a:spcPts val="0"/>
               </a:spcBef>
@@ -3512,7 +3609,7 @@
             </a:pPr>
             <a:fld id="{00000000-1234-1234-1234-123412341234}" type="slidenum">
               <a:rPr lang="es"/>
-              <a:t>‹#›</a:t>
+              <a:t>‹Nº›</a:t>
             </a:fld>
             <a:endParaRPr/>
           </a:p>
@@ -3527,11 +3624,11 @@
 </file>
 
 <file path=ppt/slideLayouts/slideLayout5.xml><?xml version="1.0" encoding="utf-8"?>
-<p:sldLayout xmlns:a="http://schemas.openxmlformats.org/drawingml/2006/main" xmlns:r="http://schemas.openxmlformats.org/officeDocument/2006/relationships" xmlns:mc="http://schemas.openxmlformats.org/markup-compatibility/2006" xmlns:mv="urn:schemas-microsoft-com:mac:vml" xmlns:p="http://schemas.openxmlformats.org/presentationml/2006/main" xmlns:c="http://schemas.openxmlformats.org/drawingml/2006/chart" xmlns:dgm="http://schemas.openxmlformats.org/drawingml/2006/diagram" xmlns:o="urn:schemas-microsoft-com:office:office" xmlns:v="urn:schemas-microsoft-com:vml" xmlns:pvml="urn:schemas-microsoft-com:office:powerpoint" xmlns:com="http://schemas.openxmlformats.org/drawingml/2006/compatibility" xmlns:p14="http://schemas.microsoft.com/office/powerpoint/2010/main" xmlns:p15="http://schemas.microsoft.com/office/powerpoint/2012/main" matchingName="Title only" type="titleOnly">
+<p:sldLayout xmlns:a="http://schemas.openxmlformats.org/drawingml/2006/main" xmlns:r="http://schemas.openxmlformats.org/officeDocument/2006/relationships" xmlns:p="http://schemas.openxmlformats.org/presentationml/2006/main" matchingName="Title only" type="titleOnly">
   <p:cSld name="TITLE_ONLY">
     <p:spTree>
       <p:nvGrpSpPr>
-        <p:cNvPr id="27" name="Shape 27"/>
+        <p:cNvPr id="1" name="Shape 27"/>
         <p:cNvGrpSpPr/>
         <p:nvPr/>
       </p:nvGrpSpPr>
@@ -3546,7 +3643,9 @@
       <p:sp>
         <p:nvSpPr>
           <p:cNvPr id="28" name="Google Shape;28;p6"/>
-          <p:cNvSpPr txBox="1"/>
+          <p:cNvSpPr txBox="1">
+            <a:spLocks noGrp="1"/>
+          </p:cNvSpPr>
           <p:nvPr>
             <p:ph type="title"/>
           </p:nvPr>
@@ -3565,7 +3664,7 @@
           </a:ln>
         </p:spPr>
         <p:txBody>
-          <a:bodyPr anchorCtr="0" anchor="ctr" bIns="91425" lIns="91425" spcFirstLastPara="1" rIns="91425" wrap="square" tIns="91425">
+          <a:bodyPr spcFirstLastPara="1" wrap="square" lIns="91425" tIns="91425" rIns="91425" bIns="91425" anchor="ctr" anchorCtr="0">
             <a:noAutofit/>
           </a:bodyPr>
           <a:lstStyle>
@@ -3669,15 +3768,19 @@
               <a:defRPr/>
             </a:lvl9pPr>
           </a:lstStyle>
-          <a:p/>
+          <a:p>
+            <a:endParaRPr/>
+          </a:p>
         </p:txBody>
       </p:sp>
       <p:sp>
         <p:nvSpPr>
           <p:cNvPr id="29" name="Google Shape;29;p6"/>
-          <p:cNvSpPr txBox="1"/>
+          <p:cNvSpPr txBox="1">
+            <a:spLocks noGrp="1"/>
+          </p:cNvSpPr>
           <p:nvPr>
-            <p:ph idx="12" type="sldNum"/>
+            <p:ph type="sldNum" idx="12"/>
           </p:nvPr>
         </p:nvSpPr>
         <p:spPr>
@@ -3690,7 +3793,7 @@
           </a:prstGeom>
         </p:spPr>
         <p:txBody>
-          <a:bodyPr anchorCtr="0" anchor="ctr" bIns="91425" lIns="91425" spcFirstLastPara="1" rIns="91425" wrap="square" tIns="91425">
+          <a:bodyPr spcFirstLastPara="1" wrap="square" lIns="91425" tIns="91425" rIns="91425" bIns="91425" anchor="ctr" anchorCtr="0">
             <a:noAutofit/>
           </a:bodyPr>
           <a:lstStyle>
@@ -3732,7 +3835,7 @@
             </a:lvl9pPr>
           </a:lstStyle>
           <a:p>
-            <a:pPr indent="0" lvl="0" marL="0" rtl="0" algn="r">
+            <a:pPr marL="0" lvl="0" indent="0" algn="r" rtl="0">
               <a:spcBef>
                 <a:spcPts val="0"/>
               </a:spcBef>
@@ -3743,7 +3846,7 @@
             </a:pPr>
             <a:fld id="{00000000-1234-1234-1234-123412341234}" type="slidenum">
               <a:rPr lang="es"/>
-              <a:t>‹#›</a:t>
+              <a:t>‹Nº›</a:t>
             </a:fld>
             <a:endParaRPr/>
           </a:p>
@@ -3758,11 +3861,11 @@
 </file>
 
 <file path=ppt/slideLayouts/slideLayout6.xml><?xml version="1.0" encoding="utf-8"?>
-<p:sldLayout xmlns:a="http://schemas.openxmlformats.org/drawingml/2006/main" xmlns:r="http://schemas.openxmlformats.org/officeDocument/2006/relationships" xmlns:mc="http://schemas.openxmlformats.org/markup-compatibility/2006" xmlns:mv="urn:schemas-microsoft-com:mac:vml" xmlns:p="http://schemas.openxmlformats.org/presentationml/2006/main" xmlns:c="http://schemas.openxmlformats.org/drawingml/2006/chart" xmlns:dgm="http://schemas.openxmlformats.org/drawingml/2006/diagram" xmlns:o="urn:schemas-microsoft-com:office:office" xmlns:v="urn:schemas-microsoft-com:vml" xmlns:pvml="urn:schemas-microsoft-com:office:powerpoint" xmlns:com="http://schemas.openxmlformats.org/drawingml/2006/compatibility" xmlns:p14="http://schemas.microsoft.com/office/powerpoint/2010/main" xmlns:p15="http://schemas.microsoft.com/office/powerpoint/2012/main" matchingName="One column text">
+<p:sldLayout xmlns:a="http://schemas.openxmlformats.org/drawingml/2006/main" xmlns:r="http://schemas.openxmlformats.org/officeDocument/2006/relationships" xmlns:p="http://schemas.openxmlformats.org/presentationml/2006/main" matchingName="One column text">
   <p:cSld name="ONE_COLUMN_TEXT">
     <p:spTree>
       <p:nvGrpSpPr>
-        <p:cNvPr id="30" name="Shape 30"/>
+        <p:cNvPr id="1" name="Shape 30"/>
         <p:cNvGrpSpPr/>
         <p:nvPr/>
       </p:nvGrpSpPr>
@@ -3777,7 +3880,9 @@
       <p:sp>
         <p:nvSpPr>
           <p:cNvPr id="31" name="Google Shape;31;p7"/>
-          <p:cNvSpPr txBox="1"/>
+          <p:cNvSpPr txBox="1">
+            <a:spLocks noGrp="1"/>
+          </p:cNvSpPr>
           <p:nvPr>
             <p:ph type="title"/>
           </p:nvPr>
@@ -3796,7 +3901,7 @@
           </a:ln>
         </p:spPr>
         <p:txBody>
-          <a:bodyPr anchorCtr="0" anchor="b" bIns="91425" lIns="91425" spcFirstLastPara="1" rIns="91425" wrap="square" tIns="91425">
+          <a:bodyPr spcFirstLastPara="1" wrap="square" lIns="91425" tIns="91425" rIns="91425" bIns="91425" anchor="b" anchorCtr="0">
             <a:noAutofit/>
           </a:bodyPr>
           <a:lstStyle>
@@ -3900,15 +4005,19 @@
               <a:defRPr sz="2400"/>
             </a:lvl9pPr>
           </a:lstStyle>
-          <a:p/>
+          <a:p>
+            <a:endParaRPr/>
+          </a:p>
         </p:txBody>
       </p:sp>
       <p:sp>
         <p:nvSpPr>
           <p:cNvPr id="32" name="Google Shape;32;p7"/>
-          <p:cNvSpPr txBox="1"/>
+          <p:cNvSpPr txBox="1">
+            <a:spLocks noGrp="1"/>
+          </p:cNvSpPr>
           <p:nvPr>
-            <p:ph idx="1" type="body"/>
+            <p:ph type="body" idx="1"/>
           </p:nvPr>
         </p:nvSpPr>
         <p:spPr>
@@ -3925,11 +4034,11 @@
           </a:ln>
         </p:spPr>
         <p:txBody>
-          <a:bodyPr anchorCtr="0" anchor="ctr" bIns="91425" lIns="91425" spcFirstLastPara="1" rIns="91425" wrap="square" tIns="91425">
+          <a:bodyPr spcFirstLastPara="1" wrap="square" lIns="91425" tIns="91425" rIns="91425" bIns="91425" anchor="ctr" anchorCtr="0">
             <a:noAutofit/>
           </a:bodyPr>
           <a:lstStyle>
-            <a:lvl1pPr indent="-304800" lvl="0" marL="457200">
+            <a:lvl1pPr marL="457200" lvl="0" indent="-304800">
               <a:spcBef>
                 <a:spcPts val="0"/>
               </a:spcBef>
@@ -3940,7 +4049,7 @@
               <a:buChar char="●"/>
               <a:defRPr sz="1200"/>
             </a:lvl1pPr>
-            <a:lvl2pPr indent="-304800" lvl="1" marL="914400">
+            <a:lvl2pPr marL="914400" lvl="1" indent="-304800">
               <a:spcBef>
                 <a:spcPts val="0"/>
               </a:spcBef>
@@ -3951,7 +4060,7 @@
               <a:buChar char="○"/>
               <a:defRPr sz="1200"/>
             </a:lvl2pPr>
-            <a:lvl3pPr indent="-304800" lvl="2" marL="1371600">
+            <a:lvl3pPr marL="1371600" lvl="2" indent="-304800">
               <a:spcBef>
                 <a:spcPts val="0"/>
               </a:spcBef>
@@ -3962,7 +4071,7 @@
               <a:buChar char="■"/>
               <a:defRPr sz="1200"/>
             </a:lvl3pPr>
-            <a:lvl4pPr indent="-304800" lvl="3" marL="1828800">
+            <a:lvl4pPr marL="1828800" lvl="3" indent="-304800">
               <a:spcBef>
                 <a:spcPts val="0"/>
               </a:spcBef>
@@ -3973,7 +4082,7 @@
               <a:buChar char="●"/>
               <a:defRPr sz="1200"/>
             </a:lvl4pPr>
-            <a:lvl5pPr indent="-304800" lvl="4" marL="2286000">
+            <a:lvl5pPr marL="2286000" lvl="4" indent="-304800">
               <a:spcBef>
                 <a:spcPts val="0"/>
               </a:spcBef>
@@ -3984,7 +4093,7 @@
               <a:buChar char="○"/>
               <a:defRPr sz="1200"/>
             </a:lvl5pPr>
-            <a:lvl6pPr indent="-304800" lvl="5" marL="2743200">
+            <a:lvl6pPr marL="2743200" lvl="5" indent="-304800">
               <a:spcBef>
                 <a:spcPts val="0"/>
               </a:spcBef>
@@ -3995,7 +4104,7 @@
               <a:buChar char="■"/>
               <a:defRPr sz="1200"/>
             </a:lvl6pPr>
-            <a:lvl7pPr indent="-304800" lvl="6" marL="3200400">
+            <a:lvl7pPr marL="3200400" lvl="6" indent="-304800">
               <a:spcBef>
                 <a:spcPts val="0"/>
               </a:spcBef>
@@ -4006,7 +4115,7 @@
               <a:buChar char="●"/>
               <a:defRPr sz="1200"/>
             </a:lvl7pPr>
-            <a:lvl8pPr indent="-304800" lvl="7" marL="3657600">
+            <a:lvl8pPr marL="3657600" lvl="7" indent="-304800">
               <a:spcBef>
                 <a:spcPts val="0"/>
               </a:spcBef>
@@ -4017,7 +4126,7 @@
               <a:buChar char="○"/>
               <a:defRPr sz="1200"/>
             </a:lvl8pPr>
-            <a:lvl9pPr indent="-304800" lvl="8" marL="4114800">
+            <a:lvl9pPr marL="4114800" lvl="8" indent="-304800">
               <a:spcBef>
                 <a:spcPts val="0"/>
               </a:spcBef>
@@ -4029,15 +4138,19 @@
               <a:defRPr sz="1200"/>
             </a:lvl9pPr>
           </a:lstStyle>
-          <a:p/>
+          <a:p>
+            <a:endParaRPr/>
+          </a:p>
         </p:txBody>
       </p:sp>
       <p:sp>
         <p:nvSpPr>
           <p:cNvPr id="33" name="Google Shape;33;p7"/>
-          <p:cNvSpPr txBox="1"/>
+          <p:cNvSpPr txBox="1">
+            <a:spLocks noGrp="1"/>
+          </p:cNvSpPr>
           <p:nvPr>
-            <p:ph idx="12" type="sldNum"/>
+            <p:ph type="sldNum" idx="12"/>
           </p:nvPr>
         </p:nvSpPr>
         <p:spPr>
@@ -4050,7 +4163,7 @@
           </a:prstGeom>
         </p:spPr>
         <p:txBody>
-          <a:bodyPr anchorCtr="0" anchor="ctr" bIns="91425" lIns="91425" spcFirstLastPara="1" rIns="91425" wrap="square" tIns="91425">
+          <a:bodyPr spcFirstLastPara="1" wrap="square" lIns="91425" tIns="91425" rIns="91425" bIns="91425" anchor="ctr" anchorCtr="0">
             <a:noAutofit/>
           </a:bodyPr>
           <a:lstStyle>
@@ -4092,7 +4205,7 @@
             </a:lvl9pPr>
           </a:lstStyle>
           <a:p>
-            <a:pPr indent="0" lvl="0" marL="0" rtl="0" algn="r">
+            <a:pPr marL="0" lvl="0" indent="0" algn="r" rtl="0">
               <a:spcBef>
                 <a:spcPts val="0"/>
               </a:spcBef>
@@ -4103,7 +4216,7 @@
             </a:pPr>
             <a:fld id="{00000000-1234-1234-1234-123412341234}" type="slidenum">
               <a:rPr lang="es"/>
-              <a:t>‹#›</a:t>
+              <a:t>‹Nº›</a:t>
             </a:fld>
             <a:endParaRPr/>
           </a:p>
@@ -4118,11 +4231,11 @@
 </file>
 
 <file path=ppt/slideLayouts/slideLayout7.xml><?xml version="1.0" encoding="utf-8"?>
-<p:sldLayout xmlns:a="http://schemas.openxmlformats.org/drawingml/2006/main" xmlns:r="http://schemas.openxmlformats.org/officeDocument/2006/relationships" xmlns:mc="http://schemas.openxmlformats.org/markup-compatibility/2006" xmlns:mv="urn:schemas-microsoft-com:mac:vml" xmlns:p="http://schemas.openxmlformats.org/presentationml/2006/main" xmlns:c="http://schemas.openxmlformats.org/drawingml/2006/chart" xmlns:dgm="http://schemas.openxmlformats.org/drawingml/2006/diagram" xmlns:o="urn:schemas-microsoft-com:office:office" xmlns:v="urn:schemas-microsoft-com:vml" xmlns:pvml="urn:schemas-microsoft-com:office:powerpoint" xmlns:com="http://schemas.openxmlformats.org/drawingml/2006/compatibility" xmlns:p14="http://schemas.microsoft.com/office/powerpoint/2010/main" xmlns:p15="http://schemas.microsoft.com/office/powerpoint/2012/main" matchingName="Main point">
+<p:sldLayout xmlns:a="http://schemas.openxmlformats.org/drawingml/2006/main" xmlns:r="http://schemas.openxmlformats.org/officeDocument/2006/relationships" xmlns:p="http://schemas.openxmlformats.org/presentationml/2006/main" matchingName="Main point">
   <p:cSld name="MAIN_POINT">
     <p:spTree>
       <p:nvGrpSpPr>
-        <p:cNvPr id="34" name="Shape 34"/>
+        <p:cNvPr id="1" name="Shape 34"/>
         <p:cNvGrpSpPr/>
         <p:nvPr/>
       </p:nvGrpSpPr>
@@ -4137,7 +4250,9 @@
       <p:sp>
         <p:nvSpPr>
           <p:cNvPr id="35" name="Google Shape;35;p8"/>
-          <p:cNvSpPr txBox="1"/>
+          <p:cNvSpPr txBox="1">
+            <a:spLocks noGrp="1"/>
+          </p:cNvSpPr>
           <p:nvPr>
             <p:ph type="title"/>
           </p:nvPr>
@@ -4156,7 +4271,7 @@
           </a:ln>
         </p:spPr>
         <p:txBody>
-          <a:bodyPr anchorCtr="0" anchor="ctr" bIns="91425" lIns="91425" spcFirstLastPara="1" rIns="91425" wrap="square" tIns="91425">
+          <a:bodyPr spcFirstLastPara="1" wrap="square" lIns="91425" tIns="91425" rIns="91425" bIns="91425" anchor="ctr" anchorCtr="0">
             <a:noAutofit/>
           </a:bodyPr>
           <a:lstStyle>
@@ -4260,15 +4375,19 @@
               <a:defRPr sz="4800"/>
             </a:lvl9pPr>
           </a:lstStyle>
-          <a:p/>
+          <a:p>
+            <a:endParaRPr/>
+          </a:p>
         </p:txBody>
       </p:sp>
       <p:sp>
         <p:nvSpPr>
           <p:cNvPr id="36" name="Google Shape;36;p8"/>
-          <p:cNvSpPr txBox="1"/>
+          <p:cNvSpPr txBox="1">
+            <a:spLocks noGrp="1"/>
+          </p:cNvSpPr>
           <p:nvPr>
-            <p:ph idx="12" type="sldNum"/>
+            <p:ph type="sldNum" idx="12"/>
           </p:nvPr>
         </p:nvSpPr>
         <p:spPr>
@@ -4281,7 +4400,7 @@
           </a:prstGeom>
         </p:spPr>
         <p:txBody>
-          <a:bodyPr anchorCtr="0" anchor="ctr" bIns="91425" lIns="91425" spcFirstLastPara="1" rIns="91425" wrap="square" tIns="91425">
+          <a:bodyPr spcFirstLastPara="1" wrap="square" lIns="91425" tIns="91425" rIns="91425" bIns="91425" anchor="ctr" anchorCtr="0">
             <a:noAutofit/>
           </a:bodyPr>
           <a:lstStyle>
@@ -4323,7 +4442,7 @@
             </a:lvl9pPr>
           </a:lstStyle>
           <a:p>
-            <a:pPr indent="0" lvl="0" marL="0" rtl="0" algn="r">
+            <a:pPr marL="0" lvl="0" indent="0" algn="r" rtl="0">
               <a:spcBef>
                 <a:spcPts val="0"/>
               </a:spcBef>
@@ -4334,7 +4453,7 @@
             </a:pPr>
             <a:fld id="{00000000-1234-1234-1234-123412341234}" type="slidenum">
               <a:rPr lang="es"/>
-              <a:t>‹#›</a:t>
+              <a:t>‹Nº›</a:t>
             </a:fld>
             <a:endParaRPr/>
           </a:p>
@@ -4349,11 +4468,11 @@
 </file>
 
 <file path=ppt/slideLayouts/slideLayout8.xml><?xml version="1.0" encoding="utf-8"?>
-<p:sldLayout xmlns:a="http://schemas.openxmlformats.org/drawingml/2006/main" xmlns:r="http://schemas.openxmlformats.org/officeDocument/2006/relationships" xmlns:mc="http://schemas.openxmlformats.org/markup-compatibility/2006" xmlns:mv="urn:schemas-microsoft-com:mac:vml" xmlns:p="http://schemas.openxmlformats.org/presentationml/2006/main" xmlns:c="http://schemas.openxmlformats.org/drawingml/2006/chart" xmlns:dgm="http://schemas.openxmlformats.org/drawingml/2006/diagram" xmlns:o="urn:schemas-microsoft-com:office:office" xmlns:v="urn:schemas-microsoft-com:vml" xmlns:pvml="urn:schemas-microsoft-com:office:powerpoint" xmlns:com="http://schemas.openxmlformats.org/drawingml/2006/compatibility" xmlns:p14="http://schemas.microsoft.com/office/powerpoint/2010/main" xmlns:p15="http://schemas.microsoft.com/office/powerpoint/2012/main" matchingName="Section title and description">
+<p:sldLayout xmlns:a="http://schemas.openxmlformats.org/drawingml/2006/main" xmlns:r="http://schemas.openxmlformats.org/officeDocument/2006/relationships" xmlns:p="http://schemas.openxmlformats.org/presentationml/2006/main" matchingName="Section title and description">
   <p:cSld name="SECTION_TITLE_AND_DESCRIPTION">
     <p:spTree>
       <p:nvGrpSpPr>
-        <p:cNvPr id="37" name="Shape 37"/>
+        <p:cNvPr id="1" name="Shape 37"/>
         <p:cNvGrpSpPr/>
         <p:nvPr/>
       </p:nvGrpSpPr>
@@ -4387,12 +4506,12 @@
           </a:ln>
         </p:spPr>
         <p:txBody>
-          <a:bodyPr anchorCtr="0" anchor="ctr" bIns="91425" lIns="91425" spcFirstLastPara="1" rIns="91425" wrap="square" tIns="91425">
+          <a:bodyPr spcFirstLastPara="1" wrap="square" lIns="91425" tIns="91425" rIns="91425" bIns="91425" anchor="ctr" anchorCtr="0">
             <a:noAutofit/>
           </a:bodyPr>
           <a:lstStyle/>
           <a:p>
-            <a:pPr indent="0" lvl="0" marL="0" rtl="0" algn="l">
+            <a:pPr marL="0" lvl="0" indent="0" algn="l" rtl="0">
               <a:spcBef>
                 <a:spcPts val="0"/>
               </a:spcBef>
@@ -4401,9 +4520,6 @@
               </a:spcAft>
               <a:buNone/>
             </a:pPr>
-            <a:r>
-              <a:t/>
-            </a:r>
             <a:endParaRPr/>
           </a:p>
         </p:txBody>
@@ -4411,7 +4527,9 @@
       <p:sp>
         <p:nvSpPr>
           <p:cNvPr id="39" name="Google Shape;39;p9"/>
-          <p:cNvSpPr txBox="1"/>
+          <p:cNvSpPr txBox="1">
+            <a:spLocks noGrp="1"/>
+          </p:cNvSpPr>
           <p:nvPr>
             <p:ph type="title"/>
           </p:nvPr>
@@ -4430,7 +4548,7 @@
           </a:ln>
         </p:spPr>
         <p:txBody>
-          <a:bodyPr anchorCtr="0" anchor="b" bIns="91425" lIns="91425" spcFirstLastPara="1" rIns="91425" wrap="square" tIns="91425">
+          <a:bodyPr spcFirstLastPara="1" wrap="square" lIns="91425" tIns="91425" rIns="91425" bIns="91425" anchor="b" anchorCtr="0">
             <a:noAutofit/>
           </a:bodyPr>
           <a:lstStyle>
@@ -4534,15 +4652,19 @@
               <a:defRPr sz="4200"/>
             </a:lvl9pPr>
           </a:lstStyle>
-          <a:p/>
+          <a:p>
+            <a:endParaRPr/>
+          </a:p>
         </p:txBody>
       </p:sp>
       <p:sp>
         <p:nvSpPr>
           <p:cNvPr id="40" name="Google Shape;40;p9"/>
-          <p:cNvSpPr txBox="1"/>
+          <p:cNvSpPr txBox="1">
+            <a:spLocks noGrp="1"/>
+          </p:cNvSpPr>
           <p:nvPr>
-            <p:ph idx="1" type="subTitle"/>
+            <p:ph type="subTitle" idx="1"/>
           </p:nvPr>
         </p:nvSpPr>
         <p:spPr>
@@ -4559,7 +4681,7 @@
           </a:ln>
         </p:spPr>
         <p:txBody>
-          <a:bodyPr anchorCtr="0" anchor="ctr" bIns="91425" lIns="91425" spcFirstLastPara="1" rIns="91425" wrap="square" tIns="91425">
+          <a:bodyPr spcFirstLastPara="1" wrap="square" lIns="91425" tIns="91425" rIns="91425" bIns="91425" anchor="ctr" anchorCtr="0">
             <a:noAutofit/>
           </a:bodyPr>
           <a:lstStyle>
@@ -4690,15 +4812,19 @@
               <a:defRPr sz="2100"/>
             </a:lvl9pPr>
           </a:lstStyle>
-          <a:p/>
+          <a:p>
+            <a:endParaRPr/>
+          </a:p>
         </p:txBody>
       </p:sp>
       <p:sp>
         <p:nvSpPr>
           <p:cNvPr id="41" name="Google Shape;41;p9"/>
-          <p:cNvSpPr txBox="1"/>
+          <p:cNvSpPr txBox="1">
+            <a:spLocks noGrp="1"/>
+          </p:cNvSpPr>
           <p:nvPr>
-            <p:ph idx="2" type="body"/>
+            <p:ph type="body" idx="2"/>
           </p:nvPr>
         </p:nvSpPr>
         <p:spPr>
@@ -4715,11 +4841,11 @@
           </a:ln>
         </p:spPr>
         <p:txBody>
-          <a:bodyPr anchorCtr="0" anchor="ctr" bIns="91425" lIns="91425" spcFirstLastPara="1" rIns="91425" wrap="square" tIns="91425">
+          <a:bodyPr spcFirstLastPara="1" wrap="square" lIns="91425" tIns="91425" rIns="91425" bIns="91425" anchor="ctr" anchorCtr="0">
             <a:noAutofit/>
           </a:bodyPr>
           <a:lstStyle>
-            <a:lvl1pPr indent="-317500" lvl="0" marL="457200">
+            <a:lvl1pPr marL="457200" lvl="0" indent="-317500">
               <a:spcBef>
                 <a:spcPts val="0"/>
               </a:spcBef>
@@ -4730,7 +4856,7 @@
               <a:buChar char="●"/>
               <a:defRPr/>
             </a:lvl1pPr>
-            <a:lvl2pPr indent="-317500" lvl="1" marL="914400">
+            <a:lvl2pPr marL="914400" lvl="1" indent="-317500">
               <a:spcBef>
                 <a:spcPts val="0"/>
               </a:spcBef>
@@ -4741,7 +4867,7 @@
               <a:buChar char="○"/>
               <a:defRPr/>
             </a:lvl2pPr>
-            <a:lvl3pPr indent="-317500" lvl="2" marL="1371600">
+            <a:lvl3pPr marL="1371600" lvl="2" indent="-317500">
               <a:spcBef>
                 <a:spcPts val="0"/>
               </a:spcBef>
@@ -4752,7 +4878,7 @@
               <a:buChar char="■"/>
               <a:defRPr/>
             </a:lvl3pPr>
-            <a:lvl4pPr indent="-317500" lvl="3" marL="1828800">
+            <a:lvl4pPr marL="1828800" lvl="3" indent="-317500">
               <a:spcBef>
                 <a:spcPts val="0"/>
               </a:spcBef>
@@ -4763,7 +4889,7 @@
               <a:buChar char="●"/>
               <a:defRPr/>
             </a:lvl4pPr>
-            <a:lvl5pPr indent="-317500" lvl="4" marL="2286000">
+            <a:lvl5pPr marL="2286000" lvl="4" indent="-317500">
               <a:spcBef>
                 <a:spcPts val="0"/>
               </a:spcBef>
@@ -4774,7 +4900,7 @@
               <a:buChar char="○"/>
               <a:defRPr/>
             </a:lvl5pPr>
-            <a:lvl6pPr indent="-317500" lvl="5" marL="2743200">
+            <a:lvl6pPr marL="2743200" lvl="5" indent="-317500">
               <a:spcBef>
                 <a:spcPts val="0"/>
               </a:spcBef>
@@ -4785,7 +4911,7 @@
               <a:buChar char="■"/>
               <a:defRPr/>
             </a:lvl6pPr>
-            <a:lvl7pPr indent="-317500" lvl="6" marL="3200400">
+            <a:lvl7pPr marL="3200400" lvl="6" indent="-317500">
               <a:spcBef>
                 <a:spcPts val="0"/>
               </a:spcBef>
@@ -4796,7 +4922,7 @@
               <a:buChar char="●"/>
               <a:defRPr/>
             </a:lvl7pPr>
-            <a:lvl8pPr indent="-317500" lvl="7" marL="3657600">
+            <a:lvl8pPr marL="3657600" lvl="7" indent="-317500">
               <a:spcBef>
                 <a:spcPts val="0"/>
               </a:spcBef>
@@ -4807,7 +4933,7 @@
               <a:buChar char="○"/>
               <a:defRPr/>
             </a:lvl8pPr>
-            <a:lvl9pPr indent="-317500" lvl="8" marL="4114800">
+            <a:lvl9pPr marL="4114800" lvl="8" indent="-317500">
               <a:spcBef>
                 <a:spcPts val="0"/>
               </a:spcBef>
@@ -4819,15 +4945,19 @@
               <a:defRPr/>
             </a:lvl9pPr>
           </a:lstStyle>
-          <a:p/>
+          <a:p>
+            <a:endParaRPr/>
+          </a:p>
         </p:txBody>
       </p:sp>
       <p:sp>
         <p:nvSpPr>
           <p:cNvPr id="42" name="Google Shape;42;p9"/>
-          <p:cNvSpPr txBox="1"/>
+          <p:cNvSpPr txBox="1">
+            <a:spLocks noGrp="1"/>
+          </p:cNvSpPr>
           <p:nvPr>
-            <p:ph idx="12" type="sldNum"/>
+            <p:ph type="sldNum" idx="12"/>
           </p:nvPr>
         </p:nvSpPr>
         <p:spPr>
@@ -4840,7 +4970,7 @@
           </a:prstGeom>
         </p:spPr>
         <p:txBody>
-          <a:bodyPr anchorCtr="0" anchor="ctr" bIns="91425" lIns="91425" spcFirstLastPara="1" rIns="91425" wrap="square" tIns="91425">
+          <a:bodyPr spcFirstLastPara="1" wrap="square" lIns="91425" tIns="91425" rIns="91425" bIns="91425" anchor="ctr" anchorCtr="0">
             <a:noAutofit/>
           </a:bodyPr>
           <a:lstStyle>
@@ -4882,7 +5012,7 @@
             </a:lvl9pPr>
           </a:lstStyle>
           <a:p>
-            <a:pPr indent="0" lvl="0" marL="0" rtl="0" algn="r">
+            <a:pPr marL="0" lvl="0" indent="0" algn="r" rtl="0">
               <a:spcBef>
                 <a:spcPts val="0"/>
               </a:spcBef>
@@ -4893,7 +5023,7 @@
             </a:pPr>
             <a:fld id="{00000000-1234-1234-1234-123412341234}" type="slidenum">
               <a:rPr lang="es"/>
-              <a:t>‹#›</a:t>
+              <a:t>‹Nº›</a:t>
             </a:fld>
             <a:endParaRPr/>
           </a:p>
@@ -4908,11 +5038,11 @@
 </file>
 
 <file path=ppt/slideLayouts/slideLayout9.xml><?xml version="1.0" encoding="utf-8"?>
-<p:sldLayout xmlns:a="http://schemas.openxmlformats.org/drawingml/2006/main" xmlns:r="http://schemas.openxmlformats.org/officeDocument/2006/relationships" xmlns:mc="http://schemas.openxmlformats.org/markup-compatibility/2006" xmlns:mv="urn:schemas-microsoft-com:mac:vml" xmlns:p="http://schemas.openxmlformats.org/presentationml/2006/main" xmlns:c="http://schemas.openxmlformats.org/drawingml/2006/chart" xmlns:dgm="http://schemas.openxmlformats.org/drawingml/2006/diagram" xmlns:o="urn:schemas-microsoft-com:office:office" xmlns:v="urn:schemas-microsoft-com:vml" xmlns:pvml="urn:schemas-microsoft-com:office:powerpoint" xmlns:com="http://schemas.openxmlformats.org/drawingml/2006/compatibility" xmlns:p14="http://schemas.microsoft.com/office/powerpoint/2010/main" xmlns:p15="http://schemas.microsoft.com/office/powerpoint/2012/main" matchingName="Caption">
+<p:sldLayout xmlns:a="http://schemas.openxmlformats.org/drawingml/2006/main" xmlns:r="http://schemas.openxmlformats.org/officeDocument/2006/relationships" xmlns:p="http://schemas.openxmlformats.org/presentationml/2006/main" matchingName="Caption">
   <p:cSld name="CAPTION_ONLY">
     <p:spTree>
       <p:nvGrpSpPr>
-        <p:cNvPr id="43" name="Shape 43"/>
+        <p:cNvPr id="1" name="Shape 43"/>
         <p:cNvGrpSpPr/>
         <p:nvPr/>
       </p:nvGrpSpPr>
@@ -4927,9 +5057,11 @@
       <p:sp>
         <p:nvSpPr>
           <p:cNvPr id="44" name="Google Shape;44;p10"/>
-          <p:cNvSpPr txBox="1"/>
+          <p:cNvSpPr txBox="1">
+            <a:spLocks noGrp="1"/>
+          </p:cNvSpPr>
           <p:nvPr>
-            <p:ph idx="1" type="body"/>
+            <p:ph type="body" idx="1"/>
           </p:nvPr>
         </p:nvSpPr>
         <p:spPr>
@@ -4946,11 +5078,11 @@
           </a:ln>
         </p:spPr>
         <p:txBody>
-          <a:bodyPr anchorCtr="0" anchor="ctr" bIns="91425" lIns="91425" spcFirstLastPara="1" rIns="91425" wrap="square" tIns="91425">
+          <a:bodyPr spcFirstLastPara="1" wrap="square" lIns="91425" tIns="91425" rIns="91425" bIns="91425" anchor="ctr" anchorCtr="0">
             <a:noAutofit/>
           </a:bodyPr>
           <a:lstStyle>
-            <a:lvl1pPr indent="-228600" lvl="0" marL="457200">
+            <a:lvl1pPr marL="457200" lvl="0" indent="-228600">
               <a:lnSpc>
                 <a:spcPct val="100000"/>
               </a:lnSpc>
@@ -4965,15 +5097,19 @@
               <a:defRPr/>
             </a:lvl1pPr>
           </a:lstStyle>
-          <a:p/>
+          <a:p>
+            <a:endParaRPr/>
+          </a:p>
         </p:txBody>
       </p:sp>
       <p:sp>
         <p:nvSpPr>
           <p:cNvPr id="45" name="Google Shape;45;p10"/>
-          <p:cNvSpPr txBox="1"/>
+          <p:cNvSpPr txBox="1">
+            <a:spLocks noGrp="1"/>
+          </p:cNvSpPr>
           <p:nvPr>
-            <p:ph idx="12" type="sldNum"/>
+            <p:ph type="sldNum" idx="12"/>
           </p:nvPr>
         </p:nvSpPr>
         <p:spPr>
@@ -4986,7 +5122,7 @@
           </a:prstGeom>
         </p:spPr>
         <p:txBody>
-          <a:bodyPr anchorCtr="0" anchor="ctr" bIns="91425" lIns="91425" spcFirstLastPara="1" rIns="91425" wrap="square" tIns="91425">
+          <a:bodyPr spcFirstLastPara="1" wrap="square" lIns="91425" tIns="91425" rIns="91425" bIns="91425" anchor="ctr" anchorCtr="0">
             <a:noAutofit/>
           </a:bodyPr>
           <a:lstStyle>
@@ -5028,7 +5164,7 @@
             </a:lvl9pPr>
           </a:lstStyle>
           <a:p>
-            <a:pPr indent="0" lvl="0" marL="0" rtl="0" algn="r">
+            <a:pPr marL="0" lvl="0" indent="0" algn="r" rtl="0">
               <a:spcBef>
                 <a:spcPts val="0"/>
               </a:spcBef>
@@ -5039,7 +5175,7 @@
             </a:pPr>
             <a:fld id="{00000000-1234-1234-1234-123412341234}" type="slidenum">
               <a:rPr lang="es"/>
-              <a:t>‹#›</a:t>
+              <a:t>‹Nº›</a:t>
             </a:fld>
             <a:endParaRPr/>
           </a:p>
@@ -5054,18 +5190,19 @@
 </file>
 
 <file path=ppt/slideMasters/slideMaster1.xml><?xml version="1.0" encoding="utf-8"?>
-<p:sldMaster xmlns:a="http://schemas.openxmlformats.org/drawingml/2006/main" xmlns:r="http://schemas.openxmlformats.org/officeDocument/2006/relationships" xmlns:mc="http://schemas.openxmlformats.org/markup-compatibility/2006" xmlns:mv="urn:schemas-microsoft-com:mac:vml" xmlns:p="http://schemas.openxmlformats.org/presentationml/2006/main" xmlns:c="http://schemas.openxmlformats.org/drawingml/2006/chart" xmlns:dgm="http://schemas.openxmlformats.org/drawingml/2006/diagram" xmlns:o="urn:schemas-microsoft-com:office:office" xmlns:v="urn:schemas-microsoft-com:vml" xmlns:pvml="urn:schemas-microsoft-com:office:powerpoint" xmlns:com="http://schemas.openxmlformats.org/drawingml/2006/compatibility" xmlns:p14="http://schemas.microsoft.com/office/powerpoint/2010/main" xmlns:p15="http://schemas.microsoft.com/office/powerpoint/2012/main">
+<p:sldMaster xmlns:a="http://schemas.openxmlformats.org/drawingml/2006/main" xmlns:r="http://schemas.openxmlformats.org/officeDocument/2006/relationships" xmlns:p="http://schemas.openxmlformats.org/presentationml/2006/main">
   <p:cSld name="simple-light-2">
     <p:bg>
       <p:bgPr>
         <a:solidFill>
           <a:schemeClr val="lt1"/>
         </a:solidFill>
+        <a:effectLst/>
       </p:bgPr>
     </p:bg>
     <p:spTree>
       <p:nvGrpSpPr>
-        <p:cNvPr id="5" name="Shape 5"/>
+        <p:cNvPr id="1" name="Shape 5"/>
         <p:cNvGrpSpPr/>
         <p:nvPr/>
       </p:nvGrpSpPr>
@@ -5080,9 +5217,11 @@
       <p:sp>
         <p:nvSpPr>
           <p:cNvPr id="6" name="Google Shape;6;p1"/>
-          <p:cNvSpPr txBox="1"/>
+          <p:cNvSpPr txBox="1">
+            <a:spLocks noGrp="1"/>
+          </p:cNvSpPr>
           <p:nvPr>
-            <p:ph idx="12" type="sldNum"/>
+            <p:ph type="sldNum" idx="12"/>
           </p:nvPr>
         </p:nvSpPr>
         <p:spPr>
@@ -5099,7 +5238,7 @@
           </a:ln>
         </p:spPr>
         <p:txBody>
-          <a:bodyPr anchorCtr="0" anchor="ctr" bIns="91425" lIns="91425" spcFirstLastPara="1" rIns="91425" wrap="square" tIns="91425">
+          <a:bodyPr spcFirstLastPara="1" wrap="square" lIns="91425" tIns="91425" rIns="91425" bIns="91425" anchor="ctr" anchorCtr="0">
             <a:noAutofit/>
           </a:bodyPr>
           <a:lstStyle>
@@ -5177,7 +5316,7 @@
             </a:lvl9pPr>
           </a:lstStyle>
           <a:p>
-            <a:pPr indent="0" lvl="0" marL="0" rtl="0" algn="r">
+            <a:pPr marL="0" lvl="0" indent="0" algn="r" rtl="0">
               <a:spcBef>
                 <a:spcPts val="0"/>
               </a:spcBef>
@@ -5188,7 +5327,7 @@
             </a:pPr>
             <a:fld id="{00000000-1234-1234-1234-123412341234}" type="slidenum">
               <a:rPr lang="es"/>
-              <a:t>‹#›</a:t>
+              <a:t>‹Nº›</a:t>
             </a:fld>
             <a:endParaRPr/>
           </a:p>
@@ -5201,7 +5340,7 @@
           <p:nvPr/>
         </p:nvPicPr>
         <p:blipFill>
-          <a:blip r:embed="rId1">
+          <a:blip r:embed="rId13">
             <a:alphaModFix/>
           </a:blip>
           <a:stretch>
@@ -5229,7 +5368,7 @@
           <p:nvPr/>
         </p:nvPicPr>
         <p:blipFill>
-          <a:blip r:embed="rId2">
+          <a:blip r:embed="rId14">
             <a:alphaModFix/>
           </a:blip>
           <a:stretch>
@@ -5252,24 +5391,24 @@
       </p:pic>
     </p:spTree>
   </p:cSld>
-  <p:clrMap accent1="accent1" accent2="accent2" accent3="accent3" accent4="accent4" accent5="accent5" accent6="accent6" bg1="lt1" bg2="dk2" tx1="dk1" tx2="lt2" folHlink="folHlink" hlink="hlink"/>
+  <p:clrMap bg1="lt1" tx1="dk1" bg2="dk2" tx2="lt2" accent1="accent1" accent2="accent2" accent3="accent3" accent4="accent4" accent5="accent5" accent6="accent6" hlink="hlink" folHlink="folHlink"/>
   <p:sldLayoutIdLst>
-    <p:sldLayoutId id="2147483648" r:id="rId3"/>
-    <p:sldLayoutId id="2147483649" r:id="rId4"/>
-    <p:sldLayoutId id="2147483650" r:id="rId5"/>
-    <p:sldLayoutId id="2147483651" r:id="rId6"/>
-    <p:sldLayoutId id="2147483652" r:id="rId7"/>
-    <p:sldLayoutId id="2147483653" r:id="rId8"/>
-    <p:sldLayoutId id="2147483654" r:id="rId9"/>
-    <p:sldLayoutId id="2147483655" r:id="rId10"/>
-    <p:sldLayoutId id="2147483656" r:id="rId11"/>
-    <p:sldLayoutId id="2147483657" r:id="rId12"/>
-    <p:sldLayoutId id="2147483658" r:id="rId13"/>
+    <p:sldLayoutId id="2147483648" r:id="rId1"/>
+    <p:sldLayoutId id="2147483649" r:id="rId2"/>
+    <p:sldLayoutId id="2147483650" r:id="rId3"/>
+    <p:sldLayoutId id="2147483651" r:id="rId4"/>
+    <p:sldLayoutId id="2147483652" r:id="rId5"/>
+    <p:sldLayoutId id="2147483653" r:id="rId6"/>
+    <p:sldLayoutId id="2147483654" r:id="rId7"/>
+    <p:sldLayoutId id="2147483655" r:id="rId8"/>
+    <p:sldLayoutId id="2147483656" r:id="rId9"/>
+    <p:sldLayoutId id="2147483657" r:id="rId10"/>
+    <p:sldLayoutId id="2147483658" r:id="rId11"/>
   </p:sldLayoutIdLst>
-  <p:hf dt="0" ftr="0" hdr="0" sldNum="0"/>
+  <p:hf sldNum="0" hdr="0" ftr="0" dt="0"/>
   <p:txStyles>
     <p:titleStyle>
-      <a:defPPr lvl="0" marR="0" rtl="0" algn="l">
+      <a:defPPr marR="0" lvl="0" algn="l" rtl="0">
         <a:lnSpc>
           <a:spcPct val="100000"/>
         </a:lnSpc>
@@ -5280,7 +5419,7 @@
           <a:spcPts val="0"/>
         </a:spcAft>
       </a:defPPr>
-      <a:lvl1pPr lvl="0" marR="0" rtl="0" algn="l">
+      <a:lvl1pPr marR="0" lvl="0" algn="l" rtl="0">
         <a:lnSpc>
           <a:spcPct val="100000"/>
         </a:lnSpc>
@@ -5294,7 +5433,7 @@
           <a:srgbClr val="000000"/>
         </a:buClr>
         <a:buFont typeface="Arial"/>
-        <a:defRPr b="0" i="0" sz="1400" u="none" cap="none" strike="noStrike">
+        <a:defRPr sz="1400" b="0" i="0" u="none" strike="noStrike" cap="none">
           <a:solidFill>
             <a:srgbClr val="000000"/>
           </a:solidFill>
@@ -5304,7 +5443,7 @@
           <a:sym typeface="Arial"/>
         </a:defRPr>
       </a:lvl1pPr>
-      <a:lvl2pPr lvl="1" marR="0" rtl="0" algn="l">
+      <a:lvl2pPr marR="0" lvl="1" algn="l" rtl="0">
         <a:lnSpc>
           <a:spcPct val="100000"/>
         </a:lnSpc>
@@ -5318,7 +5457,7 @@
           <a:srgbClr val="000000"/>
         </a:buClr>
         <a:buFont typeface="Arial"/>
-        <a:defRPr b="0" i="0" sz="1400" u="none" cap="none" strike="noStrike">
+        <a:defRPr sz="1400" b="0" i="0" u="none" strike="noStrike" cap="none">
           <a:solidFill>
             <a:srgbClr val="000000"/>
           </a:solidFill>
@@ -5328,7 +5467,7 @@
           <a:sym typeface="Arial"/>
         </a:defRPr>
       </a:lvl2pPr>
-      <a:lvl3pPr lvl="2" marR="0" rtl="0" algn="l">
+      <a:lvl3pPr marR="0" lvl="2" algn="l" rtl="0">
         <a:lnSpc>
           <a:spcPct val="100000"/>
         </a:lnSpc>
@@ -5342,7 +5481,7 @@
           <a:srgbClr val="000000"/>
         </a:buClr>
         <a:buFont typeface="Arial"/>
-        <a:defRPr b="0" i="0" sz="1400" u="none" cap="none" strike="noStrike">
+        <a:defRPr sz="1400" b="0" i="0" u="none" strike="noStrike" cap="none">
           <a:solidFill>
             <a:srgbClr val="000000"/>
           </a:solidFill>
@@ -5352,7 +5491,7 @@
           <a:sym typeface="Arial"/>
         </a:defRPr>
       </a:lvl3pPr>
-      <a:lvl4pPr lvl="3" marR="0" rtl="0" algn="l">
+      <a:lvl4pPr marR="0" lvl="3" algn="l" rtl="0">
         <a:lnSpc>
           <a:spcPct val="100000"/>
         </a:lnSpc>
@@ -5366,7 +5505,7 @@
           <a:srgbClr val="000000"/>
         </a:buClr>
         <a:buFont typeface="Arial"/>
-        <a:defRPr b="0" i="0" sz="1400" u="none" cap="none" strike="noStrike">
+        <a:defRPr sz="1400" b="0" i="0" u="none" strike="noStrike" cap="none">
           <a:solidFill>
             <a:srgbClr val="000000"/>
           </a:solidFill>
@@ -5376,7 +5515,7 @@
           <a:sym typeface="Arial"/>
         </a:defRPr>
       </a:lvl4pPr>
-      <a:lvl5pPr lvl="4" marR="0" rtl="0" algn="l">
+      <a:lvl5pPr marR="0" lvl="4" algn="l" rtl="0">
         <a:lnSpc>
           <a:spcPct val="100000"/>
         </a:lnSpc>
@@ -5390,7 +5529,7 @@
           <a:srgbClr val="000000"/>
         </a:buClr>
         <a:buFont typeface="Arial"/>
-        <a:defRPr b="0" i="0" sz="1400" u="none" cap="none" strike="noStrike">
+        <a:defRPr sz="1400" b="0" i="0" u="none" strike="noStrike" cap="none">
           <a:solidFill>
             <a:srgbClr val="000000"/>
           </a:solidFill>
@@ -5400,7 +5539,7 @@
           <a:sym typeface="Arial"/>
         </a:defRPr>
       </a:lvl5pPr>
-      <a:lvl6pPr lvl="5" marR="0" rtl="0" algn="l">
+      <a:lvl6pPr marR="0" lvl="5" algn="l" rtl="0">
         <a:lnSpc>
           <a:spcPct val="100000"/>
         </a:lnSpc>
@@ -5414,7 +5553,7 @@
           <a:srgbClr val="000000"/>
         </a:buClr>
         <a:buFont typeface="Arial"/>
-        <a:defRPr b="0" i="0" sz="1400" u="none" cap="none" strike="noStrike">
+        <a:defRPr sz="1400" b="0" i="0" u="none" strike="noStrike" cap="none">
           <a:solidFill>
             <a:srgbClr val="000000"/>
           </a:solidFill>
@@ -5424,7 +5563,7 @@
           <a:sym typeface="Arial"/>
         </a:defRPr>
       </a:lvl6pPr>
-      <a:lvl7pPr lvl="6" marR="0" rtl="0" algn="l">
+      <a:lvl7pPr marR="0" lvl="6" algn="l" rtl="0">
         <a:lnSpc>
           <a:spcPct val="100000"/>
         </a:lnSpc>
@@ -5438,7 +5577,7 @@
           <a:srgbClr val="000000"/>
         </a:buClr>
         <a:buFont typeface="Arial"/>
-        <a:defRPr b="0" i="0" sz="1400" u="none" cap="none" strike="noStrike">
+        <a:defRPr sz="1400" b="0" i="0" u="none" strike="noStrike" cap="none">
           <a:solidFill>
             <a:srgbClr val="000000"/>
           </a:solidFill>
@@ -5448,7 +5587,7 @@
           <a:sym typeface="Arial"/>
         </a:defRPr>
       </a:lvl7pPr>
-      <a:lvl8pPr lvl="7" marR="0" rtl="0" algn="l">
+      <a:lvl8pPr marR="0" lvl="7" algn="l" rtl="0">
         <a:lnSpc>
           <a:spcPct val="100000"/>
         </a:lnSpc>
@@ -5462,7 +5601,7 @@
           <a:srgbClr val="000000"/>
         </a:buClr>
         <a:buFont typeface="Arial"/>
-        <a:defRPr b="0" i="0" sz="1400" u="none" cap="none" strike="noStrike">
+        <a:defRPr sz="1400" b="0" i="0" u="none" strike="noStrike" cap="none">
           <a:solidFill>
             <a:srgbClr val="000000"/>
           </a:solidFill>
@@ -5472,7 +5611,7 @@
           <a:sym typeface="Arial"/>
         </a:defRPr>
       </a:lvl8pPr>
-      <a:lvl9pPr lvl="8" marR="0" rtl="0" algn="l">
+      <a:lvl9pPr marR="0" lvl="8" algn="l" rtl="0">
         <a:lnSpc>
           <a:spcPct val="100000"/>
         </a:lnSpc>
@@ -5486,7 +5625,7 @@
           <a:srgbClr val="000000"/>
         </a:buClr>
         <a:buFont typeface="Arial"/>
-        <a:defRPr b="0" i="0" sz="1400" u="none" cap="none" strike="noStrike">
+        <a:defRPr sz="1400" b="0" i="0" u="none" strike="noStrike" cap="none">
           <a:solidFill>
             <a:srgbClr val="000000"/>
           </a:solidFill>
@@ -5498,7 +5637,7 @@
       </a:lvl9pPr>
     </p:titleStyle>
     <p:bodyStyle>
-      <a:defPPr lvl="0" marR="0" rtl="0" algn="l">
+      <a:defPPr marR="0" lvl="0" algn="l" rtl="0">
         <a:lnSpc>
           <a:spcPct val="100000"/>
         </a:lnSpc>
@@ -5509,7 +5648,7 @@
           <a:spcPts val="0"/>
         </a:spcAft>
       </a:defPPr>
-      <a:lvl1pPr lvl="0" marR="0" rtl="0" algn="l">
+      <a:lvl1pPr marR="0" lvl="0" algn="l" rtl="0">
         <a:lnSpc>
           <a:spcPct val="100000"/>
         </a:lnSpc>
@@ -5523,7 +5662,7 @@
           <a:srgbClr val="000000"/>
         </a:buClr>
         <a:buFont typeface="Arial"/>
-        <a:defRPr b="0" i="0" sz="1400" u="none" cap="none" strike="noStrike">
+        <a:defRPr sz="1400" b="0" i="0" u="none" strike="noStrike" cap="none">
           <a:solidFill>
             <a:srgbClr val="000000"/>
           </a:solidFill>
@@ -5533,7 +5672,7 @@
           <a:sym typeface="Arial"/>
         </a:defRPr>
       </a:lvl1pPr>
-      <a:lvl2pPr lvl="1" marR="0" rtl="0" algn="l">
+      <a:lvl2pPr marR="0" lvl="1" algn="l" rtl="0">
         <a:lnSpc>
           <a:spcPct val="100000"/>
         </a:lnSpc>
@@ -5547,7 +5686,7 @@
           <a:srgbClr val="000000"/>
         </a:buClr>
         <a:buFont typeface="Arial"/>
-        <a:defRPr b="0" i="0" sz="1400" u="none" cap="none" strike="noStrike">
+        <a:defRPr sz="1400" b="0" i="0" u="none" strike="noStrike" cap="none">
           <a:solidFill>
             <a:srgbClr val="000000"/>
           </a:solidFill>
@@ -5557,7 +5696,7 @@
           <a:sym typeface="Arial"/>
         </a:defRPr>
       </a:lvl2pPr>
-      <a:lvl3pPr lvl="2" marR="0" rtl="0" algn="l">
+      <a:lvl3pPr marR="0" lvl="2" algn="l" rtl="0">
         <a:lnSpc>
           <a:spcPct val="100000"/>
         </a:lnSpc>
@@ -5571,7 +5710,7 @@
           <a:srgbClr val="000000"/>
         </a:buClr>
         <a:buFont typeface="Arial"/>
-        <a:defRPr b="0" i="0" sz="1400" u="none" cap="none" strike="noStrike">
+        <a:defRPr sz="1400" b="0" i="0" u="none" strike="noStrike" cap="none">
           <a:solidFill>
             <a:srgbClr val="000000"/>
           </a:solidFill>
@@ -5581,7 +5720,7 @@
           <a:sym typeface="Arial"/>
         </a:defRPr>
       </a:lvl3pPr>
-      <a:lvl4pPr lvl="3" marR="0" rtl="0" algn="l">
+      <a:lvl4pPr marR="0" lvl="3" algn="l" rtl="0">
         <a:lnSpc>
           <a:spcPct val="100000"/>
         </a:lnSpc>
@@ -5595,7 +5734,7 @@
           <a:srgbClr val="000000"/>
         </a:buClr>
         <a:buFont typeface="Arial"/>
-        <a:defRPr b="0" i="0" sz="1400" u="none" cap="none" strike="noStrike">
+        <a:defRPr sz="1400" b="0" i="0" u="none" strike="noStrike" cap="none">
           <a:solidFill>
             <a:srgbClr val="000000"/>
           </a:solidFill>
@@ -5605,7 +5744,7 @@
           <a:sym typeface="Arial"/>
         </a:defRPr>
       </a:lvl4pPr>
-      <a:lvl5pPr lvl="4" marR="0" rtl="0" algn="l">
+      <a:lvl5pPr marR="0" lvl="4" algn="l" rtl="0">
         <a:lnSpc>
           <a:spcPct val="100000"/>
         </a:lnSpc>
@@ -5619,7 +5758,7 @@
           <a:srgbClr val="000000"/>
         </a:buClr>
         <a:buFont typeface="Arial"/>
-        <a:defRPr b="0" i="0" sz="1400" u="none" cap="none" strike="noStrike">
+        <a:defRPr sz="1400" b="0" i="0" u="none" strike="noStrike" cap="none">
           <a:solidFill>
             <a:srgbClr val="000000"/>
           </a:solidFill>
@@ -5629,7 +5768,7 @@
           <a:sym typeface="Arial"/>
         </a:defRPr>
       </a:lvl5pPr>
-      <a:lvl6pPr lvl="5" marR="0" rtl="0" algn="l">
+      <a:lvl6pPr marR="0" lvl="5" algn="l" rtl="0">
         <a:lnSpc>
           <a:spcPct val="100000"/>
         </a:lnSpc>
@@ -5643,7 +5782,7 @@
           <a:srgbClr val="000000"/>
         </a:buClr>
         <a:buFont typeface="Arial"/>
-        <a:defRPr b="0" i="0" sz="1400" u="none" cap="none" strike="noStrike">
+        <a:defRPr sz="1400" b="0" i="0" u="none" strike="noStrike" cap="none">
           <a:solidFill>
             <a:srgbClr val="000000"/>
           </a:solidFill>
@@ -5653,7 +5792,7 @@
           <a:sym typeface="Arial"/>
         </a:defRPr>
       </a:lvl6pPr>
-      <a:lvl7pPr lvl="6" marR="0" rtl="0" algn="l">
+      <a:lvl7pPr marR="0" lvl="6" algn="l" rtl="0">
         <a:lnSpc>
           <a:spcPct val="100000"/>
         </a:lnSpc>
@@ -5667,7 +5806,7 @@
           <a:srgbClr val="000000"/>
         </a:buClr>
         <a:buFont typeface="Arial"/>
-        <a:defRPr b="0" i="0" sz="1400" u="none" cap="none" strike="noStrike">
+        <a:defRPr sz="1400" b="0" i="0" u="none" strike="noStrike" cap="none">
           <a:solidFill>
             <a:srgbClr val="000000"/>
           </a:solidFill>
@@ -5677,7 +5816,7 @@
           <a:sym typeface="Arial"/>
         </a:defRPr>
       </a:lvl7pPr>
-      <a:lvl8pPr lvl="7" marR="0" rtl="0" algn="l">
+      <a:lvl8pPr marR="0" lvl="7" algn="l" rtl="0">
         <a:lnSpc>
           <a:spcPct val="100000"/>
         </a:lnSpc>
@@ -5691,7 +5830,7 @@
           <a:srgbClr val="000000"/>
         </a:buClr>
         <a:buFont typeface="Arial"/>
-        <a:defRPr b="0" i="0" sz="1400" u="none" cap="none" strike="noStrike">
+        <a:defRPr sz="1400" b="0" i="0" u="none" strike="noStrike" cap="none">
           <a:solidFill>
             <a:srgbClr val="000000"/>
           </a:solidFill>
@@ -5701,7 +5840,7 @@
           <a:sym typeface="Arial"/>
         </a:defRPr>
       </a:lvl8pPr>
-      <a:lvl9pPr lvl="8" marR="0" rtl="0" algn="l">
+      <a:lvl9pPr marR="0" lvl="8" algn="l" rtl="0">
         <a:lnSpc>
           <a:spcPct val="100000"/>
         </a:lnSpc>
@@ -5715,7 +5854,7 @@
           <a:srgbClr val="000000"/>
         </a:buClr>
         <a:buFont typeface="Arial"/>
-        <a:defRPr b="0" i="0" sz="1400" u="none" cap="none" strike="noStrike">
+        <a:defRPr sz="1400" b="0" i="0" u="none" strike="noStrike" cap="none">
           <a:solidFill>
             <a:srgbClr val="000000"/>
           </a:solidFill>
@@ -5727,7 +5866,7 @@
       </a:lvl9pPr>
     </p:bodyStyle>
     <p:otherStyle>
-      <a:defPPr lvl="0" marR="0" rtl="0" algn="l">
+      <a:defPPr marR="0" lvl="0" algn="l" rtl="0">
         <a:lnSpc>
           <a:spcPct val="100000"/>
         </a:lnSpc>
@@ -5738,7 +5877,7 @@
           <a:spcPts val="0"/>
         </a:spcAft>
       </a:defPPr>
-      <a:lvl1pPr lvl="0" marR="0" rtl="0" algn="l">
+      <a:lvl1pPr marR="0" lvl="0" algn="l" rtl="0">
         <a:lnSpc>
           <a:spcPct val="100000"/>
         </a:lnSpc>
@@ -5752,7 +5891,7 @@
           <a:srgbClr val="000000"/>
         </a:buClr>
         <a:buFont typeface="Arial"/>
-        <a:defRPr b="0" i="0" sz="1400" u="none" cap="none" strike="noStrike">
+        <a:defRPr sz="1400" b="0" i="0" u="none" strike="noStrike" cap="none">
           <a:solidFill>
             <a:srgbClr val="000000"/>
           </a:solidFill>
@@ -5762,7 +5901,7 @@
           <a:sym typeface="Arial"/>
         </a:defRPr>
       </a:lvl1pPr>
-      <a:lvl2pPr lvl="1" marR="0" rtl="0" algn="l">
+      <a:lvl2pPr marR="0" lvl="1" algn="l" rtl="0">
         <a:lnSpc>
           <a:spcPct val="100000"/>
         </a:lnSpc>
@@ -5776,7 +5915,7 @@
           <a:srgbClr val="000000"/>
         </a:buClr>
         <a:buFont typeface="Arial"/>
-        <a:defRPr b="0" i="0" sz="1400" u="none" cap="none" strike="noStrike">
+        <a:defRPr sz="1400" b="0" i="0" u="none" strike="noStrike" cap="none">
           <a:solidFill>
             <a:srgbClr val="000000"/>
           </a:solidFill>
@@ -5786,7 +5925,7 @@
           <a:sym typeface="Arial"/>
         </a:defRPr>
       </a:lvl2pPr>
-      <a:lvl3pPr lvl="2" marR="0" rtl="0" algn="l">
+      <a:lvl3pPr marR="0" lvl="2" algn="l" rtl="0">
         <a:lnSpc>
           <a:spcPct val="100000"/>
         </a:lnSpc>
@@ -5800,7 +5939,7 @@
           <a:srgbClr val="000000"/>
         </a:buClr>
         <a:buFont typeface="Arial"/>
-        <a:defRPr b="0" i="0" sz="1400" u="none" cap="none" strike="noStrike">
+        <a:defRPr sz="1400" b="0" i="0" u="none" strike="noStrike" cap="none">
           <a:solidFill>
             <a:srgbClr val="000000"/>
           </a:solidFill>
@@ -5810,7 +5949,7 @@
           <a:sym typeface="Arial"/>
         </a:defRPr>
       </a:lvl3pPr>
-      <a:lvl4pPr lvl="3" marR="0" rtl="0" algn="l">
+      <a:lvl4pPr marR="0" lvl="3" algn="l" rtl="0">
         <a:lnSpc>
           <a:spcPct val="100000"/>
         </a:lnSpc>
@@ -5824,7 +5963,7 @@
           <a:srgbClr val="000000"/>
         </a:buClr>
         <a:buFont typeface="Arial"/>
-        <a:defRPr b="0" i="0" sz="1400" u="none" cap="none" strike="noStrike">
+        <a:defRPr sz="1400" b="0" i="0" u="none" strike="noStrike" cap="none">
           <a:solidFill>
             <a:srgbClr val="000000"/>
           </a:solidFill>
@@ -5834,7 +5973,7 @@
           <a:sym typeface="Arial"/>
         </a:defRPr>
       </a:lvl4pPr>
-      <a:lvl5pPr lvl="4" marR="0" rtl="0" algn="l">
+      <a:lvl5pPr marR="0" lvl="4" algn="l" rtl="0">
         <a:lnSpc>
           <a:spcPct val="100000"/>
         </a:lnSpc>
@@ -5848,7 +5987,7 @@
           <a:srgbClr val="000000"/>
         </a:buClr>
         <a:buFont typeface="Arial"/>
-        <a:defRPr b="0" i="0" sz="1400" u="none" cap="none" strike="noStrike">
+        <a:defRPr sz="1400" b="0" i="0" u="none" strike="noStrike" cap="none">
           <a:solidFill>
             <a:srgbClr val="000000"/>
           </a:solidFill>
@@ -5858,7 +5997,7 @@
           <a:sym typeface="Arial"/>
         </a:defRPr>
       </a:lvl5pPr>
-      <a:lvl6pPr lvl="5" marR="0" rtl="0" algn="l">
+      <a:lvl6pPr marR="0" lvl="5" algn="l" rtl="0">
         <a:lnSpc>
           <a:spcPct val="100000"/>
         </a:lnSpc>
@@ -5872,7 +6011,7 @@
           <a:srgbClr val="000000"/>
         </a:buClr>
         <a:buFont typeface="Arial"/>
-        <a:defRPr b="0" i="0" sz="1400" u="none" cap="none" strike="noStrike">
+        <a:defRPr sz="1400" b="0" i="0" u="none" strike="noStrike" cap="none">
           <a:solidFill>
             <a:srgbClr val="000000"/>
           </a:solidFill>
@@ -5882,7 +6021,7 @@
           <a:sym typeface="Arial"/>
         </a:defRPr>
       </a:lvl6pPr>
-      <a:lvl7pPr lvl="6" marR="0" rtl="0" algn="l">
+      <a:lvl7pPr marR="0" lvl="6" algn="l" rtl="0">
         <a:lnSpc>
           <a:spcPct val="100000"/>
         </a:lnSpc>
@@ -5896,7 +6035,7 @@
           <a:srgbClr val="000000"/>
         </a:buClr>
         <a:buFont typeface="Arial"/>
-        <a:defRPr b="0" i="0" sz="1400" u="none" cap="none" strike="noStrike">
+        <a:defRPr sz="1400" b="0" i="0" u="none" strike="noStrike" cap="none">
           <a:solidFill>
             <a:srgbClr val="000000"/>
           </a:solidFill>
@@ -5906,7 +6045,7 @@
           <a:sym typeface="Arial"/>
         </a:defRPr>
       </a:lvl7pPr>
-      <a:lvl8pPr lvl="7" marR="0" rtl="0" algn="l">
+      <a:lvl8pPr marR="0" lvl="7" algn="l" rtl="0">
         <a:lnSpc>
           <a:spcPct val="100000"/>
         </a:lnSpc>
@@ -5920,7 +6059,7 @@
           <a:srgbClr val="000000"/>
         </a:buClr>
         <a:buFont typeface="Arial"/>
-        <a:defRPr b="0" i="0" sz="1400" u="none" cap="none" strike="noStrike">
+        <a:defRPr sz="1400" b="0" i="0" u="none" strike="noStrike" cap="none">
           <a:solidFill>
             <a:srgbClr val="000000"/>
           </a:solidFill>
@@ -5930,7 +6069,7 @@
           <a:sym typeface="Arial"/>
         </a:defRPr>
       </a:lvl8pPr>
-      <a:lvl9pPr lvl="8" marR="0" rtl="0" algn="l">
+      <a:lvl9pPr marR="0" lvl="8" algn="l" rtl="0">
         <a:lnSpc>
           <a:spcPct val="100000"/>
         </a:lnSpc>
@@ -5944,7 +6083,7 @@
           <a:srgbClr val="000000"/>
         </a:buClr>
         <a:buFont typeface="Arial"/>
-        <a:defRPr b="0" i="0" sz="1400" u="none" cap="none" strike="noStrike">
+        <a:defRPr sz="1400" b="0" i="0" u="none" strike="noStrike" cap="none">
           <a:solidFill>
             <a:srgbClr val="000000"/>
           </a:solidFill>
@@ -5960,11 +6099,11 @@
 </file>
 
 <file path=ppt/slides/slide1.xml><?xml version="1.0" encoding="utf-8"?>
-<p:sld xmlns:a="http://schemas.openxmlformats.org/drawingml/2006/main" xmlns:r="http://schemas.openxmlformats.org/officeDocument/2006/relationships" xmlns:mc="http://schemas.openxmlformats.org/markup-compatibility/2006" xmlns:mv="urn:schemas-microsoft-com:mac:vml" xmlns:p="http://schemas.openxmlformats.org/presentationml/2006/main" xmlns:c="http://schemas.openxmlformats.org/drawingml/2006/chart" xmlns:dgm="http://schemas.openxmlformats.org/drawingml/2006/diagram" xmlns:o="urn:schemas-microsoft-com:office:office" xmlns:v="urn:schemas-microsoft-com:vml" xmlns:pvml="urn:schemas-microsoft-com:office:powerpoint" xmlns:com="http://schemas.openxmlformats.org/drawingml/2006/compatibility" xmlns:p14="http://schemas.microsoft.com/office/powerpoint/2010/main" xmlns:p15="http://schemas.microsoft.com/office/powerpoint/2012/main">
+<p:sld xmlns:a="http://schemas.openxmlformats.org/drawingml/2006/main" xmlns:r="http://schemas.openxmlformats.org/officeDocument/2006/relationships" xmlns:p="http://schemas.openxmlformats.org/presentationml/2006/main">
   <p:cSld>
     <p:spTree>
       <p:nvGrpSpPr>
-        <p:cNvPr id="55" name="Shape 55"/>
+        <p:cNvPr id="1" name="Shape 55"/>
         <p:cNvGrpSpPr/>
         <p:nvPr/>
       </p:nvGrpSpPr>
@@ -5979,7 +6118,9 @@
       <p:sp>
         <p:nvSpPr>
           <p:cNvPr id="56" name="Google Shape;56;p13"/>
-          <p:cNvSpPr txBox="1"/>
+          <p:cNvSpPr txBox="1">
+            <a:spLocks noGrp="1"/>
+          </p:cNvSpPr>
           <p:nvPr>
             <p:ph type="title"/>
           </p:nvPr>
@@ -5994,12 +6135,12 @@
           </a:prstGeom>
         </p:spPr>
         <p:txBody>
-          <a:bodyPr anchorCtr="0" anchor="t" bIns="91425" lIns="91425" spcFirstLastPara="1" rIns="91425" wrap="square" tIns="91425">
+          <a:bodyPr spcFirstLastPara="1" wrap="square" lIns="91425" tIns="91425" rIns="91425" bIns="91425" anchor="t" anchorCtr="0">
             <a:noAutofit/>
           </a:bodyPr>
           <a:lstStyle/>
           <a:p>
-            <a:pPr indent="0" lvl="0" marL="0" marR="0" rtl="0" algn="l">
+            <a:pPr marL="0" marR="0" lvl="0" indent="0" algn="l" rtl="0">
               <a:lnSpc>
                 <a:spcPct val="100000"/>
               </a:lnSpc>
@@ -6012,10 +6153,10 @@
               <a:buNone/>
             </a:pPr>
             <a:r>
-              <a:rPr b="1" lang="es" sz="1800"/>
+              <a:rPr lang="es" sz="1800" b="1"/>
               <a:t>Cómo le damos a una computadora entender algo?</a:t>
             </a:r>
-            <a:endParaRPr b="1" sz="1800"/>
+            <a:endParaRPr sz="1800" b="1"/>
           </a:p>
         </p:txBody>
       </p:sp>
@@ -6028,11 +6169,11 @@
 </file>
 
 <file path=ppt/slides/slide2.xml><?xml version="1.0" encoding="utf-8"?>
-<p:sld xmlns:a="http://schemas.openxmlformats.org/drawingml/2006/main" xmlns:r="http://schemas.openxmlformats.org/officeDocument/2006/relationships" xmlns:mc="http://schemas.openxmlformats.org/markup-compatibility/2006" xmlns:mv="urn:schemas-microsoft-com:mac:vml" xmlns:p="http://schemas.openxmlformats.org/presentationml/2006/main" xmlns:c="http://schemas.openxmlformats.org/drawingml/2006/chart" xmlns:dgm="http://schemas.openxmlformats.org/drawingml/2006/diagram" xmlns:o="urn:schemas-microsoft-com:office:office" xmlns:v="urn:schemas-microsoft-com:vml" xmlns:pvml="urn:schemas-microsoft-com:office:powerpoint" xmlns:com="http://schemas.openxmlformats.org/drawingml/2006/compatibility" xmlns:p14="http://schemas.microsoft.com/office/powerpoint/2010/main" xmlns:p15="http://schemas.microsoft.com/office/powerpoint/2012/main">
+<p:sld xmlns:a="http://schemas.openxmlformats.org/drawingml/2006/main" xmlns:r="http://schemas.openxmlformats.org/officeDocument/2006/relationships" xmlns:p="http://schemas.openxmlformats.org/presentationml/2006/main">
   <p:cSld>
     <p:spTree>
       <p:nvGrpSpPr>
-        <p:cNvPr id="60" name="Shape 60"/>
+        <p:cNvPr id="1" name="Shape 60"/>
         <p:cNvGrpSpPr/>
         <p:nvPr/>
       </p:nvGrpSpPr>
@@ -6064,12 +6205,12 @@
           </a:ln>
         </p:spPr>
         <p:txBody>
-          <a:bodyPr anchorCtr="0" anchor="t" bIns="91425" lIns="91425" spcFirstLastPara="1" rIns="91425" wrap="square" tIns="91425">
+          <a:bodyPr spcFirstLastPara="1" wrap="square" lIns="91425" tIns="91425" rIns="91425" bIns="91425" anchor="t" anchorCtr="0">
             <a:noAutofit/>
           </a:bodyPr>
           <a:lstStyle/>
           <a:p>
-            <a:pPr indent="0" lvl="0" marL="0" rtl="0" algn="l">
+            <a:pPr marL="0" lvl="0" indent="0" algn="l" rtl="0">
               <a:lnSpc>
                 <a:spcPct val="115000"/>
               </a:lnSpc>
@@ -6082,7 +6223,7 @@
               <a:buNone/>
             </a:pPr>
             <a:r>
-              <a:rPr b="1" lang="es">
+              <a:rPr lang="es" b="1">
                 <a:solidFill>
                   <a:schemeClr val="dk1"/>
                 </a:solidFill>
@@ -6096,7 +6237,7 @@
             </a:endParaRPr>
           </a:p>
           <a:p>
-            <a:pPr indent="0" lvl="0" marL="0" rtl="0" algn="l">
+            <a:pPr marL="0" lvl="0" indent="0" algn="l" rtl="0">
               <a:lnSpc>
                 <a:spcPct val="115000"/>
               </a:lnSpc>
@@ -6108,9 +6249,6 @@
               </a:spcAft>
               <a:buNone/>
             </a:pPr>
-            <a:r>
-              <a:t/>
-            </a:r>
             <a:endParaRPr sz="1200">
               <a:solidFill>
                 <a:schemeClr val="dk1"/>
@@ -6212,11 +6350,11 @@
 </file>
 
 <file path=ppt/slides/slide3.xml><?xml version="1.0" encoding="utf-8"?>
-<p:sld xmlns:a="http://schemas.openxmlformats.org/drawingml/2006/main" xmlns:r="http://schemas.openxmlformats.org/officeDocument/2006/relationships" xmlns:mc="http://schemas.openxmlformats.org/markup-compatibility/2006" xmlns:mv="urn:schemas-microsoft-com:mac:vml" xmlns:p="http://schemas.openxmlformats.org/presentationml/2006/main" xmlns:c="http://schemas.openxmlformats.org/drawingml/2006/chart" xmlns:dgm="http://schemas.openxmlformats.org/drawingml/2006/diagram" xmlns:o="urn:schemas-microsoft-com:office:office" xmlns:v="urn:schemas-microsoft-com:vml" xmlns:pvml="urn:schemas-microsoft-com:office:powerpoint" xmlns:com="http://schemas.openxmlformats.org/drawingml/2006/compatibility" xmlns:p14="http://schemas.microsoft.com/office/powerpoint/2010/main" xmlns:p15="http://schemas.microsoft.com/office/powerpoint/2012/main">
+<p:sld xmlns:a="http://schemas.openxmlformats.org/drawingml/2006/main" xmlns:r="http://schemas.openxmlformats.org/officeDocument/2006/relationships" xmlns:p="http://schemas.openxmlformats.org/presentationml/2006/main">
   <p:cSld>
     <p:spTree>
       <p:nvGrpSpPr>
-        <p:cNvPr id="68" name="Shape 68"/>
+        <p:cNvPr id="1" name="Shape 68"/>
         <p:cNvGrpSpPr/>
         <p:nvPr/>
       </p:nvGrpSpPr>
@@ -6231,7 +6369,9 @@
       <p:sp>
         <p:nvSpPr>
           <p:cNvPr id="69" name="Google Shape;69;p15"/>
-          <p:cNvSpPr txBox="1"/>
+          <p:cNvSpPr txBox="1">
+            <a:spLocks noGrp="1"/>
+          </p:cNvSpPr>
           <p:nvPr>
             <p:ph type="title"/>
           </p:nvPr>
@@ -6246,12 +6386,12 @@
           </a:prstGeom>
         </p:spPr>
         <p:txBody>
-          <a:bodyPr anchorCtr="0" anchor="t" bIns="91425" lIns="91425" spcFirstLastPara="1" rIns="91425" wrap="square" tIns="91425">
+          <a:bodyPr spcFirstLastPara="1" wrap="square" lIns="91425" tIns="91425" rIns="91425" bIns="91425" anchor="t" anchorCtr="0">
             <a:noAutofit/>
           </a:bodyPr>
           <a:lstStyle/>
           <a:p>
-            <a:pPr indent="0" lvl="0" marL="0" marR="0" rtl="0" algn="l">
+            <a:pPr marL="0" marR="0" lvl="0" indent="0" algn="l" rtl="0">
               <a:lnSpc>
                 <a:spcPct val="100000"/>
               </a:lnSpc>
@@ -6264,10 +6404,10 @@
               <a:buNone/>
             </a:pPr>
             <a:r>
-              <a:rPr b="1" lang="es" sz="1800"/>
+              <a:rPr lang="es" sz="1800" b="1"/>
               <a:t>Pero una computadora no...</a:t>
             </a:r>
-            <a:endParaRPr b="1" sz="1800"/>
+            <a:endParaRPr sz="1800" b="1"/>
           </a:p>
         </p:txBody>
       </p:sp>
@@ -6280,11 +6420,11 @@
 </file>
 
 <file path=ppt/slides/slide4.xml><?xml version="1.0" encoding="utf-8"?>
-<p:sld xmlns:a="http://schemas.openxmlformats.org/drawingml/2006/main" xmlns:r="http://schemas.openxmlformats.org/officeDocument/2006/relationships" xmlns:mc="http://schemas.openxmlformats.org/markup-compatibility/2006" xmlns:mv="urn:schemas-microsoft-com:mac:vml" xmlns:p="http://schemas.openxmlformats.org/presentationml/2006/main" xmlns:c="http://schemas.openxmlformats.org/drawingml/2006/chart" xmlns:dgm="http://schemas.openxmlformats.org/drawingml/2006/diagram" xmlns:o="urn:schemas-microsoft-com:office:office" xmlns:v="urn:schemas-microsoft-com:vml" xmlns:pvml="urn:schemas-microsoft-com:office:powerpoint" xmlns:com="http://schemas.openxmlformats.org/drawingml/2006/compatibility" xmlns:p14="http://schemas.microsoft.com/office/powerpoint/2010/main" xmlns:p15="http://schemas.microsoft.com/office/powerpoint/2012/main">
+<p:sld xmlns:a="http://schemas.openxmlformats.org/drawingml/2006/main" xmlns:r="http://schemas.openxmlformats.org/officeDocument/2006/relationships" xmlns:p="http://schemas.openxmlformats.org/presentationml/2006/main">
   <p:cSld>
     <p:spTree>
       <p:nvGrpSpPr>
-        <p:cNvPr id="73" name="Shape 73"/>
+        <p:cNvPr id="1" name="Shape 73"/>
         <p:cNvGrpSpPr/>
         <p:nvPr/>
       </p:nvGrpSpPr>
@@ -6299,7 +6439,9 @@
       <p:sp>
         <p:nvSpPr>
           <p:cNvPr id="74" name="Google Shape;74;p16"/>
-          <p:cNvSpPr txBox="1"/>
+          <p:cNvSpPr txBox="1">
+            <a:spLocks noGrp="1"/>
+          </p:cNvSpPr>
           <p:nvPr>
             <p:ph type="title"/>
           </p:nvPr>
@@ -6314,12 +6456,12 @@
           </a:prstGeom>
         </p:spPr>
         <p:txBody>
-          <a:bodyPr anchorCtr="0" anchor="t" bIns="91425" lIns="91425" spcFirstLastPara="1" rIns="91425" wrap="square" tIns="91425">
+          <a:bodyPr spcFirstLastPara="1" wrap="square" lIns="91425" tIns="91425" rIns="91425" bIns="91425" anchor="t" anchorCtr="0">
             <a:noAutofit/>
           </a:bodyPr>
           <a:lstStyle/>
           <a:p>
-            <a:pPr indent="0" lvl="0" marL="0" marR="0" rtl="0" algn="l">
+            <a:pPr marL="0" marR="0" lvl="0" indent="0" algn="l" rtl="0">
               <a:lnSpc>
                 <a:spcPct val="100000"/>
               </a:lnSpc>
@@ -6332,10 +6474,10 @@
               <a:buNone/>
             </a:pPr>
             <a:r>
-              <a:rPr b="1" lang="es" sz="1800"/>
+              <a:rPr lang="es" sz="1800" b="1"/>
               <a:t>Por eso tenemos algunas herramientas</a:t>
             </a:r>
-            <a:endParaRPr b="1" sz="1800"/>
+            <a:endParaRPr sz="1800" b="1"/>
           </a:p>
         </p:txBody>
       </p:sp>
@@ -6348,11 +6490,11 @@
 </file>
 
 <file path=ppt/slides/slide5.xml><?xml version="1.0" encoding="utf-8"?>
-<p:sld xmlns:a="http://schemas.openxmlformats.org/drawingml/2006/main" xmlns:r="http://schemas.openxmlformats.org/officeDocument/2006/relationships" xmlns:mc="http://schemas.openxmlformats.org/markup-compatibility/2006" xmlns:mv="urn:schemas-microsoft-com:mac:vml" xmlns:p="http://schemas.openxmlformats.org/presentationml/2006/main" xmlns:c="http://schemas.openxmlformats.org/drawingml/2006/chart" xmlns:dgm="http://schemas.openxmlformats.org/drawingml/2006/diagram" xmlns:o="urn:schemas-microsoft-com:office:office" xmlns:v="urn:schemas-microsoft-com:vml" xmlns:pvml="urn:schemas-microsoft-com:office:powerpoint" xmlns:com="http://schemas.openxmlformats.org/drawingml/2006/compatibility" xmlns:p14="http://schemas.microsoft.com/office/powerpoint/2010/main" xmlns:p15="http://schemas.microsoft.com/office/powerpoint/2012/main">
+<p:sld xmlns:a="http://schemas.openxmlformats.org/drawingml/2006/main" xmlns:r="http://schemas.openxmlformats.org/officeDocument/2006/relationships" xmlns:p="http://schemas.openxmlformats.org/presentationml/2006/main">
   <p:cSld>
     <p:spTree>
       <p:nvGrpSpPr>
-        <p:cNvPr id="78" name="Shape 78"/>
+        <p:cNvPr id="1" name="Shape 78"/>
         <p:cNvGrpSpPr/>
         <p:nvPr/>
       </p:nvGrpSpPr>
@@ -6384,12 +6526,12 @@
           </a:ln>
         </p:spPr>
         <p:txBody>
-          <a:bodyPr anchorCtr="0" anchor="t" bIns="91425" lIns="91425" spcFirstLastPara="1" rIns="91425" wrap="square" tIns="91425">
+          <a:bodyPr spcFirstLastPara="1" wrap="square" lIns="91425" tIns="91425" rIns="91425" bIns="91425" anchor="t" anchorCtr="0">
             <a:noAutofit/>
           </a:bodyPr>
           <a:lstStyle/>
           <a:p>
-            <a:pPr indent="0" lvl="0" marL="0" rtl="0" algn="l">
+            <a:pPr marL="0" lvl="0" indent="0" algn="l" rtl="0">
               <a:lnSpc>
                 <a:spcPct val="115000"/>
               </a:lnSpc>
@@ -6402,7 +6544,7 @@
               <a:buNone/>
             </a:pPr>
             <a:r>
-              <a:rPr b="1" lang="es">
+              <a:rPr lang="es" b="1">
                 <a:solidFill>
                   <a:schemeClr val="dk1"/>
                 </a:solidFill>
@@ -6427,7 +6569,7 @@
           <a:blip r:embed="rId3">
             <a:alphaModFix/>
           </a:blip>
-          <a:srcRect b="6352" l="24290" r="24202" t="14733"/>
+          <a:srcRect l="24290" t="14733" r="24202" b="6352"/>
           <a:stretch/>
         </p:blipFill>
         <p:spPr>
@@ -6509,11 +6651,11 @@
 </file>
 
 <file path=ppt/slides/slide6.xml><?xml version="1.0" encoding="utf-8"?>
-<p:sld xmlns:a="http://schemas.openxmlformats.org/drawingml/2006/main" xmlns:r="http://schemas.openxmlformats.org/officeDocument/2006/relationships" xmlns:mc="http://schemas.openxmlformats.org/markup-compatibility/2006" xmlns:mv="urn:schemas-microsoft-com:mac:vml" xmlns:p="http://schemas.openxmlformats.org/presentationml/2006/main" xmlns:c="http://schemas.openxmlformats.org/drawingml/2006/chart" xmlns:dgm="http://schemas.openxmlformats.org/drawingml/2006/diagram" xmlns:o="urn:schemas-microsoft-com:office:office" xmlns:v="urn:schemas-microsoft-com:vml" xmlns:pvml="urn:schemas-microsoft-com:office:powerpoint" xmlns:com="http://schemas.openxmlformats.org/drawingml/2006/compatibility" xmlns:p14="http://schemas.microsoft.com/office/powerpoint/2010/main" xmlns:p15="http://schemas.microsoft.com/office/powerpoint/2012/main">
+<p:sld xmlns:a="http://schemas.openxmlformats.org/drawingml/2006/main" xmlns:r="http://schemas.openxmlformats.org/officeDocument/2006/relationships" xmlns:p="http://schemas.openxmlformats.org/presentationml/2006/main">
   <p:cSld>
     <p:spTree>
       <p:nvGrpSpPr>
-        <p:cNvPr id="86" name="Shape 86"/>
+        <p:cNvPr id="1" name="Shape 86"/>
         <p:cNvGrpSpPr/>
         <p:nvPr/>
       </p:nvGrpSpPr>
@@ -6528,7 +6670,9 @@
       <p:sp>
         <p:nvSpPr>
           <p:cNvPr id="87" name="Google Shape;87;p18"/>
-          <p:cNvSpPr txBox="1"/>
+          <p:cNvSpPr txBox="1">
+            <a:spLocks noGrp="1"/>
+          </p:cNvSpPr>
           <p:nvPr>
             <p:ph type="title"/>
           </p:nvPr>
@@ -6543,12 +6687,12 @@
           </a:prstGeom>
         </p:spPr>
         <p:txBody>
-          <a:bodyPr anchorCtr="0" anchor="t" bIns="91425" lIns="91425" spcFirstLastPara="1" rIns="91425" wrap="square" tIns="91425">
+          <a:bodyPr spcFirstLastPara="1" wrap="square" lIns="91425" tIns="91425" rIns="91425" bIns="91425" anchor="t" anchorCtr="0">
             <a:noAutofit/>
           </a:bodyPr>
           <a:lstStyle/>
           <a:p>
-            <a:pPr indent="0" lvl="0" marL="0" marR="0" rtl="0" algn="l">
+            <a:pPr marL="0" marR="0" lvl="0" indent="0" algn="l" rtl="0">
               <a:lnSpc>
                 <a:spcPct val="100000"/>
               </a:lnSpc>
@@ -6561,10 +6705,10 @@
               <a:buNone/>
             </a:pPr>
             <a:r>
-              <a:rPr b="1" lang="es" sz="1800"/>
+              <a:rPr lang="es" sz="1800" b="1"/>
               <a:t>Pero hay que entenderlas y configurarlas...</a:t>
             </a:r>
-            <a:endParaRPr b="1" sz="1800"/>
+            <a:endParaRPr sz="1800" b="1"/>
           </a:p>
         </p:txBody>
       </p:sp>
@@ -6577,11 +6721,11 @@
 </file>
 
 <file path=ppt/slides/slide7.xml><?xml version="1.0" encoding="utf-8"?>
-<p:sld xmlns:a="http://schemas.openxmlformats.org/drawingml/2006/main" xmlns:r="http://schemas.openxmlformats.org/officeDocument/2006/relationships" xmlns:mc="http://schemas.openxmlformats.org/markup-compatibility/2006" xmlns:mv="urn:schemas-microsoft-com:mac:vml" xmlns:p="http://schemas.openxmlformats.org/presentationml/2006/main" xmlns:c="http://schemas.openxmlformats.org/drawingml/2006/chart" xmlns:dgm="http://schemas.openxmlformats.org/drawingml/2006/diagram" xmlns:o="urn:schemas-microsoft-com:office:office" xmlns:v="urn:schemas-microsoft-com:vml" xmlns:pvml="urn:schemas-microsoft-com:office:powerpoint" xmlns:com="http://schemas.openxmlformats.org/drawingml/2006/compatibility" xmlns:p14="http://schemas.microsoft.com/office/powerpoint/2010/main" xmlns:p15="http://schemas.microsoft.com/office/powerpoint/2012/main">
+<p:sld xmlns:a="http://schemas.openxmlformats.org/drawingml/2006/main" xmlns:r="http://schemas.openxmlformats.org/officeDocument/2006/relationships" xmlns:p="http://schemas.openxmlformats.org/presentationml/2006/main">
   <p:cSld>
     <p:spTree>
       <p:nvGrpSpPr>
-        <p:cNvPr id="91" name="Shape 91"/>
+        <p:cNvPr id="1" name="Shape 91"/>
         <p:cNvGrpSpPr/>
         <p:nvPr/>
       </p:nvGrpSpPr>
@@ -6596,7 +6740,9 @@
       <p:sp>
         <p:nvSpPr>
           <p:cNvPr id="92" name="Google Shape;92;p19"/>
-          <p:cNvSpPr txBox="1"/>
+          <p:cNvSpPr txBox="1">
+            <a:spLocks noGrp="1"/>
+          </p:cNvSpPr>
           <p:nvPr>
             <p:ph type="title"/>
           </p:nvPr>
@@ -6611,12 +6757,12 @@
           </a:prstGeom>
         </p:spPr>
         <p:txBody>
-          <a:bodyPr anchorCtr="0" anchor="ctr" bIns="91425" lIns="91425" spcFirstLastPara="1" rIns="91425" wrap="square" tIns="91425">
+          <a:bodyPr spcFirstLastPara="1" wrap="square" lIns="91425" tIns="91425" rIns="91425" bIns="91425" anchor="ctr" anchorCtr="0">
             <a:noAutofit/>
           </a:bodyPr>
           <a:lstStyle/>
           <a:p>
-            <a:pPr indent="0" lvl="0" marL="0" rtl="0" algn="l">
+            <a:pPr marL="0" lvl="0" indent="0" algn="l" rtl="0">
               <a:spcBef>
                 <a:spcPts val="0"/>
               </a:spcBef>
@@ -6626,19 +6772,21 @@
               <a:buNone/>
             </a:pPr>
             <a:r>
-              <a:rPr b="1" lang="es" sz="1800"/>
+              <a:rPr lang="es" sz="1800" b="1"/>
               <a:t>Schema.org</a:t>
             </a:r>
-            <a:endParaRPr b="1" sz="1800"/>
+            <a:endParaRPr sz="1800" b="1"/>
           </a:p>
         </p:txBody>
       </p:sp>
       <p:sp>
         <p:nvSpPr>
           <p:cNvPr id="93" name="Google Shape;93;p19"/>
-          <p:cNvSpPr txBox="1"/>
+          <p:cNvSpPr txBox="1">
+            <a:spLocks noGrp="1"/>
+          </p:cNvSpPr>
           <p:nvPr>
-            <p:ph idx="1" type="body"/>
+            <p:ph type="body" idx="1"/>
           </p:nvPr>
         </p:nvSpPr>
         <p:spPr>
@@ -6651,12 +6799,12 @@
           </a:prstGeom>
         </p:spPr>
         <p:txBody>
-          <a:bodyPr anchorCtr="0" anchor="ctr" bIns="91425" lIns="91425" spcFirstLastPara="1" rIns="91425" wrap="square" tIns="91425">
+          <a:bodyPr spcFirstLastPara="1" wrap="square" lIns="91425" tIns="91425" rIns="91425" bIns="91425" anchor="ctr" anchorCtr="0">
             <a:noAutofit/>
           </a:bodyPr>
           <a:lstStyle/>
           <a:p>
-            <a:pPr indent="0" lvl="0" marL="0" rtl="0" algn="l">
+            <a:pPr marL="0" lvl="0" indent="0" algn="l" rtl="0">
               <a:spcBef>
                 <a:spcPts val="0"/>
               </a:spcBef>
@@ -6681,7 +6829,7 @@
             <a:endParaRPr/>
           </a:p>
           <a:p>
-            <a:pPr indent="0" lvl="0" marL="0" rtl="0" algn="l">
+            <a:pPr marL="0" lvl="0" indent="0" algn="l" rtl="0">
               <a:spcBef>
                 <a:spcPts val="0"/>
               </a:spcBef>
@@ -6706,7 +6854,7 @@
             <a:endParaRPr/>
           </a:p>
           <a:p>
-            <a:pPr indent="0" lvl="0" marL="0" rtl="0" algn="l">
+            <a:pPr marL="0" lvl="0" indent="0" algn="l" rtl="0">
               <a:spcBef>
                 <a:spcPts val="0"/>
               </a:spcBef>
@@ -6741,11 +6889,11 @@
 </file>
 
 <file path=ppt/slides/slide8.xml><?xml version="1.0" encoding="utf-8"?>
-<p:sld xmlns:a="http://schemas.openxmlformats.org/drawingml/2006/main" xmlns:r="http://schemas.openxmlformats.org/officeDocument/2006/relationships" xmlns:mc="http://schemas.openxmlformats.org/markup-compatibility/2006" xmlns:mv="urn:schemas-microsoft-com:mac:vml" xmlns:p="http://schemas.openxmlformats.org/presentationml/2006/main" xmlns:c="http://schemas.openxmlformats.org/drawingml/2006/chart" xmlns:dgm="http://schemas.openxmlformats.org/drawingml/2006/diagram" xmlns:o="urn:schemas-microsoft-com:office:office" xmlns:v="urn:schemas-microsoft-com:vml" xmlns:pvml="urn:schemas-microsoft-com:office:powerpoint" xmlns:com="http://schemas.openxmlformats.org/drawingml/2006/compatibility" xmlns:p14="http://schemas.microsoft.com/office/powerpoint/2010/main" xmlns:p15="http://schemas.microsoft.com/office/powerpoint/2012/main">
+<p:sld xmlns:a="http://schemas.openxmlformats.org/drawingml/2006/main" xmlns:r="http://schemas.openxmlformats.org/officeDocument/2006/relationships" xmlns:p="http://schemas.openxmlformats.org/presentationml/2006/main">
   <p:cSld>
     <p:spTree>
       <p:nvGrpSpPr>
-        <p:cNvPr id="97" name="Shape 97"/>
+        <p:cNvPr id="1" name="Shape 97"/>
         <p:cNvGrpSpPr/>
         <p:nvPr/>
       </p:nvGrpSpPr>
@@ -6760,7 +6908,9 @@
       <p:sp>
         <p:nvSpPr>
           <p:cNvPr id="98" name="Google Shape;98;p20"/>
-          <p:cNvSpPr txBox="1"/>
+          <p:cNvSpPr txBox="1">
+            <a:spLocks noGrp="1"/>
+          </p:cNvSpPr>
           <p:nvPr>
             <p:ph type="title"/>
           </p:nvPr>
@@ -6775,12 +6925,12 @@
           </a:prstGeom>
         </p:spPr>
         <p:txBody>
-          <a:bodyPr anchorCtr="0" anchor="ctr" bIns="91425" lIns="91425" spcFirstLastPara="1" rIns="91425" wrap="square" tIns="91425">
+          <a:bodyPr spcFirstLastPara="1" wrap="square" lIns="91425" tIns="91425" rIns="91425" bIns="91425" anchor="ctr" anchorCtr="0">
             <a:noAutofit/>
           </a:bodyPr>
           <a:lstStyle/>
           <a:p>
-            <a:pPr indent="0" lvl="0" marL="0" rtl="0" algn="l">
+            <a:pPr marL="0" lvl="0" indent="0" algn="l" rtl="0">
               <a:spcBef>
                 <a:spcPts val="0"/>
               </a:spcBef>
@@ -6800,9 +6950,11 @@
       <p:sp>
         <p:nvSpPr>
           <p:cNvPr id="99" name="Google Shape;99;p20"/>
-          <p:cNvSpPr txBox="1"/>
+          <p:cNvSpPr txBox="1">
+            <a:spLocks noGrp="1"/>
+          </p:cNvSpPr>
           <p:nvPr>
-            <p:ph idx="1" type="body"/>
+            <p:ph type="body" idx="1"/>
           </p:nvPr>
         </p:nvSpPr>
         <p:spPr>
@@ -6815,12 +6967,12 @@
           </a:prstGeom>
         </p:spPr>
         <p:txBody>
-          <a:bodyPr anchorCtr="0" anchor="ctr" bIns="91425" lIns="91425" spcFirstLastPara="1" rIns="91425" wrap="square" tIns="91425">
+          <a:bodyPr spcFirstLastPara="1" wrap="square" lIns="91425" tIns="91425" rIns="91425" bIns="91425" anchor="ctr" anchorCtr="0">
             <a:noAutofit/>
           </a:bodyPr>
           <a:lstStyle/>
           <a:p>
-            <a:pPr indent="0" lvl="0" marL="0" rtl="0" algn="l">
+            <a:pPr marL="0" lvl="0" indent="0" algn="l" rtl="0">
               <a:spcBef>
                 <a:spcPts val="0"/>
               </a:spcBef>
@@ -6830,13 +6982,25 @@
               <a:buNone/>
             </a:pPr>
             <a:r>
-              <a:rPr lang="es"/>
+              <a:rPr lang="es" dirty="0"/>
               <a:t>Facebook:</a:t>
             </a:r>
-            <a:endParaRPr/>
+            <a:endParaRPr dirty="0"/>
           </a:p>
           <a:p>
-            <a:pPr indent="0" lvl="0" marL="0" rtl="0" algn="l">
+            <a:pPr marL="0" lvl="0" indent="0" algn="l" rtl="0">
+              <a:spcBef>
+                <a:spcPts val="0"/>
+              </a:spcBef>
+              <a:spcAft>
+                <a:spcPts val="0"/>
+              </a:spcAft>
+              <a:buNone/>
+            </a:pPr>
+            <a:endParaRPr dirty="0"/>
+          </a:p>
+          <a:p>
+            <a:pPr marL="0" lvl="0" indent="0" algn="l" rtl="0">
               <a:spcBef>
                 <a:spcPts val="0"/>
               </a:spcBef>
@@ -6846,30 +7010,11 @@
               <a:buNone/>
             </a:pPr>
             <a:r>
-              <a:t/>
-            </a:r>
-            <a:endParaRPr/>
-          </a:p>
-          <a:p>
-            <a:pPr indent="0" lvl="0" marL="0" rtl="0" algn="l">
-              <a:spcBef>
-                <a:spcPts val="0"/>
-              </a:spcBef>
-              <a:spcAft>
-                <a:spcPts val="0"/>
-              </a:spcAft>
-              <a:buNone/>
-            </a:pPr>
-            <a:r>
-              <a:rPr lang="es"/>
-              <a:t>Botón</a:t>
+              <a:rPr lang="es" dirty="0"/>
+              <a:t>Botón compartir: </a:t>
             </a:r>
             <a:r>
-              <a:rPr lang="es"/>
-              <a:t> compartir: </a:t>
-            </a:r>
-            <a:r>
-              <a:rPr lang="es" sz="1100" u="sng">
+              <a:rPr lang="es" sz="1100" u="sng" dirty="0">
                 <a:solidFill>
                   <a:schemeClr val="hlink"/>
                 </a:solidFill>
@@ -6877,10 +7022,10 @@
               </a:rPr>
               <a:t>https://developers.facebook.com/docs/plugins/share-button?locale=es_ES</a:t>
             </a:r>
-            <a:endParaRPr/>
+            <a:endParaRPr dirty="0"/>
           </a:p>
           <a:p>
-            <a:pPr indent="0" lvl="0" marL="0" rtl="0" algn="l">
+            <a:pPr marL="0" lvl="0" indent="0" algn="l" rtl="0">
               <a:spcBef>
                 <a:spcPts val="0"/>
               </a:spcBef>
@@ -6890,13 +7035,13 @@
               <a:buNone/>
             </a:pPr>
             <a:r>
-              <a:rPr lang="es"/>
+              <a:rPr lang="es" dirty="0"/>
               <a:t> </a:t>
             </a:r>
-            <a:endParaRPr/>
+            <a:endParaRPr dirty="0"/>
           </a:p>
           <a:p>
-            <a:pPr indent="0" lvl="0" marL="0" rtl="0" algn="l">
+            <a:pPr marL="0" lvl="0" indent="0" algn="l" rtl="0">
               <a:spcBef>
                 <a:spcPts val="0"/>
               </a:spcBef>
@@ -6906,13 +7051,25 @@
               <a:buNone/>
             </a:pPr>
             <a:r>
-              <a:rPr lang="es"/>
+              <a:rPr lang="es" dirty="0"/>
               <a:t>Twitter:</a:t>
             </a:r>
-            <a:endParaRPr/>
+            <a:endParaRPr dirty="0"/>
           </a:p>
           <a:p>
-            <a:pPr indent="0" lvl="0" marL="0" rtl="0" algn="l">
+            <a:pPr marL="0" lvl="0" indent="0" algn="l" rtl="0">
+              <a:spcBef>
+                <a:spcPts val="0"/>
+              </a:spcBef>
+              <a:spcAft>
+                <a:spcPts val="0"/>
+              </a:spcAft>
+              <a:buNone/>
+            </a:pPr>
+            <a:endParaRPr dirty="0"/>
+          </a:p>
+          <a:p>
+            <a:pPr marL="0" lvl="0" indent="0" algn="l" rtl="0">
               <a:spcBef>
                 <a:spcPts val="0"/>
               </a:spcBef>
@@ -6922,12 +7079,13 @@
               <a:buNone/>
             </a:pPr>
             <a:r>
-              <a:t/>
+              <a:rPr lang="es" dirty="0"/>
+              <a:t>Summary Card:</a:t>
             </a:r>
-            <a:endParaRPr/>
+            <a:endParaRPr dirty="0"/>
           </a:p>
           <a:p>
-            <a:pPr indent="0" lvl="0" marL="0" rtl="0" algn="l">
+            <a:pPr marL="0" lvl="0" indent="0" algn="l" rtl="0">
               <a:spcBef>
                 <a:spcPts val="0"/>
               </a:spcBef>
@@ -6937,27 +7095,11 @@
               <a:buNone/>
             </a:pPr>
             <a:r>
-              <a:rPr lang="es"/>
-              <a:t>Summary Card:</a:t>
-            </a:r>
-            <a:endParaRPr/>
-          </a:p>
-          <a:p>
-            <a:pPr indent="0" lvl="0" marL="0" rtl="0" algn="l">
-              <a:spcBef>
-                <a:spcPts val="0"/>
-              </a:spcBef>
-              <a:spcAft>
-                <a:spcPts val="0"/>
-              </a:spcAft>
-              <a:buNone/>
-            </a:pPr>
-            <a:r>
-              <a:rPr lang="es"/>
+              <a:rPr lang="es" dirty="0"/>
               <a:t> </a:t>
             </a:r>
             <a:r>
-              <a:rPr lang="es" sz="1100" u="sng">
+              <a:rPr lang="es" sz="1100" u="sng" dirty="0">
                 <a:solidFill>
                   <a:schemeClr val="hlink"/>
                 </a:solidFill>
@@ -6965,10 +7107,10 @@
               </a:rPr>
               <a:t>https://developer.twitter.com/en/docs/tweets/optimize-with-cards/overview/summary</a:t>
             </a:r>
-            <a:endParaRPr/>
+            <a:endParaRPr dirty="0"/>
           </a:p>
           <a:p>
-            <a:pPr indent="0" lvl="0" marL="0" rtl="0" algn="l">
+            <a:pPr marL="0" lvl="0" indent="0" algn="l" rtl="0">
               <a:spcBef>
                 <a:spcPts val="0"/>
               </a:spcBef>
@@ -6978,15 +7120,11 @@
               <a:buNone/>
             </a:pPr>
             <a:r>
-              <a:rPr lang="es"/>
-              <a:t>Javascript para agregar:</a:t>
+              <a:rPr lang="es" dirty="0"/>
+              <a:t>Javascript para agregar: </a:t>
             </a:r>
             <a:r>
-              <a:rPr lang="es"/>
-              <a:t> </a:t>
-            </a:r>
-            <a:r>
-              <a:rPr lang="es" sz="1100" u="sng">
+              <a:rPr lang="es" sz="1100" u="sng" dirty="0">
                 <a:solidFill>
                   <a:schemeClr val="hlink"/>
                 </a:solidFill>
@@ -6994,10 +7132,10 @@
               </a:rPr>
               <a:t>https://developer.twitter.com/en/docs/twitter-for-websites/javascript-api/guides/set-up-twitter-for-websites</a:t>
             </a:r>
-            <a:endParaRPr/>
+            <a:endParaRPr dirty="0"/>
           </a:p>
           <a:p>
-            <a:pPr indent="0" lvl="0" marL="0" rtl="0" algn="l">
+            <a:pPr marL="0" lvl="0" indent="0" algn="l" rtl="0">
               <a:spcBef>
                 <a:spcPts val="0"/>
               </a:spcBef>
@@ -7007,13 +7145,13 @@
               <a:buNone/>
             </a:pPr>
             <a:r>
-              <a:rPr lang="es"/>
+              <a:rPr lang="es" dirty="0"/>
               <a:t>Button para compartir</a:t>
             </a:r>
-            <a:endParaRPr/>
+            <a:endParaRPr dirty="0"/>
           </a:p>
           <a:p>
-            <a:pPr indent="0" lvl="0" marL="0" rtl="0" algn="l">
+            <a:pPr marL="0" lvl="0" indent="0" algn="l" rtl="0">
               <a:spcBef>
                 <a:spcPts val="0"/>
               </a:spcBef>
@@ -7023,17 +7161,33 @@
               <a:buNone/>
             </a:pPr>
             <a:r>
-              <a:rPr lang="es"/>
+              <a:rPr lang="es" dirty="0"/>
               <a:t>:</a:t>
             </a:r>
             <a:r>
-              <a:rPr lang="es" sz="1100" u="sng">
+              <a:rPr lang="es" sz="1100" u="sng" dirty="0">
                 <a:solidFill>
                   <a:schemeClr val="hlink"/>
                 </a:solidFill>
                 <a:hlinkClick r:id="rId6"/>
               </a:rPr>
               <a:t>https://developer.twitter.com/en/docs/twitter-for-websites/tweet-button/guides/parameter-reference1</a:t>
+            </a:r>
+            <a:endParaRPr lang="es" sz="1100" u="sng" dirty="0">
+              <a:solidFill>
+                <a:schemeClr val="hlink"/>
+              </a:solidFill>
+            </a:endParaRPr>
+          </a:p>
+          <a:p>
+            <a:pPr marL="0" lvl="0" indent="0">
+              <a:buNone/>
+            </a:pPr>
+            <a:r>
+              <a:rPr lang="es-PE">
+                <a:hlinkClick r:id="rId7"/>
+              </a:rPr>
+              <a:t>https://cards-dev.twitter.com/validator</a:t>
             </a:r>
             <a:endParaRPr/>
           </a:p>
@@ -7048,7 +7202,7 @@
 </file>
 
 <file path=ppt/theme/theme1.xml><?xml version="1.0" encoding="utf-8"?>
-<a:theme xmlns:a="http://schemas.openxmlformats.org/drawingml/2006/main" xmlns:r="http://schemas.openxmlformats.org/officeDocument/2006/relationships" name="Simple Light">
+<a:theme xmlns:a="http://schemas.openxmlformats.org/drawingml/2006/main" name="Simple Light">
   <a:themeElements>
     <a:clrScheme name="Simple Light">
       <a:dk1>
@@ -7323,11 +7477,13 @@
       </a:bgFillStyleLst>
     </a:fmtScheme>
   </a:themeElements>
+  <a:objectDefaults/>
+  <a:extraClrSchemeLst/>
 </a:theme>
 </file>
 
 <file path=ppt/theme/theme2.xml><?xml version="1.0" encoding="utf-8"?>
-<a:theme xmlns:a="http://schemas.openxmlformats.org/drawingml/2006/main" xmlns:r="http://schemas.openxmlformats.org/officeDocument/2006/relationships">
+<a:theme xmlns:a="http://schemas.openxmlformats.org/drawingml/2006/main">
   <a:themeElements>
     <a:clrScheme name="Default">
       <a:dk1>
@@ -7602,5 +7758,7 @@
       </a:bgFillStyleLst>
     </a:fmtScheme>
   </a:themeElements>
+  <a:objectDefaults/>
+  <a:extraClrSchemeLst/>
 </a:theme>
 </file>
</xml_diff>